<commit_message>
Add hero journy animation
</commit_message>
<xml_diff>
--- a/semester-2-2021-2022/week-8-theory-of-generalisation/Theory_of_Generalisation.pptx
+++ b/semester-2-2021-2022/week-8-theory-of-generalisation/Theory_of_Generalisation.pptx
@@ -247,10 +247,3113 @@
       <p15:sldGuideLst xmlns:p15="http://schemas.microsoft.com/office/powerpoint/2012/main"/>
     </p:ext>
     <p:ext uri="http://customooxmlschemas.google.com/">
-      <go:slidesCustomData xmlns="" xmlns:mc="http://schemas.openxmlformats.org/markup-compatibility/2006" xmlns:mv="urn:schemas-microsoft-com:mac:vml" xmlns:c="http://schemas.openxmlformats.org/drawingml/2006/chart" xmlns:dgm="http://schemas.openxmlformats.org/drawingml/2006/diagram" xmlns:o="urn:schemas-microsoft-com:office:office" xmlns:v="urn:schemas-microsoft-com:vml" xmlns:pvml="urn:schemas-microsoft-com:office:powerpoint" xmlns:com="http://schemas.openxmlformats.org/drawingml/2006/compatibility" xmlns:p14="http://schemas.microsoft.com/office/powerpoint/2010/main" xmlns:p15="http://schemas.microsoft.com/office/powerpoint/2012/main" xmlns:ahyp="http://schemas.microsoft.com/office/drawing/2018/hyperlinkcolor" xmlns:go="http://customooxmlschemas.google.com/" r:id="rId15" roundtripDataSignature="AMtx7mgsO1B3PxuK7F4XI2Op/As+CHUsWw=="/>
+      <go:slidesCustomData xmlns:go="http://customooxmlschemas.google.com/" xmlns:ahyp="http://schemas.microsoft.com/office/drawing/2018/hyperlinkcolor" xmlns:p15="http://schemas.microsoft.com/office/powerpoint/2012/main" xmlns:p14="http://schemas.microsoft.com/office/powerpoint/2010/main" xmlns:com="http://schemas.openxmlformats.org/drawingml/2006/compatibility" xmlns:pvml="urn:schemas-microsoft-com:office:powerpoint" xmlns:v="urn:schemas-microsoft-com:vml" xmlns:o="urn:schemas-microsoft-com:office:office" xmlns:dgm="http://schemas.openxmlformats.org/drawingml/2006/diagram" xmlns:c="http://schemas.openxmlformats.org/drawingml/2006/chart" xmlns:mv="urn:schemas-microsoft-com:mac:vml" xmlns:mc="http://schemas.openxmlformats.org/markup-compatibility/2006" xmlns="" r:id="rId15" roundtripDataSignature="AMtx7mgsO1B3PxuK7F4XI2Op/As+CHUsWw=="/>
     </p:ext>
   </p:extLst>
 </p:presentation>
+</file>
+
+<file path=ppt/diagrams/colors1.xml><?xml version="1.0" encoding="utf-8"?>
+<dgm:colorsDef xmlns:dgm="http://schemas.openxmlformats.org/drawingml/2006/diagram" xmlns:a="http://schemas.openxmlformats.org/drawingml/2006/main" uniqueId="urn:microsoft.com/office/officeart/2005/8/colors/accent0_1">
+  <dgm:title val=""/>
+  <dgm:desc val=""/>
+  <dgm:catLst>
+    <dgm:cat type="mainScheme" pri="10100"/>
+  </dgm:catLst>
+  <dgm:styleLbl name="node0">
+    <dgm:fillClrLst meth="repeat">
+      <a:schemeClr val="lt1"/>
+    </dgm:fillClrLst>
+    <dgm:linClrLst meth="repeat">
+      <a:schemeClr val="dk1">
+        <a:shade val="80000"/>
+      </a:schemeClr>
+    </dgm:linClrLst>
+    <dgm:effectClrLst/>
+    <dgm:txLinClrLst/>
+    <dgm:txFillClrLst meth="repeat">
+      <a:schemeClr val="dk1"/>
+    </dgm:txFillClrLst>
+    <dgm:txEffectClrLst/>
+  </dgm:styleLbl>
+  <dgm:styleLbl name="node1">
+    <dgm:fillClrLst meth="repeat">
+      <a:schemeClr val="lt1"/>
+    </dgm:fillClrLst>
+    <dgm:linClrLst meth="repeat">
+      <a:schemeClr val="dk1">
+        <a:shade val="80000"/>
+      </a:schemeClr>
+    </dgm:linClrLst>
+    <dgm:effectClrLst/>
+    <dgm:txLinClrLst/>
+    <dgm:txFillClrLst meth="repeat">
+      <a:schemeClr val="dk1"/>
+    </dgm:txFillClrLst>
+    <dgm:txEffectClrLst/>
+  </dgm:styleLbl>
+  <dgm:styleLbl name="alignNode1">
+    <dgm:fillClrLst meth="repeat">
+      <a:schemeClr val="lt1"/>
+    </dgm:fillClrLst>
+    <dgm:linClrLst meth="repeat">
+      <a:schemeClr val="dk1">
+        <a:shade val="80000"/>
+      </a:schemeClr>
+    </dgm:linClrLst>
+    <dgm:effectClrLst/>
+    <dgm:txLinClrLst/>
+    <dgm:txFillClrLst meth="repeat">
+      <a:schemeClr val="dk1"/>
+    </dgm:txFillClrLst>
+    <dgm:txEffectClrLst/>
+  </dgm:styleLbl>
+  <dgm:styleLbl name="lnNode1">
+    <dgm:fillClrLst meth="repeat">
+      <a:schemeClr val="lt1"/>
+    </dgm:fillClrLst>
+    <dgm:linClrLst meth="repeat">
+      <a:schemeClr val="dk1">
+        <a:shade val="80000"/>
+      </a:schemeClr>
+    </dgm:linClrLst>
+    <dgm:effectClrLst/>
+    <dgm:txLinClrLst/>
+    <dgm:txFillClrLst meth="repeat">
+      <a:schemeClr val="dk1"/>
+    </dgm:txFillClrLst>
+    <dgm:txEffectClrLst/>
+  </dgm:styleLbl>
+  <dgm:styleLbl name="vennNode1">
+    <dgm:fillClrLst meth="repeat">
+      <a:schemeClr val="lt1">
+        <a:alpha val="50000"/>
+      </a:schemeClr>
+    </dgm:fillClrLst>
+    <dgm:linClrLst meth="repeat">
+      <a:schemeClr val="dk1">
+        <a:shade val="80000"/>
+      </a:schemeClr>
+    </dgm:linClrLst>
+    <dgm:effectClrLst/>
+    <dgm:txLinClrLst/>
+    <dgm:txFillClrLst/>
+    <dgm:txEffectClrLst/>
+  </dgm:styleLbl>
+  <dgm:styleLbl name="node2">
+    <dgm:fillClrLst meth="repeat">
+      <a:schemeClr val="lt1"/>
+    </dgm:fillClrLst>
+    <dgm:linClrLst meth="repeat">
+      <a:schemeClr val="dk1">
+        <a:shade val="80000"/>
+      </a:schemeClr>
+    </dgm:linClrLst>
+    <dgm:effectClrLst/>
+    <dgm:txLinClrLst/>
+    <dgm:txFillClrLst meth="repeat">
+      <a:schemeClr val="dk1"/>
+    </dgm:txFillClrLst>
+    <dgm:txEffectClrLst/>
+  </dgm:styleLbl>
+  <dgm:styleLbl name="node3">
+    <dgm:fillClrLst meth="repeat">
+      <a:schemeClr val="lt1"/>
+    </dgm:fillClrLst>
+    <dgm:linClrLst meth="repeat">
+      <a:schemeClr val="dk1">
+        <a:shade val="80000"/>
+      </a:schemeClr>
+    </dgm:linClrLst>
+    <dgm:effectClrLst/>
+    <dgm:txLinClrLst/>
+    <dgm:txFillClrLst meth="repeat">
+      <a:schemeClr val="dk1"/>
+    </dgm:txFillClrLst>
+    <dgm:txEffectClrLst/>
+  </dgm:styleLbl>
+  <dgm:styleLbl name="node4">
+    <dgm:fillClrLst meth="repeat">
+      <a:schemeClr val="lt1"/>
+    </dgm:fillClrLst>
+    <dgm:linClrLst meth="repeat">
+      <a:schemeClr val="dk1">
+        <a:shade val="80000"/>
+      </a:schemeClr>
+    </dgm:linClrLst>
+    <dgm:effectClrLst/>
+    <dgm:txLinClrLst/>
+    <dgm:txFillClrLst meth="repeat">
+      <a:schemeClr val="dk1"/>
+    </dgm:txFillClrLst>
+    <dgm:txEffectClrLst/>
+  </dgm:styleLbl>
+  <dgm:styleLbl name="fgImgPlace1">
+    <dgm:fillClrLst meth="repeat">
+      <a:schemeClr val="dk1">
+        <a:tint val="40000"/>
+      </a:schemeClr>
+    </dgm:fillClrLst>
+    <dgm:linClrLst meth="repeat">
+      <a:schemeClr val="dk1">
+        <a:shade val="80000"/>
+      </a:schemeClr>
+    </dgm:linClrLst>
+    <dgm:effectClrLst/>
+    <dgm:txLinClrLst/>
+    <dgm:txFillClrLst meth="repeat">
+      <a:schemeClr val="lt1"/>
+    </dgm:txFillClrLst>
+    <dgm:txEffectClrLst/>
+  </dgm:styleLbl>
+  <dgm:styleLbl name="alignImgPlace1">
+    <dgm:fillClrLst meth="repeat">
+      <a:schemeClr val="dk1">
+        <a:tint val="40000"/>
+      </a:schemeClr>
+    </dgm:fillClrLst>
+    <dgm:linClrLst meth="repeat">
+      <a:schemeClr val="dk1">
+        <a:shade val="80000"/>
+      </a:schemeClr>
+    </dgm:linClrLst>
+    <dgm:effectClrLst/>
+    <dgm:txLinClrLst/>
+    <dgm:txFillClrLst meth="repeat">
+      <a:schemeClr val="lt1"/>
+    </dgm:txFillClrLst>
+    <dgm:txEffectClrLst/>
+  </dgm:styleLbl>
+  <dgm:styleLbl name="bgImgPlace1">
+    <dgm:fillClrLst meth="repeat">
+      <a:schemeClr val="dk1">
+        <a:tint val="40000"/>
+      </a:schemeClr>
+    </dgm:fillClrLst>
+    <dgm:linClrLst meth="repeat">
+      <a:schemeClr val="dk1">
+        <a:shade val="80000"/>
+      </a:schemeClr>
+    </dgm:linClrLst>
+    <dgm:effectClrLst/>
+    <dgm:txLinClrLst/>
+    <dgm:txFillClrLst meth="repeat">
+      <a:schemeClr val="lt1"/>
+    </dgm:txFillClrLst>
+    <dgm:txEffectClrLst/>
+  </dgm:styleLbl>
+  <dgm:styleLbl name="sibTrans2D1">
+    <dgm:fillClrLst meth="repeat">
+      <a:schemeClr val="dk1">
+        <a:tint val="60000"/>
+      </a:schemeClr>
+    </dgm:fillClrLst>
+    <dgm:linClrLst meth="repeat">
+      <a:schemeClr val="dk1">
+        <a:tint val="60000"/>
+      </a:schemeClr>
+    </dgm:linClrLst>
+    <dgm:effectClrLst/>
+    <dgm:txLinClrLst/>
+    <dgm:txFillClrLst meth="repeat">
+      <a:schemeClr val="dk1"/>
+    </dgm:txFillClrLst>
+    <dgm:txEffectClrLst/>
+  </dgm:styleLbl>
+  <dgm:styleLbl name="fgSibTrans2D1">
+    <dgm:fillClrLst meth="repeat">
+      <a:schemeClr val="dk1">
+        <a:tint val="60000"/>
+      </a:schemeClr>
+    </dgm:fillClrLst>
+    <dgm:linClrLst meth="repeat">
+      <a:schemeClr val="dk1">
+        <a:tint val="60000"/>
+      </a:schemeClr>
+    </dgm:linClrLst>
+    <dgm:effectClrLst/>
+    <dgm:txLinClrLst/>
+    <dgm:txFillClrLst meth="repeat">
+      <a:schemeClr val="dk1"/>
+    </dgm:txFillClrLst>
+    <dgm:txEffectClrLst/>
+  </dgm:styleLbl>
+  <dgm:styleLbl name="bgSibTrans2D1">
+    <dgm:fillClrLst meth="repeat">
+      <a:schemeClr val="dk1">
+        <a:tint val="60000"/>
+      </a:schemeClr>
+    </dgm:fillClrLst>
+    <dgm:linClrLst meth="repeat">
+      <a:schemeClr val="dk1">
+        <a:tint val="60000"/>
+      </a:schemeClr>
+    </dgm:linClrLst>
+    <dgm:effectClrLst/>
+    <dgm:txLinClrLst/>
+    <dgm:txFillClrLst meth="repeat">
+      <a:schemeClr val="dk1"/>
+    </dgm:txFillClrLst>
+    <dgm:txEffectClrLst/>
+  </dgm:styleLbl>
+  <dgm:styleLbl name="sibTrans1D1">
+    <dgm:fillClrLst meth="repeat">
+      <a:schemeClr val="dk1"/>
+    </dgm:fillClrLst>
+    <dgm:linClrLst meth="repeat">
+      <a:schemeClr val="dk1"/>
+    </dgm:linClrLst>
+    <dgm:effectClrLst/>
+    <dgm:txLinClrLst/>
+    <dgm:txFillClrLst meth="repeat">
+      <a:schemeClr val="tx1"/>
+    </dgm:txFillClrLst>
+    <dgm:txEffectClrLst/>
+  </dgm:styleLbl>
+  <dgm:styleLbl name="callout">
+    <dgm:fillClrLst meth="repeat">
+      <a:schemeClr val="dk1"/>
+    </dgm:fillClrLst>
+    <dgm:linClrLst meth="repeat">
+      <a:schemeClr val="dk1"/>
+    </dgm:linClrLst>
+    <dgm:effectClrLst/>
+    <dgm:txLinClrLst/>
+    <dgm:txFillClrLst meth="repeat">
+      <a:schemeClr val="tx1"/>
+    </dgm:txFillClrLst>
+    <dgm:txEffectClrLst/>
+  </dgm:styleLbl>
+  <dgm:styleLbl name="asst0">
+    <dgm:fillClrLst meth="repeat">
+      <a:schemeClr val="lt1"/>
+    </dgm:fillClrLst>
+    <dgm:linClrLst meth="repeat">
+      <a:schemeClr val="dk1">
+        <a:shade val="80000"/>
+      </a:schemeClr>
+    </dgm:linClrLst>
+    <dgm:effectClrLst/>
+    <dgm:txLinClrLst/>
+    <dgm:txFillClrLst meth="repeat">
+      <a:schemeClr val="dk1"/>
+    </dgm:txFillClrLst>
+    <dgm:txEffectClrLst/>
+  </dgm:styleLbl>
+  <dgm:styleLbl name="asst1">
+    <dgm:fillClrLst meth="repeat">
+      <a:schemeClr val="lt1"/>
+    </dgm:fillClrLst>
+    <dgm:linClrLst meth="repeat">
+      <a:schemeClr val="dk1">
+        <a:shade val="80000"/>
+      </a:schemeClr>
+    </dgm:linClrLst>
+    <dgm:effectClrLst/>
+    <dgm:txLinClrLst/>
+    <dgm:txFillClrLst meth="repeat">
+      <a:schemeClr val="dk1"/>
+    </dgm:txFillClrLst>
+    <dgm:txEffectClrLst/>
+  </dgm:styleLbl>
+  <dgm:styleLbl name="asst2">
+    <dgm:fillClrLst meth="repeat">
+      <a:schemeClr val="lt1"/>
+    </dgm:fillClrLst>
+    <dgm:linClrLst meth="repeat">
+      <a:schemeClr val="dk1">
+        <a:shade val="80000"/>
+      </a:schemeClr>
+    </dgm:linClrLst>
+    <dgm:effectClrLst/>
+    <dgm:txLinClrLst/>
+    <dgm:txFillClrLst meth="repeat">
+      <a:schemeClr val="dk1"/>
+    </dgm:txFillClrLst>
+    <dgm:txEffectClrLst/>
+  </dgm:styleLbl>
+  <dgm:styleLbl name="asst3">
+    <dgm:fillClrLst meth="repeat">
+      <a:schemeClr val="lt1"/>
+    </dgm:fillClrLst>
+    <dgm:linClrLst meth="repeat">
+      <a:schemeClr val="dk1">
+        <a:shade val="80000"/>
+      </a:schemeClr>
+    </dgm:linClrLst>
+    <dgm:effectClrLst/>
+    <dgm:txLinClrLst/>
+    <dgm:txFillClrLst meth="repeat">
+      <a:schemeClr val="dk1"/>
+    </dgm:txFillClrLst>
+    <dgm:txEffectClrLst/>
+  </dgm:styleLbl>
+  <dgm:styleLbl name="asst4">
+    <dgm:fillClrLst meth="repeat">
+      <a:schemeClr val="lt1"/>
+    </dgm:fillClrLst>
+    <dgm:linClrLst meth="repeat">
+      <a:schemeClr val="dk1">
+        <a:shade val="80000"/>
+      </a:schemeClr>
+    </dgm:linClrLst>
+    <dgm:effectClrLst/>
+    <dgm:txLinClrLst/>
+    <dgm:txFillClrLst meth="repeat">
+      <a:schemeClr val="dk1"/>
+    </dgm:txFillClrLst>
+    <dgm:txEffectClrLst/>
+  </dgm:styleLbl>
+  <dgm:styleLbl name="parChTrans2D1">
+    <dgm:fillClrLst meth="repeat">
+      <a:schemeClr val="dk1">
+        <a:tint val="60000"/>
+      </a:schemeClr>
+    </dgm:fillClrLst>
+    <dgm:linClrLst meth="repeat">
+      <a:schemeClr val="dk1">
+        <a:tint val="60000"/>
+      </a:schemeClr>
+    </dgm:linClrLst>
+    <dgm:effectClrLst/>
+    <dgm:txLinClrLst/>
+    <dgm:txFillClrLst/>
+    <dgm:txEffectClrLst/>
+  </dgm:styleLbl>
+  <dgm:styleLbl name="parChTrans2D2">
+    <dgm:fillClrLst meth="repeat">
+      <a:schemeClr val="dk1"/>
+    </dgm:fillClrLst>
+    <dgm:linClrLst meth="repeat">
+      <a:schemeClr val="dk1"/>
+    </dgm:linClrLst>
+    <dgm:effectClrLst/>
+    <dgm:txLinClrLst/>
+    <dgm:txFillClrLst/>
+    <dgm:txEffectClrLst/>
+  </dgm:styleLbl>
+  <dgm:styleLbl name="parChTrans2D3">
+    <dgm:fillClrLst meth="repeat">
+      <a:schemeClr val="dk1"/>
+    </dgm:fillClrLst>
+    <dgm:linClrLst meth="repeat">
+      <a:schemeClr val="dk1"/>
+    </dgm:linClrLst>
+    <dgm:effectClrLst/>
+    <dgm:txLinClrLst/>
+    <dgm:txFillClrLst/>
+    <dgm:txEffectClrLst/>
+  </dgm:styleLbl>
+  <dgm:styleLbl name="parChTrans2D4">
+    <dgm:fillClrLst meth="repeat">
+      <a:schemeClr val="dk1"/>
+    </dgm:fillClrLst>
+    <dgm:linClrLst meth="repeat">
+      <a:schemeClr val="dk1"/>
+    </dgm:linClrLst>
+    <dgm:effectClrLst/>
+    <dgm:txLinClrLst/>
+    <dgm:txFillClrLst meth="repeat">
+      <a:schemeClr val="lt1"/>
+    </dgm:txFillClrLst>
+    <dgm:txEffectClrLst/>
+  </dgm:styleLbl>
+  <dgm:styleLbl name="parChTrans1D1">
+    <dgm:fillClrLst meth="repeat">
+      <a:schemeClr val="dk1"/>
+    </dgm:fillClrLst>
+    <dgm:linClrLst meth="repeat">
+      <a:schemeClr val="dk1">
+        <a:shade val="60000"/>
+      </a:schemeClr>
+    </dgm:linClrLst>
+    <dgm:effectClrLst/>
+    <dgm:txLinClrLst/>
+    <dgm:txFillClrLst meth="repeat">
+      <a:schemeClr val="tx1"/>
+    </dgm:txFillClrLst>
+    <dgm:txEffectClrLst/>
+  </dgm:styleLbl>
+  <dgm:styleLbl name="parChTrans1D2">
+    <dgm:fillClrLst meth="repeat">
+      <a:schemeClr val="dk1"/>
+    </dgm:fillClrLst>
+    <dgm:linClrLst meth="repeat">
+      <a:schemeClr val="dk1">
+        <a:shade val="60000"/>
+      </a:schemeClr>
+    </dgm:linClrLst>
+    <dgm:effectClrLst/>
+    <dgm:txLinClrLst/>
+    <dgm:txFillClrLst meth="repeat">
+      <a:schemeClr val="tx1"/>
+    </dgm:txFillClrLst>
+    <dgm:txEffectClrLst/>
+  </dgm:styleLbl>
+  <dgm:styleLbl name="parChTrans1D3">
+    <dgm:fillClrLst meth="repeat">
+      <a:schemeClr val="dk1"/>
+    </dgm:fillClrLst>
+    <dgm:linClrLst meth="repeat">
+      <a:schemeClr val="dk1">
+        <a:shade val="80000"/>
+      </a:schemeClr>
+    </dgm:linClrLst>
+    <dgm:effectClrLst/>
+    <dgm:txLinClrLst/>
+    <dgm:txFillClrLst meth="repeat">
+      <a:schemeClr val="tx1"/>
+    </dgm:txFillClrLst>
+    <dgm:txEffectClrLst/>
+  </dgm:styleLbl>
+  <dgm:styleLbl name="parChTrans1D4">
+    <dgm:fillClrLst meth="repeat">
+      <a:schemeClr val="dk1"/>
+    </dgm:fillClrLst>
+    <dgm:linClrLst meth="repeat">
+      <a:schemeClr val="dk1">
+        <a:shade val="80000"/>
+      </a:schemeClr>
+    </dgm:linClrLst>
+    <dgm:effectClrLst/>
+    <dgm:txLinClrLst/>
+    <dgm:txFillClrLst meth="repeat">
+      <a:schemeClr val="tx1"/>
+    </dgm:txFillClrLst>
+    <dgm:txEffectClrLst/>
+  </dgm:styleLbl>
+  <dgm:styleLbl name="fgAcc1">
+    <dgm:fillClrLst meth="repeat">
+      <a:schemeClr val="dk1">
+        <a:alpha val="90000"/>
+        <a:tint val="40000"/>
+      </a:schemeClr>
+    </dgm:fillClrLst>
+    <dgm:linClrLst meth="repeat">
+      <a:schemeClr val="dk1"/>
+    </dgm:linClrLst>
+    <dgm:effectClrLst/>
+    <dgm:txLinClrLst/>
+    <dgm:txFillClrLst meth="repeat">
+      <a:schemeClr val="dk1"/>
+    </dgm:txFillClrLst>
+    <dgm:txEffectClrLst/>
+  </dgm:styleLbl>
+  <dgm:styleLbl name="conFgAcc1">
+    <dgm:fillClrLst meth="repeat">
+      <a:schemeClr val="dk1">
+        <a:alpha val="90000"/>
+        <a:tint val="40000"/>
+      </a:schemeClr>
+    </dgm:fillClrLst>
+    <dgm:linClrLst meth="repeat">
+      <a:schemeClr val="dk1"/>
+    </dgm:linClrLst>
+    <dgm:effectClrLst/>
+    <dgm:txLinClrLst/>
+    <dgm:txFillClrLst meth="repeat">
+      <a:schemeClr val="dk1"/>
+    </dgm:txFillClrLst>
+    <dgm:txEffectClrLst/>
+  </dgm:styleLbl>
+  <dgm:styleLbl name="alignAcc1">
+    <dgm:fillClrLst meth="repeat">
+      <a:schemeClr val="dk1">
+        <a:alpha val="90000"/>
+        <a:tint val="40000"/>
+      </a:schemeClr>
+    </dgm:fillClrLst>
+    <dgm:linClrLst meth="repeat">
+      <a:schemeClr val="dk1"/>
+    </dgm:linClrLst>
+    <dgm:effectClrLst/>
+    <dgm:txLinClrLst/>
+    <dgm:txFillClrLst meth="repeat">
+      <a:schemeClr val="dk1"/>
+    </dgm:txFillClrLst>
+    <dgm:txEffectClrLst/>
+  </dgm:styleLbl>
+  <dgm:styleLbl name="trAlignAcc1">
+    <dgm:fillClrLst meth="repeat">
+      <a:schemeClr val="dk1">
+        <a:alpha val="40000"/>
+        <a:tint val="40000"/>
+      </a:schemeClr>
+    </dgm:fillClrLst>
+    <dgm:linClrLst meth="repeat">
+      <a:schemeClr val="dk1"/>
+    </dgm:linClrLst>
+    <dgm:effectClrLst/>
+    <dgm:txLinClrLst/>
+    <dgm:txFillClrLst meth="repeat">
+      <a:schemeClr val="dk1"/>
+    </dgm:txFillClrLst>
+    <dgm:txEffectClrLst/>
+  </dgm:styleLbl>
+  <dgm:styleLbl name="bgAcc1">
+    <dgm:fillClrLst meth="repeat">
+      <a:schemeClr val="dk1">
+        <a:alpha val="90000"/>
+        <a:tint val="40000"/>
+      </a:schemeClr>
+    </dgm:fillClrLst>
+    <dgm:linClrLst meth="repeat">
+      <a:schemeClr val="dk1"/>
+    </dgm:linClrLst>
+    <dgm:effectClrLst/>
+    <dgm:txLinClrLst/>
+    <dgm:txFillClrLst meth="repeat">
+      <a:schemeClr val="dk1"/>
+    </dgm:txFillClrLst>
+    <dgm:txEffectClrLst/>
+  </dgm:styleLbl>
+  <dgm:styleLbl name="solidFgAcc1">
+    <dgm:fillClrLst meth="repeat">
+      <a:schemeClr val="lt1"/>
+    </dgm:fillClrLst>
+    <dgm:linClrLst meth="repeat">
+      <a:schemeClr val="dk1"/>
+    </dgm:linClrLst>
+    <dgm:effectClrLst/>
+    <dgm:txLinClrLst/>
+    <dgm:txFillClrLst meth="repeat">
+      <a:schemeClr val="dk1"/>
+    </dgm:txFillClrLst>
+    <dgm:txEffectClrLst/>
+  </dgm:styleLbl>
+  <dgm:styleLbl name="solidAlignAcc1">
+    <dgm:fillClrLst meth="repeat">
+      <a:schemeClr val="lt1"/>
+    </dgm:fillClrLst>
+    <dgm:linClrLst meth="repeat">
+      <a:schemeClr val="dk1"/>
+    </dgm:linClrLst>
+    <dgm:effectClrLst/>
+    <dgm:txLinClrLst/>
+    <dgm:txFillClrLst meth="repeat">
+      <a:schemeClr val="dk1"/>
+    </dgm:txFillClrLst>
+    <dgm:txEffectClrLst/>
+  </dgm:styleLbl>
+  <dgm:styleLbl name="solidBgAcc1">
+    <dgm:fillClrLst meth="repeat">
+      <a:schemeClr val="lt1"/>
+    </dgm:fillClrLst>
+    <dgm:linClrLst meth="repeat">
+      <a:schemeClr val="dk1"/>
+    </dgm:linClrLst>
+    <dgm:effectClrLst/>
+    <dgm:txLinClrLst/>
+    <dgm:txFillClrLst meth="repeat">
+      <a:schemeClr val="dk1"/>
+    </dgm:txFillClrLst>
+    <dgm:txEffectClrLst/>
+  </dgm:styleLbl>
+  <dgm:styleLbl name="fgAccFollowNode1">
+    <dgm:fillClrLst meth="repeat">
+      <a:schemeClr val="lt1">
+        <a:alpha val="90000"/>
+        <a:tint val="40000"/>
+      </a:schemeClr>
+    </dgm:fillClrLst>
+    <dgm:linClrLst meth="repeat">
+      <a:schemeClr val="dk1">
+        <a:alpha val="90000"/>
+      </a:schemeClr>
+    </dgm:linClrLst>
+    <dgm:effectClrLst/>
+    <dgm:txLinClrLst/>
+    <dgm:txFillClrLst meth="repeat">
+      <a:schemeClr val="dk1"/>
+    </dgm:txFillClrLst>
+    <dgm:txEffectClrLst/>
+  </dgm:styleLbl>
+  <dgm:styleLbl name="alignAccFollowNode1">
+    <dgm:fillClrLst meth="repeat">
+      <a:schemeClr val="lt1">
+        <a:alpha val="90000"/>
+        <a:tint val="40000"/>
+      </a:schemeClr>
+    </dgm:fillClrLst>
+    <dgm:linClrLst meth="repeat">
+      <a:schemeClr val="dk1">
+        <a:alpha val="90000"/>
+      </a:schemeClr>
+    </dgm:linClrLst>
+    <dgm:effectClrLst/>
+    <dgm:txLinClrLst/>
+    <dgm:txFillClrLst meth="repeat">
+      <a:schemeClr val="dk1"/>
+    </dgm:txFillClrLst>
+    <dgm:txEffectClrLst/>
+  </dgm:styleLbl>
+  <dgm:styleLbl name="bgAccFollowNode1">
+    <dgm:fillClrLst meth="repeat">
+      <a:schemeClr val="lt1">
+        <a:alpha val="90000"/>
+        <a:tint val="40000"/>
+      </a:schemeClr>
+    </dgm:fillClrLst>
+    <dgm:linClrLst meth="repeat">
+      <a:schemeClr val="dk1">
+        <a:alpha val="90000"/>
+      </a:schemeClr>
+    </dgm:linClrLst>
+    <dgm:effectClrLst/>
+    <dgm:txLinClrLst/>
+    <dgm:txFillClrLst meth="repeat">
+      <a:schemeClr val="dk1"/>
+    </dgm:txFillClrLst>
+    <dgm:txEffectClrLst/>
+  </dgm:styleLbl>
+  <dgm:styleLbl name="fgAcc0">
+    <dgm:fillClrLst meth="repeat">
+      <a:schemeClr val="dk1">
+        <a:alpha val="90000"/>
+        <a:tint val="40000"/>
+      </a:schemeClr>
+    </dgm:fillClrLst>
+    <dgm:linClrLst meth="repeat">
+      <a:schemeClr val="dk1"/>
+    </dgm:linClrLst>
+    <dgm:effectClrLst/>
+    <dgm:txLinClrLst/>
+    <dgm:txFillClrLst meth="repeat">
+      <a:schemeClr val="dk1"/>
+    </dgm:txFillClrLst>
+    <dgm:txEffectClrLst/>
+  </dgm:styleLbl>
+  <dgm:styleLbl name="fgAcc2">
+    <dgm:fillClrLst meth="repeat">
+      <a:schemeClr val="dk1">
+        <a:alpha val="90000"/>
+        <a:tint val="40000"/>
+      </a:schemeClr>
+    </dgm:fillClrLst>
+    <dgm:linClrLst meth="repeat">
+      <a:schemeClr val="dk1"/>
+    </dgm:linClrLst>
+    <dgm:effectClrLst/>
+    <dgm:txLinClrLst/>
+    <dgm:txFillClrLst meth="repeat">
+      <a:schemeClr val="dk1"/>
+    </dgm:txFillClrLst>
+    <dgm:txEffectClrLst/>
+  </dgm:styleLbl>
+  <dgm:styleLbl name="fgAcc3">
+    <dgm:fillClrLst meth="repeat">
+      <a:schemeClr val="dk1">
+        <a:alpha val="90000"/>
+        <a:tint val="40000"/>
+      </a:schemeClr>
+    </dgm:fillClrLst>
+    <dgm:linClrLst meth="repeat">
+      <a:schemeClr val="dk1"/>
+    </dgm:linClrLst>
+    <dgm:effectClrLst/>
+    <dgm:txLinClrLst/>
+    <dgm:txFillClrLst meth="repeat">
+      <a:schemeClr val="dk1"/>
+    </dgm:txFillClrLst>
+    <dgm:txEffectClrLst/>
+  </dgm:styleLbl>
+  <dgm:styleLbl name="fgAcc4">
+    <dgm:fillClrLst meth="repeat">
+      <a:schemeClr val="dk1">
+        <a:alpha val="90000"/>
+        <a:tint val="40000"/>
+      </a:schemeClr>
+    </dgm:fillClrLst>
+    <dgm:linClrLst meth="repeat">
+      <a:schemeClr val="dk1"/>
+    </dgm:linClrLst>
+    <dgm:effectClrLst/>
+    <dgm:txLinClrLst/>
+    <dgm:txFillClrLst meth="repeat">
+      <a:schemeClr val="dk1"/>
+    </dgm:txFillClrLst>
+    <dgm:txEffectClrLst/>
+  </dgm:styleLbl>
+  <dgm:styleLbl name="bgShp">
+    <dgm:fillClrLst meth="repeat">
+      <a:schemeClr val="dk1">
+        <a:tint val="40000"/>
+      </a:schemeClr>
+    </dgm:fillClrLst>
+    <dgm:linClrLst meth="repeat">
+      <a:schemeClr val="dk1"/>
+    </dgm:linClrLst>
+    <dgm:effectClrLst/>
+    <dgm:txLinClrLst/>
+    <dgm:txFillClrLst meth="repeat">
+      <a:schemeClr val="dk1"/>
+    </dgm:txFillClrLst>
+    <dgm:txEffectClrLst/>
+  </dgm:styleLbl>
+  <dgm:styleLbl name="dkBgShp">
+    <dgm:fillClrLst meth="repeat">
+      <a:schemeClr val="dk1">
+        <a:shade val="80000"/>
+      </a:schemeClr>
+    </dgm:fillClrLst>
+    <dgm:linClrLst meth="repeat">
+      <a:schemeClr val="dk1"/>
+    </dgm:linClrLst>
+    <dgm:effectClrLst/>
+    <dgm:txLinClrLst/>
+    <dgm:txFillClrLst meth="repeat">
+      <a:schemeClr val="lt1"/>
+    </dgm:txFillClrLst>
+    <dgm:txEffectClrLst/>
+  </dgm:styleLbl>
+  <dgm:styleLbl name="trBgShp">
+    <dgm:fillClrLst meth="repeat">
+      <a:schemeClr val="dk1">
+        <a:tint val="50000"/>
+        <a:alpha val="40000"/>
+      </a:schemeClr>
+    </dgm:fillClrLst>
+    <dgm:linClrLst meth="repeat">
+      <a:schemeClr val="dk1"/>
+    </dgm:linClrLst>
+    <dgm:effectClrLst/>
+    <dgm:txLinClrLst/>
+    <dgm:txFillClrLst meth="repeat">
+      <a:schemeClr val="lt1"/>
+    </dgm:txFillClrLst>
+    <dgm:txEffectClrLst/>
+  </dgm:styleLbl>
+  <dgm:styleLbl name="fgShp">
+    <dgm:fillClrLst meth="repeat">
+      <a:schemeClr val="dk1">
+        <a:tint val="60000"/>
+      </a:schemeClr>
+    </dgm:fillClrLst>
+    <dgm:linClrLst meth="repeat">
+      <a:schemeClr val="lt1"/>
+    </dgm:linClrLst>
+    <dgm:effectClrLst/>
+    <dgm:txLinClrLst/>
+    <dgm:txFillClrLst meth="repeat">
+      <a:schemeClr val="dk1"/>
+    </dgm:txFillClrLst>
+    <dgm:txEffectClrLst/>
+  </dgm:styleLbl>
+  <dgm:styleLbl name="revTx">
+    <dgm:fillClrLst meth="repeat">
+      <a:schemeClr val="lt1">
+        <a:alpha val="0"/>
+      </a:schemeClr>
+    </dgm:fillClrLst>
+    <dgm:linClrLst meth="repeat">
+      <a:schemeClr val="dk1">
+        <a:alpha val="0"/>
+      </a:schemeClr>
+    </dgm:linClrLst>
+    <dgm:effectClrLst/>
+    <dgm:txLinClrLst/>
+    <dgm:txFillClrLst meth="repeat">
+      <a:schemeClr val="tx1"/>
+    </dgm:txFillClrLst>
+    <dgm:txEffectClrLst/>
+  </dgm:styleLbl>
+</dgm:colorsDef>
+</file>
+
+<file path=ppt/diagrams/data1.xml><?xml version="1.0" encoding="utf-8"?>
+<dgm:dataModel xmlns:dgm="http://schemas.openxmlformats.org/drawingml/2006/diagram" xmlns:a="http://schemas.openxmlformats.org/drawingml/2006/main">
+  <dgm:ptLst>
+    <dgm:pt modelId="{A128F0BD-DF9A-4BE9-A6A8-6C4754FCABDA}" type="doc">
+      <dgm:prSet loTypeId="urn:microsoft.com/office/officeart/2005/8/layout/cycle2" loCatId="cycle" qsTypeId="urn:microsoft.com/office/officeart/2005/8/quickstyle/simple1" qsCatId="simple" csTypeId="urn:microsoft.com/office/officeart/2005/8/colors/accent0_1" csCatId="mainScheme" phldr="0"/>
+      <dgm:spPr/>
+      <dgm:t>
+        <a:bodyPr/>
+        <a:lstStyle/>
+        <a:p>
+          <a:endParaRPr lang="zh-CN" altLang="en-US"/>
+        </a:p>
+      </dgm:t>
+    </dgm:pt>
+    <dgm:pt modelId="{FA71CF4A-4B11-49C3-8552-3F6B6E5B19A5}">
+      <dgm:prSet phldrT="[文本]" phldr="1"/>
+      <dgm:spPr/>
+      <dgm:t>
+        <a:bodyPr/>
+        <a:lstStyle/>
+        <a:p>
+          <a:endParaRPr lang="zh-CN" altLang="en-US"/>
+        </a:p>
+      </dgm:t>
+    </dgm:pt>
+    <dgm:pt modelId="{4024D651-5B90-4CE1-BAD7-8A545DFE3AFD}" type="parTrans" cxnId="{0AB98623-DF7D-48BE-BCB6-525066F06F6E}">
+      <dgm:prSet/>
+      <dgm:spPr/>
+      <dgm:t>
+        <a:bodyPr/>
+        <a:lstStyle/>
+        <a:p>
+          <a:endParaRPr lang="zh-CN" altLang="en-US"/>
+        </a:p>
+      </dgm:t>
+    </dgm:pt>
+    <dgm:pt modelId="{4D900DEF-D16D-4B79-A224-033982676A84}" type="sibTrans" cxnId="{0AB98623-DF7D-48BE-BCB6-525066F06F6E}">
+      <dgm:prSet/>
+      <dgm:spPr/>
+      <dgm:t>
+        <a:bodyPr/>
+        <a:lstStyle/>
+        <a:p>
+          <a:endParaRPr lang="zh-CN" altLang="en-US"/>
+        </a:p>
+      </dgm:t>
+    </dgm:pt>
+    <dgm:pt modelId="{B9D1CD18-C0CD-4CE2-B3EB-17CB254543C3}">
+      <dgm:prSet phldrT="[文本]" phldr="1"/>
+      <dgm:spPr/>
+      <dgm:t>
+        <a:bodyPr/>
+        <a:lstStyle/>
+        <a:p>
+          <a:endParaRPr lang="zh-CN" altLang="en-US"/>
+        </a:p>
+      </dgm:t>
+    </dgm:pt>
+    <dgm:pt modelId="{A5753D39-7978-4CEB-B6DE-3BA7147367AA}" type="parTrans" cxnId="{73874220-CB27-419C-B883-A80C1DC54314}">
+      <dgm:prSet/>
+      <dgm:spPr/>
+      <dgm:t>
+        <a:bodyPr/>
+        <a:lstStyle/>
+        <a:p>
+          <a:endParaRPr lang="zh-CN" altLang="en-US"/>
+        </a:p>
+      </dgm:t>
+    </dgm:pt>
+    <dgm:pt modelId="{0173A0E4-2970-45BD-A922-296E968BEF38}" type="sibTrans" cxnId="{73874220-CB27-419C-B883-A80C1DC54314}">
+      <dgm:prSet/>
+      <dgm:spPr/>
+      <dgm:t>
+        <a:bodyPr/>
+        <a:lstStyle/>
+        <a:p>
+          <a:endParaRPr lang="zh-CN" altLang="en-US"/>
+        </a:p>
+      </dgm:t>
+    </dgm:pt>
+    <dgm:pt modelId="{BF35D190-A110-491B-B323-9435A8FDC80D}">
+      <dgm:prSet phldrT="[文本]" phldr="1"/>
+      <dgm:spPr/>
+      <dgm:t>
+        <a:bodyPr/>
+        <a:lstStyle/>
+        <a:p>
+          <a:endParaRPr lang="zh-CN" altLang="en-US"/>
+        </a:p>
+      </dgm:t>
+    </dgm:pt>
+    <dgm:pt modelId="{FD6D3DEB-2F0B-4721-A2AF-AE14C5A97346}" type="parTrans" cxnId="{B4161E1D-0DEC-466D-9881-0DFFBAC97180}">
+      <dgm:prSet/>
+      <dgm:spPr/>
+      <dgm:t>
+        <a:bodyPr/>
+        <a:lstStyle/>
+        <a:p>
+          <a:endParaRPr lang="zh-CN" altLang="en-US"/>
+        </a:p>
+      </dgm:t>
+    </dgm:pt>
+    <dgm:pt modelId="{38F8DD57-7454-4334-BBFA-B1B2ED12EB62}" type="sibTrans" cxnId="{B4161E1D-0DEC-466D-9881-0DFFBAC97180}">
+      <dgm:prSet/>
+      <dgm:spPr/>
+      <dgm:t>
+        <a:bodyPr/>
+        <a:lstStyle/>
+        <a:p>
+          <a:endParaRPr lang="zh-CN" altLang="en-US"/>
+        </a:p>
+      </dgm:t>
+    </dgm:pt>
+    <dgm:pt modelId="{D1CE2A32-EC64-4E44-BD3C-C22C54BFC1B6}">
+      <dgm:prSet phldrT="[文本]" phldr="1"/>
+      <dgm:spPr/>
+      <dgm:t>
+        <a:bodyPr/>
+        <a:lstStyle/>
+        <a:p>
+          <a:endParaRPr lang="zh-CN" altLang="en-US"/>
+        </a:p>
+      </dgm:t>
+    </dgm:pt>
+    <dgm:pt modelId="{8985A1AF-D973-4228-A8EE-56B610EAF48B}" type="parTrans" cxnId="{DEB3BB94-2958-4DC3-A53A-FF5A08B558B3}">
+      <dgm:prSet/>
+      <dgm:spPr/>
+      <dgm:t>
+        <a:bodyPr/>
+        <a:lstStyle/>
+        <a:p>
+          <a:endParaRPr lang="zh-CN" altLang="en-US"/>
+        </a:p>
+      </dgm:t>
+    </dgm:pt>
+    <dgm:pt modelId="{9FA9C300-FCBA-453A-AB34-3EF865E7390C}" type="sibTrans" cxnId="{DEB3BB94-2958-4DC3-A53A-FF5A08B558B3}">
+      <dgm:prSet/>
+      <dgm:spPr/>
+      <dgm:t>
+        <a:bodyPr/>
+        <a:lstStyle/>
+        <a:p>
+          <a:endParaRPr lang="zh-CN" altLang="en-US"/>
+        </a:p>
+      </dgm:t>
+    </dgm:pt>
+    <dgm:pt modelId="{EFAF03D5-A233-4C76-9B90-24B49649ACF5}">
+      <dgm:prSet phldrT="[文本]" phldr="1"/>
+      <dgm:spPr/>
+      <dgm:t>
+        <a:bodyPr/>
+        <a:lstStyle/>
+        <a:p>
+          <a:endParaRPr lang="zh-CN" altLang="en-US" dirty="0"/>
+        </a:p>
+      </dgm:t>
+    </dgm:pt>
+    <dgm:pt modelId="{BC9D71E3-0CDB-4A3A-B7A7-0F91F98FE251}" type="sibTrans" cxnId="{83B29E57-2FF2-4C36-9EA3-748D871ADD95}">
+      <dgm:prSet/>
+      <dgm:spPr/>
+      <dgm:t>
+        <a:bodyPr/>
+        <a:lstStyle/>
+        <a:p>
+          <a:endParaRPr lang="zh-CN" altLang="en-US"/>
+        </a:p>
+      </dgm:t>
+    </dgm:pt>
+    <dgm:pt modelId="{FFFF8408-B268-4234-BC9D-07C7306BD323}" type="parTrans" cxnId="{83B29E57-2FF2-4C36-9EA3-748D871ADD95}">
+      <dgm:prSet/>
+      <dgm:spPr/>
+      <dgm:t>
+        <a:bodyPr/>
+        <a:lstStyle/>
+        <a:p>
+          <a:endParaRPr lang="zh-CN" altLang="en-US"/>
+        </a:p>
+      </dgm:t>
+    </dgm:pt>
+    <dgm:pt modelId="{1BAB9045-83AB-4518-BC90-032A2EEA33AF}" type="pres">
+      <dgm:prSet presAssocID="{A128F0BD-DF9A-4BE9-A6A8-6C4754FCABDA}" presName="cycle" presStyleCnt="0">
+        <dgm:presLayoutVars>
+          <dgm:dir/>
+          <dgm:resizeHandles val="exact"/>
+        </dgm:presLayoutVars>
+      </dgm:prSet>
+      <dgm:spPr/>
+    </dgm:pt>
+    <dgm:pt modelId="{FEF06E72-7C87-4202-890C-345EC1D9F44C}" type="pres">
+      <dgm:prSet presAssocID="{EFAF03D5-A233-4C76-9B90-24B49649ACF5}" presName="node" presStyleLbl="node1" presStyleIdx="0" presStyleCnt="5">
+        <dgm:presLayoutVars>
+          <dgm:bulletEnabled val="1"/>
+        </dgm:presLayoutVars>
+      </dgm:prSet>
+      <dgm:spPr/>
+      <dgm:t>
+        <a:bodyPr/>
+        <a:lstStyle/>
+        <a:p>
+          <a:endParaRPr lang="zh-CN" altLang="en-US"/>
+        </a:p>
+      </dgm:t>
+    </dgm:pt>
+    <dgm:pt modelId="{055CB64B-802B-45D3-8DF6-798EF262280D}" type="pres">
+      <dgm:prSet presAssocID="{BC9D71E3-0CDB-4A3A-B7A7-0F91F98FE251}" presName="sibTrans" presStyleLbl="sibTrans2D1" presStyleIdx="0" presStyleCnt="5"/>
+      <dgm:spPr/>
+    </dgm:pt>
+    <dgm:pt modelId="{E9B7BEA1-3C66-47D9-9015-5CB2C3DF2CDC}" type="pres">
+      <dgm:prSet presAssocID="{BC9D71E3-0CDB-4A3A-B7A7-0F91F98FE251}" presName="connectorText" presStyleLbl="sibTrans2D1" presStyleIdx="0" presStyleCnt="5"/>
+      <dgm:spPr/>
+    </dgm:pt>
+    <dgm:pt modelId="{B99A717E-6875-46C4-93BD-02F76F4C7222}" type="pres">
+      <dgm:prSet presAssocID="{FA71CF4A-4B11-49C3-8552-3F6B6E5B19A5}" presName="node" presStyleLbl="node1" presStyleIdx="1" presStyleCnt="5">
+        <dgm:presLayoutVars>
+          <dgm:bulletEnabled val="1"/>
+        </dgm:presLayoutVars>
+      </dgm:prSet>
+      <dgm:spPr/>
+    </dgm:pt>
+    <dgm:pt modelId="{A3B8EF27-070F-41BB-AB16-AA20761005A1}" type="pres">
+      <dgm:prSet presAssocID="{4D900DEF-D16D-4B79-A224-033982676A84}" presName="sibTrans" presStyleLbl="sibTrans2D1" presStyleIdx="1" presStyleCnt="5"/>
+      <dgm:spPr/>
+    </dgm:pt>
+    <dgm:pt modelId="{727D7562-439E-49ED-A028-4E7011E442FF}" type="pres">
+      <dgm:prSet presAssocID="{4D900DEF-D16D-4B79-A224-033982676A84}" presName="connectorText" presStyleLbl="sibTrans2D1" presStyleIdx="1" presStyleCnt="5"/>
+      <dgm:spPr/>
+    </dgm:pt>
+    <dgm:pt modelId="{134C2103-362F-48D4-96DA-BDE499CBC320}" type="pres">
+      <dgm:prSet presAssocID="{B9D1CD18-C0CD-4CE2-B3EB-17CB254543C3}" presName="node" presStyleLbl="node1" presStyleIdx="2" presStyleCnt="5">
+        <dgm:presLayoutVars>
+          <dgm:bulletEnabled val="1"/>
+        </dgm:presLayoutVars>
+      </dgm:prSet>
+      <dgm:spPr/>
+    </dgm:pt>
+    <dgm:pt modelId="{A544EBAA-22E2-4148-9763-9BD8EDE01FA1}" type="pres">
+      <dgm:prSet presAssocID="{0173A0E4-2970-45BD-A922-296E968BEF38}" presName="sibTrans" presStyleLbl="sibTrans2D1" presStyleIdx="2" presStyleCnt="5"/>
+      <dgm:spPr/>
+    </dgm:pt>
+    <dgm:pt modelId="{3ED50FBC-50B3-47E6-BC24-CBD71A358D74}" type="pres">
+      <dgm:prSet presAssocID="{0173A0E4-2970-45BD-A922-296E968BEF38}" presName="connectorText" presStyleLbl="sibTrans2D1" presStyleIdx="2" presStyleCnt="5"/>
+      <dgm:spPr/>
+    </dgm:pt>
+    <dgm:pt modelId="{CCCE5FE4-A079-4A90-B5D9-DC004E46B293}" type="pres">
+      <dgm:prSet presAssocID="{BF35D190-A110-491B-B323-9435A8FDC80D}" presName="node" presStyleLbl="node1" presStyleIdx="3" presStyleCnt="5">
+        <dgm:presLayoutVars>
+          <dgm:bulletEnabled val="1"/>
+        </dgm:presLayoutVars>
+      </dgm:prSet>
+      <dgm:spPr/>
+    </dgm:pt>
+    <dgm:pt modelId="{231C9A01-8E86-4594-8128-CA1A309B1944}" type="pres">
+      <dgm:prSet presAssocID="{38F8DD57-7454-4334-BBFA-B1B2ED12EB62}" presName="sibTrans" presStyleLbl="sibTrans2D1" presStyleIdx="3" presStyleCnt="5"/>
+      <dgm:spPr/>
+    </dgm:pt>
+    <dgm:pt modelId="{9E1B741C-8181-437D-9E3E-9993C461882A}" type="pres">
+      <dgm:prSet presAssocID="{38F8DD57-7454-4334-BBFA-B1B2ED12EB62}" presName="connectorText" presStyleLbl="sibTrans2D1" presStyleIdx="3" presStyleCnt="5"/>
+      <dgm:spPr/>
+    </dgm:pt>
+    <dgm:pt modelId="{5C05611F-2FD6-4B23-8855-D8C95A3F0102}" type="pres">
+      <dgm:prSet presAssocID="{D1CE2A32-EC64-4E44-BD3C-C22C54BFC1B6}" presName="node" presStyleLbl="node1" presStyleIdx="4" presStyleCnt="5">
+        <dgm:presLayoutVars>
+          <dgm:bulletEnabled val="1"/>
+        </dgm:presLayoutVars>
+      </dgm:prSet>
+      <dgm:spPr/>
+    </dgm:pt>
+    <dgm:pt modelId="{B14F98F5-9C5B-4F53-A26B-4D903D14BB70}" type="pres">
+      <dgm:prSet presAssocID="{9FA9C300-FCBA-453A-AB34-3EF865E7390C}" presName="sibTrans" presStyleLbl="sibTrans2D1" presStyleIdx="4" presStyleCnt="5"/>
+      <dgm:spPr/>
+    </dgm:pt>
+    <dgm:pt modelId="{1E529B08-B3C9-4635-BABE-34B564A7237E}" type="pres">
+      <dgm:prSet presAssocID="{9FA9C300-FCBA-453A-AB34-3EF865E7390C}" presName="connectorText" presStyleLbl="sibTrans2D1" presStyleIdx="4" presStyleCnt="5"/>
+      <dgm:spPr/>
+    </dgm:pt>
+  </dgm:ptLst>
+  <dgm:cxnLst>
+    <dgm:cxn modelId="{E5F7B85E-3C60-40DB-BF32-88D2EB02D2E6}" type="presOf" srcId="{BC9D71E3-0CDB-4A3A-B7A7-0F91F98FE251}" destId="{E9B7BEA1-3C66-47D9-9015-5CB2C3DF2CDC}" srcOrd="1" destOrd="0" presId="urn:microsoft.com/office/officeart/2005/8/layout/cycle2"/>
+    <dgm:cxn modelId="{712678DC-5F77-4CC3-B04D-D6FA6056AECD}" type="presOf" srcId="{FA71CF4A-4B11-49C3-8552-3F6B6E5B19A5}" destId="{B99A717E-6875-46C4-93BD-02F76F4C7222}" srcOrd="0" destOrd="0" presId="urn:microsoft.com/office/officeart/2005/8/layout/cycle2"/>
+    <dgm:cxn modelId="{DEB3BB94-2958-4DC3-A53A-FF5A08B558B3}" srcId="{A128F0BD-DF9A-4BE9-A6A8-6C4754FCABDA}" destId="{D1CE2A32-EC64-4E44-BD3C-C22C54BFC1B6}" srcOrd="4" destOrd="0" parTransId="{8985A1AF-D973-4228-A8EE-56B610EAF48B}" sibTransId="{9FA9C300-FCBA-453A-AB34-3EF865E7390C}"/>
+    <dgm:cxn modelId="{4CF074E4-3D78-466B-9918-447FBB90B486}" type="presOf" srcId="{38F8DD57-7454-4334-BBFA-B1B2ED12EB62}" destId="{231C9A01-8E86-4594-8128-CA1A309B1944}" srcOrd="0" destOrd="0" presId="urn:microsoft.com/office/officeart/2005/8/layout/cycle2"/>
+    <dgm:cxn modelId="{B8463A6D-145E-4069-A91F-68F086FA2AC9}" type="presOf" srcId="{0173A0E4-2970-45BD-A922-296E968BEF38}" destId="{A544EBAA-22E2-4148-9763-9BD8EDE01FA1}" srcOrd="0" destOrd="0" presId="urn:microsoft.com/office/officeart/2005/8/layout/cycle2"/>
+    <dgm:cxn modelId="{BD915119-0DC7-4B87-96EA-4F1A63CA0C85}" type="presOf" srcId="{4D900DEF-D16D-4B79-A224-033982676A84}" destId="{727D7562-439E-49ED-A028-4E7011E442FF}" srcOrd="1" destOrd="0" presId="urn:microsoft.com/office/officeart/2005/8/layout/cycle2"/>
+    <dgm:cxn modelId="{0EBDB4EE-E5B9-4EB0-8F16-FE5756E6D133}" type="presOf" srcId="{BF35D190-A110-491B-B323-9435A8FDC80D}" destId="{CCCE5FE4-A079-4A90-B5D9-DC004E46B293}" srcOrd="0" destOrd="0" presId="urn:microsoft.com/office/officeart/2005/8/layout/cycle2"/>
+    <dgm:cxn modelId="{256DB814-F9A0-464C-820C-9BD5CA521B5E}" type="presOf" srcId="{9FA9C300-FCBA-453A-AB34-3EF865E7390C}" destId="{1E529B08-B3C9-4635-BABE-34B564A7237E}" srcOrd="1" destOrd="0" presId="urn:microsoft.com/office/officeart/2005/8/layout/cycle2"/>
+    <dgm:cxn modelId="{4A51B046-94DD-4E8D-A488-0D896F537C8E}" type="presOf" srcId="{B9D1CD18-C0CD-4CE2-B3EB-17CB254543C3}" destId="{134C2103-362F-48D4-96DA-BDE499CBC320}" srcOrd="0" destOrd="0" presId="urn:microsoft.com/office/officeart/2005/8/layout/cycle2"/>
+    <dgm:cxn modelId="{52460ECD-4B38-4BD6-9043-1021F62B5993}" type="presOf" srcId="{38F8DD57-7454-4334-BBFA-B1B2ED12EB62}" destId="{9E1B741C-8181-437D-9E3E-9993C461882A}" srcOrd="1" destOrd="0" presId="urn:microsoft.com/office/officeart/2005/8/layout/cycle2"/>
+    <dgm:cxn modelId="{DB9667AB-006E-4292-9138-F277560EEB2F}" type="presOf" srcId="{4D900DEF-D16D-4B79-A224-033982676A84}" destId="{A3B8EF27-070F-41BB-AB16-AA20761005A1}" srcOrd="0" destOrd="0" presId="urn:microsoft.com/office/officeart/2005/8/layout/cycle2"/>
+    <dgm:cxn modelId="{1B188F7A-92A0-4127-B03E-D23BA8B4EA7C}" type="presOf" srcId="{9FA9C300-FCBA-453A-AB34-3EF865E7390C}" destId="{B14F98F5-9C5B-4F53-A26B-4D903D14BB70}" srcOrd="0" destOrd="0" presId="urn:microsoft.com/office/officeart/2005/8/layout/cycle2"/>
+    <dgm:cxn modelId="{5A4B148A-6930-49AA-B239-D45CA5722DE5}" type="presOf" srcId="{EFAF03D5-A233-4C76-9B90-24B49649ACF5}" destId="{FEF06E72-7C87-4202-890C-345EC1D9F44C}" srcOrd="0" destOrd="0" presId="urn:microsoft.com/office/officeart/2005/8/layout/cycle2"/>
+    <dgm:cxn modelId="{51EB1373-5A73-4B5C-8F4A-49BEDF66BDCC}" type="presOf" srcId="{0173A0E4-2970-45BD-A922-296E968BEF38}" destId="{3ED50FBC-50B3-47E6-BC24-CBD71A358D74}" srcOrd="1" destOrd="0" presId="urn:microsoft.com/office/officeart/2005/8/layout/cycle2"/>
+    <dgm:cxn modelId="{B3DC7FEA-5572-4A0B-A212-A3340C0576C3}" type="presOf" srcId="{D1CE2A32-EC64-4E44-BD3C-C22C54BFC1B6}" destId="{5C05611F-2FD6-4B23-8855-D8C95A3F0102}" srcOrd="0" destOrd="0" presId="urn:microsoft.com/office/officeart/2005/8/layout/cycle2"/>
+    <dgm:cxn modelId="{C78F8E84-1A01-48A2-A202-54A2F3160656}" type="presOf" srcId="{A128F0BD-DF9A-4BE9-A6A8-6C4754FCABDA}" destId="{1BAB9045-83AB-4518-BC90-032A2EEA33AF}" srcOrd="0" destOrd="0" presId="urn:microsoft.com/office/officeart/2005/8/layout/cycle2"/>
+    <dgm:cxn modelId="{73874220-CB27-419C-B883-A80C1DC54314}" srcId="{A128F0BD-DF9A-4BE9-A6A8-6C4754FCABDA}" destId="{B9D1CD18-C0CD-4CE2-B3EB-17CB254543C3}" srcOrd="2" destOrd="0" parTransId="{A5753D39-7978-4CEB-B6DE-3BA7147367AA}" sibTransId="{0173A0E4-2970-45BD-A922-296E968BEF38}"/>
+    <dgm:cxn modelId="{B4161E1D-0DEC-466D-9881-0DFFBAC97180}" srcId="{A128F0BD-DF9A-4BE9-A6A8-6C4754FCABDA}" destId="{BF35D190-A110-491B-B323-9435A8FDC80D}" srcOrd="3" destOrd="0" parTransId="{FD6D3DEB-2F0B-4721-A2AF-AE14C5A97346}" sibTransId="{38F8DD57-7454-4334-BBFA-B1B2ED12EB62}"/>
+    <dgm:cxn modelId="{83B29E57-2FF2-4C36-9EA3-748D871ADD95}" srcId="{A128F0BD-DF9A-4BE9-A6A8-6C4754FCABDA}" destId="{EFAF03D5-A233-4C76-9B90-24B49649ACF5}" srcOrd="0" destOrd="0" parTransId="{FFFF8408-B268-4234-BC9D-07C7306BD323}" sibTransId="{BC9D71E3-0CDB-4A3A-B7A7-0F91F98FE251}"/>
+    <dgm:cxn modelId="{FE98CA67-00DA-416B-BA6A-0AC2EC64615B}" type="presOf" srcId="{BC9D71E3-0CDB-4A3A-B7A7-0F91F98FE251}" destId="{055CB64B-802B-45D3-8DF6-798EF262280D}" srcOrd="0" destOrd="0" presId="urn:microsoft.com/office/officeart/2005/8/layout/cycle2"/>
+    <dgm:cxn modelId="{0AB98623-DF7D-48BE-BCB6-525066F06F6E}" srcId="{A128F0BD-DF9A-4BE9-A6A8-6C4754FCABDA}" destId="{FA71CF4A-4B11-49C3-8552-3F6B6E5B19A5}" srcOrd="1" destOrd="0" parTransId="{4024D651-5B90-4CE1-BAD7-8A545DFE3AFD}" sibTransId="{4D900DEF-D16D-4B79-A224-033982676A84}"/>
+    <dgm:cxn modelId="{C3441030-BEFD-4EDE-8140-D1A54E93DC95}" type="presParOf" srcId="{1BAB9045-83AB-4518-BC90-032A2EEA33AF}" destId="{FEF06E72-7C87-4202-890C-345EC1D9F44C}" srcOrd="0" destOrd="0" presId="urn:microsoft.com/office/officeart/2005/8/layout/cycle2"/>
+    <dgm:cxn modelId="{97DFACDD-DE04-43CB-BAB7-F09C82292413}" type="presParOf" srcId="{1BAB9045-83AB-4518-BC90-032A2EEA33AF}" destId="{055CB64B-802B-45D3-8DF6-798EF262280D}" srcOrd="1" destOrd="0" presId="urn:microsoft.com/office/officeart/2005/8/layout/cycle2"/>
+    <dgm:cxn modelId="{A3F93355-A74F-45A6-B76A-7BB63DC393BF}" type="presParOf" srcId="{055CB64B-802B-45D3-8DF6-798EF262280D}" destId="{E9B7BEA1-3C66-47D9-9015-5CB2C3DF2CDC}" srcOrd="0" destOrd="0" presId="urn:microsoft.com/office/officeart/2005/8/layout/cycle2"/>
+    <dgm:cxn modelId="{1BD09633-225C-4D3B-8588-F8A2963562B3}" type="presParOf" srcId="{1BAB9045-83AB-4518-BC90-032A2EEA33AF}" destId="{B99A717E-6875-46C4-93BD-02F76F4C7222}" srcOrd="2" destOrd="0" presId="urn:microsoft.com/office/officeart/2005/8/layout/cycle2"/>
+    <dgm:cxn modelId="{C606F2A8-0711-4C0E-A7C7-87A71314983D}" type="presParOf" srcId="{1BAB9045-83AB-4518-BC90-032A2EEA33AF}" destId="{A3B8EF27-070F-41BB-AB16-AA20761005A1}" srcOrd="3" destOrd="0" presId="urn:microsoft.com/office/officeart/2005/8/layout/cycle2"/>
+    <dgm:cxn modelId="{0218CBE0-8048-456B-B91A-662F3D7BD523}" type="presParOf" srcId="{A3B8EF27-070F-41BB-AB16-AA20761005A1}" destId="{727D7562-439E-49ED-A028-4E7011E442FF}" srcOrd="0" destOrd="0" presId="urn:microsoft.com/office/officeart/2005/8/layout/cycle2"/>
+    <dgm:cxn modelId="{F57DEA0E-9718-4A61-8C53-5681EF57A72F}" type="presParOf" srcId="{1BAB9045-83AB-4518-BC90-032A2EEA33AF}" destId="{134C2103-362F-48D4-96DA-BDE499CBC320}" srcOrd="4" destOrd="0" presId="urn:microsoft.com/office/officeart/2005/8/layout/cycle2"/>
+    <dgm:cxn modelId="{3818F7F3-5E33-4F27-A820-595D8952C904}" type="presParOf" srcId="{1BAB9045-83AB-4518-BC90-032A2EEA33AF}" destId="{A544EBAA-22E2-4148-9763-9BD8EDE01FA1}" srcOrd="5" destOrd="0" presId="urn:microsoft.com/office/officeart/2005/8/layout/cycle2"/>
+    <dgm:cxn modelId="{CCE73290-145F-46EB-A38D-AEC6240A071C}" type="presParOf" srcId="{A544EBAA-22E2-4148-9763-9BD8EDE01FA1}" destId="{3ED50FBC-50B3-47E6-BC24-CBD71A358D74}" srcOrd="0" destOrd="0" presId="urn:microsoft.com/office/officeart/2005/8/layout/cycle2"/>
+    <dgm:cxn modelId="{CD688DAB-E98E-4A7C-BE1F-3D258BEA25A7}" type="presParOf" srcId="{1BAB9045-83AB-4518-BC90-032A2EEA33AF}" destId="{CCCE5FE4-A079-4A90-B5D9-DC004E46B293}" srcOrd="6" destOrd="0" presId="urn:microsoft.com/office/officeart/2005/8/layout/cycle2"/>
+    <dgm:cxn modelId="{09C63960-9943-43DD-AE1C-75BCFC523633}" type="presParOf" srcId="{1BAB9045-83AB-4518-BC90-032A2EEA33AF}" destId="{231C9A01-8E86-4594-8128-CA1A309B1944}" srcOrd="7" destOrd="0" presId="urn:microsoft.com/office/officeart/2005/8/layout/cycle2"/>
+    <dgm:cxn modelId="{31CF158E-3F68-4C49-B51C-C439389F28F7}" type="presParOf" srcId="{231C9A01-8E86-4594-8128-CA1A309B1944}" destId="{9E1B741C-8181-437D-9E3E-9993C461882A}" srcOrd="0" destOrd="0" presId="urn:microsoft.com/office/officeart/2005/8/layout/cycle2"/>
+    <dgm:cxn modelId="{14B51CC4-86F2-4260-A329-3345FFA73714}" type="presParOf" srcId="{1BAB9045-83AB-4518-BC90-032A2EEA33AF}" destId="{5C05611F-2FD6-4B23-8855-D8C95A3F0102}" srcOrd="8" destOrd="0" presId="urn:microsoft.com/office/officeart/2005/8/layout/cycle2"/>
+    <dgm:cxn modelId="{A1C21714-0142-4CE1-8084-ECC80CC754E8}" type="presParOf" srcId="{1BAB9045-83AB-4518-BC90-032A2EEA33AF}" destId="{B14F98F5-9C5B-4F53-A26B-4D903D14BB70}" srcOrd="9" destOrd="0" presId="urn:microsoft.com/office/officeart/2005/8/layout/cycle2"/>
+    <dgm:cxn modelId="{2527276D-04CF-4A46-9973-9C03EB2FE526}" type="presParOf" srcId="{B14F98F5-9C5B-4F53-A26B-4D903D14BB70}" destId="{1E529B08-B3C9-4635-BABE-34B564A7237E}" srcOrd="0" destOrd="0" presId="urn:microsoft.com/office/officeart/2005/8/layout/cycle2"/>
+  </dgm:cxnLst>
+  <dgm:bg/>
+  <dgm:whole/>
+  <dgm:extLst>
+    <a:ext uri="http://schemas.microsoft.com/office/drawing/2008/diagram">
+      <dsp:dataModelExt xmlns:dsp="http://schemas.microsoft.com/office/drawing/2008/diagram" relId="rId7" minVer="http://schemas.openxmlformats.org/drawingml/2006/diagram"/>
+    </a:ext>
+  </dgm:extLst>
+</dgm:dataModel>
+</file>
+
+<file path=ppt/diagrams/drawing1.xml><?xml version="1.0" encoding="utf-8"?>
+<dsp:drawing xmlns:dgm="http://schemas.openxmlformats.org/drawingml/2006/diagram" xmlns:dsp="http://schemas.microsoft.com/office/drawing/2008/diagram" xmlns:a="http://schemas.openxmlformats.org/drawingml/2006/main">
+  <dsp:spTree>
+    <dsp:nvGrpSpPr>
+      <dsp:cNvPr id="0" name=""/>
+      <dsp:cNvGrpSpPr/>
+    </dsp:nvGrpSpPr>
+    <dsp:grpSpPr/>
+    <dsp:sp modelId="{FEF06E72-7C87-4202-890C-345EC1D9F44C}">
+      <dsp:nvSpPr>
+        <dsp:cNvPr id="0" name=""/>
+        <dsp:cNvSpPr/>
+      </dsp:nvSpPr>
+      <dsp:spPr>
+        <a:xfrm>
+          <a:off x="2613490" y="906"/>
+          <a:ext cx="1382995" cy="1382995"/>
+        </a:xfrm>
+        <a:prstGeom prst="ellipse">
+          <a:avLst/>
+        </a:prstGeom>
+        <a:solidFill>
+          <a:schemeClr val="lt1">
+            <a:hueOff val="0"/>
+            <a:satOff val="0"/>
+            <a:lumOff val="0"/>
+            <a:alphaOff val="0"/>
+          </a:schemeClr>
+        </a:solidFill>
+        <a:ln w="25400" cap="flat" cmpd="sng" algn="ctr">
+          <a:solidFill>
+            <a:schemeClr val="dk1">
+              <a:shade val="80000"/>
+              <a:hueOff val="0"/>
+              <a:satOff val="0"/>
+              <a:lumOff val="0"/>
+              <a:alphaOff val="0"/>
+            </a:schemeClr>
+          </a:solidFill>
+          <a:prstDash val="solid"/>
+        </a:ln>
+        <a:effectLst/>
+      </dsp:spPr>
+      <dsp:style>
+        <a:lnRef idx="2">
+          <a:scrgbClr r="0" g="0" b="0"/>
+        </a:lnRef>
+        <a:fillRef idx="1">
+          <a:scrgbClr r="0" g="0" b="0"/>
+        </a:fillRef>
+        <a:effectRef idx="0">
+          <a:scrgbClr r="0" g="0" b="0"/>
+        </a:effectRef>
+        <a:fontRef idx="minor">
+          <a:schemeClr val="lt1"/>
+        </a:fontRef>
+      </dsp:style>
+      <dsp:txBody>
+        <a:bodyPr spcFirstLastPara="0" vert="horz" wrap="square" lIns="39370" tIns="39370" rIns="39370" bIns="39370" numCol="1" spcCol="1270" anchor="ctr" anchorCtr="0">
+          <a:noAutofit/>
+        </a:bodyPr>
+        <a:lstStyle/>
+        <a:p>
+          <a:pPr lvl="0" algn="ctr" defTabSz="1377950">
+            <a:lnSpc>
+              <a:spcPct val="90000"/>
+            </a:lnSpc>
+            <a:spcBef>
+              <a:spcPct val="0"/>
+            </a:spcBef>
+            <a:spcAft>
+              <a:spcPct val="35000"/>
+            </a:spcAft>
+          </a:pPr>
+          <a:endParaRPr lang="zh-CN" altLang="en-US" sz="3100" kern="1200" dirty="0"/>
+        </a:p>
+      </dsp:txBody>
+      <dsp:txXfrm>
+        <a:off x="2816025" y="203441"/>
+        <a:ext cx="977925" cy="977925"/>
+      </dsp:txXfrm>
+    </dsp:sp>
+    <dsp:sp modelId="{055CB64B-802B-45D3-8DF6-798EF262280D}">
+      <dsp:nvSpPr>
+        <dsp:cNvPr id="0" name=""/>
+        <dsp:cNvSpPr/>
+      </dsp:nvSpPr>
+      <dsp:spPr>
+        <a:xfrm rot="2160000">
+          <a:off x="3952611" y="1062855"/>
+          <a:ext cx="366958" cy="466760"/>
+        </a:xfrm>
+        <a:prstGeom prst="rightArrow">
+          <a:avLst>
+            <a:gd name="adj1" fmla="val 60000"/>
+            <a:gd name="adj2" fmla="val 50000"/>
+          </a:avLst>
+        </a:prstGeom>
+        <a:solidFill>
+          <a:schemeClr val="dk1">
+            <a:tint val="60000"/>
+            <a:hueOff val="0"/>
+            <a:satOff val="0"/>
+            <a:lumOff val="0"/>
+            <a:alphaOff val="0"/>
+          </a:schemeClr>
+        </a:solidFill>
+        <a:ln>
+          <a:noFill/>
+        </a:ln>
+        <a:effectLst/>
+      </dsp:spPr>
+      <dsp:style>
+        <a:lnRef idx="0">
+          <a:scrgbClr r="0" g="0" b="0"/>
+        </a:lnRef>
+        <a:fillRef idx="1">
+          <a:scrgbClr r="0" g="0" b="0"/>
+        </a:fillRef>
+        <a:effectRef idx="0">
+          <a:scrgbClr r="0" g="0" b="0"/>
+        </a:effectRef>
+        <a:fontRef idx="minor">
+          <a:schemeClr val="lt1"/>
+        </a:fontRef>
+      </dsp:style>
+      <dsp:txBody>
+        <a:bodyPr spcFirstLastPara="0" vert="horz" wrap="square" lIns="0" tIns="0" rIns="0" bIns="0" numCol="1" spcCol="1270" anchor="ctr" anchorCtr="0">
+          <a:noAutofit/>
+        </a:bodyPr>
+        <a:lstStyle/>
+        <a:p>
+          <a:pPr lvl="0" algn="ctr" defTabSz="933450">
+            <a:lnSpc>
+              <a:spcPct val="90000"/>
+            </a:lnSpc>
+            <a:spcBef>
+              <a:spcPct val="0"/>
+            </a:spcBef>
+            <a:spcAft>
+              <a:spcPct val="35000"/>
+            </a:spcAft>
+          </a:pPr>
+          <a:endParaRPr lang="zh-CN" altLang="en-US" sz="2100" kern="1200"/>
+        </a:p>
+      </dsp:txBody>
+      <dsp:txXfrm>
+        <a:off x="3963123" y="1123853"/>
+        <a:ext cx="256871" cy="280056"/>
+      </dsp:txXfrm>
+    </dsp:sp>
+    <dsp:sp modelId="{B99A717E-6875-46C4-93BD-02F76F4C7222}">
+      <dsp:nvSpPr>
+        <dsp:cNvPr id="0" name=""/>
+        <dsp:cNvSpPr/>
+      </dsp:nvSpPr>
+      <dsp:spPr>
+        <a:xfrm>
+          <a:off x="4292499" y="1220778"/>
+          <a:ext cx="1382995" cy="1382995"/>
+        </a:xfrm>
+        <a:prstGeom prst="ellipse">
+          <a:avLst/>
+        </a:prstGeom>
+        <a:solidFill>
+          <a:schemeClr val="lt1">
+            <a:hueOff val="0"/>
+            <a:satOff val="0"/>
+            <a:lumOff val="0"/>
+            <a:alphaOff val="0"/>
+          </a:schemeClr>
+        </a:solidFill>
+        <a:ln w="25400" cap="flat" cmpd="sng" algn="ctr">
+          <a:solidFill>
+            <a:schemeClr val="dk1">
+              <a:shade val="80000"/>
+              <a:hueOff val="0"/>
+              <a:satOff val="0"/>
+              <a:lumOff val="0"/>
+              <a:alphaOff val="0"/>
+            </a:schemeClr>
+          </a:solidFill>
+          <a:prstDash val="solid"/>
+        </a:ln>
+        <a:effectLst/>
+      </dsp:spPr>
+      <dsp:style>
+        <a:lnRef idx="2">
+          <a:scrgbClr r="0" g="0" b="0"/>
+        </a:lnRef>
+        <a:fillRef idx="1">
+          <a:scrgbClr r="0" g="0" b="0"/>
+        </a:fillRef>
+        <a:effectRef idx="0">
+          <a:scrgbClr r="0" g="0" b="0"/>
+        </a:effectRef>
+        <a:fontRef idx="minor">
+          <a:schemeClr val="lt1"/>
+        </a:fontRef>
+      </dsp:style>
+      <dsp:txBody>
+        <a:bodyPr spcFirstLastPara="0" vert="horz" wrap="square" lIns="39370" tIns="39370" rIns="39370" bIns="39370" numCol="1" spcCol="1270" anchor="ctr" anchorCtr="0">
+          <a:noAutofit/>
+        </a:bodyPr>
+        <a:lstStyle/>
+        <a:p>
+          <a:pPr lvl="0" algn="ctr" defTabSz="1377950">
+            <a:lnSpc>
+              <a:spcPct val="90000"/>
+            </a:lnSpc>
+            <a:spcBef>
+              <a:spcPct val="0"/>
+            </a:spcBef>
+            <a:spcAft>
+              <a:spcPct val="35000"/>
+            </a:spcAft>
+          </a:pPr>
+          <a:endParaRPr lang="zh-CN" altLang="en-US" sz="3100" kern="1200"/>
+        </a:p>
+      </dsp:txBody>
+      <dsp:txXfrm>
+        <a:off x="4495034" y="1423313"/>
+        <a:ext cx="977925" cy="977925"/>
+      </dsp:txXfrm>
+    </dsp:sp>
+    <dsp:sp modelId="{A3B8EF27-070F-41BB-AB16-AA20761005A1}">
+      <dsp:nvSpPr>
+        <dsp:cNvPr id="0" name=""/>
+        <dsp:cNvSpPr/>
+      </dsp:nvSpPr>
+      <dsp:spPr>
+        <a:xfrm rot="6480000">
+          <a:off x="4483065" y="2655915"/>
+          <a:ext cx="366958" cy="466760"/>
+        </a:xfrm>
+        <a:prstGeom prst="rightArrow">
+          <a:avLst>
+            <a:gd name="adj1" fmla="val 60000"/>
+            <a:gd name="adj2" fmla="val 50000"/>
+          </a:avLst>
+        </a:prstGeom>
+        <a:solidFill>
+          <a:schemeClr val="dk1">
+            <a:tint val="60000"/>
+            <a:hueOff val="0"/>
+            <a:satOff val="0"/>
+            <a:lumOff val="0"/>
+            <a:alphaOff val="0"/>
+          </a:schemeClr>
+        </a:solidFill>
+        <a:ln>
+          <a:noFill/>
+        </a:ln>
+        <a:effectLst/>
+      </dsp:spPr>
+      <dsp:style>
+        <a:lnRef idx="0">
+          <a:scrgbClr r="0" g="0" b="0"/>
+        </a:lnRef>
+        <a:fillRef idx="1">
+          <a:scrgbClr r="0" g="0" b="0"/>
+        </a:fillRef>
+        <a:effectRef idx="0">
+          <a:scrgbClr r="0" g="0" b="0"/>
+        </a:effectRef>
+        <a:fontRef idx="minor">
+          <a:schemeClr val="lt1"/>
+        </a:fontRef>
+      </dsp:style>
+      <dsp:txBody>
+        <a:bodyPr spcFirstLastPara="0" vert="horz" wrap="square" lIns="0" tIns="0" rIns="0" bIns="0" numCol="1" spcCol="1270" anchor="ctr" anchorCtr="0">
+          <a:noAutofit/>
+        </a:bodyPr>
+        <a:lstStyle/>
+        <a:p>
+          <a:pPr lvl="0" algn="ctr" defTabSz="933450">
+            <a:lnSpc>
+              <a:spcPct val="90000"/>
+            </a:lnSpc>
+            <a:spcBef>
+              <a:spcPct val="0"/>
+            </a:spcBef>
+            <a:spcAft>
+              <a:spcPct val="35000"/>
+            </a:spcAft>
+          </a:pPr>
+          <a:endParaRPr lang="zh-CN" altLang="en-US" sz="2100" kern="1200"/>
+        </a:p>
+      </dsp:txBody>
+      <dsp:txXfrm rot="10800000">
+        <a:off x="4555118" y="2696918"/>
+        <a:ext cx="256871" cy="280056"/>
+      </dsp:txXfrm>
+    </dsp:sp>
+    <dsp:sp modelId="{134C2103-362F-48D4-96DA-BDE499CBC320}">
+      <dsp:nvSpPr>
+        <dsp:cNvPr id="0" name=""/>
+        <dsp:cNvSpPr/>
+      </dsp:nvSpPr>
+      <dsp:spPr>
+        <a:xfrm>
+          <a:off x="3651175" y="3194571"/>
+          <a:ext cx="1382995" cy="1382995"/>
+        </a:xfrm>
+        <a:prstGeom prst="ellipse">
+          <a:avLst/>
+        </a:prstGeom>
+        <a:solidFill>
+          <a:schemeClr val="lt1">
+            <a:hueOff val="0"/>
+            <a:satOff val="0"/>
+            <a:lumOff val="0"/>
+            <a:alphaOff val="0"/>
+          </a:schemeClr>
+        </a:solidFill>
+        <a:ln w="25400" cap="flat" cmpd="sng" algn="ctr">
+          <a:solidFill>
+            <a:schemeClr val="dk1">
+              <a:shade val="80000"/>
+              <a:hueOff val="0"/>
+              <a:satOff val="0"/>
+              <a:lumOff val="0"/>
+              <a:alphaOff val="0"/>
+            </a:schemeClr>
+          </a:solidFill>
+          <a:prstDash val="solid"/>
+        </a:ln>
+        <a:effectLst/>
+      </dsp:spPr>
+      <dsp:style>
+        <a:lnRef idx="2">
+          <a:scrgbClr r="0" g="0" b="0"/>
+        </a:lnRef>
+        <a:fillRef idx="1">
+          <a:scrgbClr r="0" g="0" b="0"/>
+        </a:fillRef>
+        <a:effectRef idx="0">
+          <a:scrgbClr r="0" g="0" b="0"/>
+        </a:effectRef>
+        <a:fontRef idx="minor">
+          <a:schemeClr val="lt1"/>
+        </a:fontRef>
+      </dsp:style>
+      <dsp:txBody>
+        <a:bodyPr spcFirstLastPara="0" vert="horz" wrap="square" lIns="39370" tIns="39370" rIns="39370" bIns="39370" numCol="1" spcCol="1270" anchor="ctr" anchorCtr="0">
+          <a:noAutofit/>
+        </a:bodyPr>
+        <a:lstStyle/>
+        <a:p>
+          <a:pPr lvl="0" algn="ctr" defTabSz="1377950">
+            <a:lnSpc>
+              <a:spcPct val="90000"/>
+            </a:lnSpc>
+            <a:spcBef>
+              <a:spcPct val="0"/>
+            </a:spcBef>
+            <a:spcAft>
+              <a:spcPct val="35000"/>
+            </a:spcAft>
+          </a:pPr>
+          <a:endParaRPr lang="zh-CN" altLang="en-US" sz="3100" kern="1200"/>
+        </a:p>
+      </dsp:txBody>
+      <dsp:txXfrm>
+        <a:off x="3853710" y="3397106"/>
+        <a:ext cx="977925" cy="977925"/>
+      </dsp:txXfrm>
+    </dsp:sp>
+    <dsp:sp modelId="{A544EBAA-22E2-4148-9763-9BD8EDE01FA1}">
+      <dsp:nvSpPr>
+        <dsp:cNvPr id="0" name=""/>
+        <dsp:cNvSpPr/>
+      </dsp:nvSpPr>
+      <dsp:spPr>
+        <a:xfrm rot="10800000">
+          <a:off x="3131894" y="3652689"/>
+          <a:ext cx="366958" cy="466760"/>
+        </a:xfrm>
+        <a:prstGeom prst="rightArrow">
+          <a:avLst>
+            <a:gd name="adj1" fmla="val 60000"/>
+            <a:gd name="adj2" fmla="val 50000"/>
+          </a:avLst>
+        </a:prstGeom>
+        <a:solidFill>
+          <a:schemeClr val="dk1">
+            <a:tint val="60000"/>
+            <a:hueOff val="0"/>
+            <a:satOff val="0"/>
+            <a:lumOff val="0"/>
+            <a:alphaOff val="0"/>
+          </a:schemeClr>
+        </a:solidFill>
+        <a:ln>
+          <a:noFill/>
+        </a:ln>
+        <a:effectLst/>
+      </dsp:spPr>
+      <dsp:style>
+        <a:lnRef idx="0">
+          <a:scrgbClr r="0" g="0" b="0"/>
+        </a:lnRef>
+        <a:fillRef idx="1">
+          <a:scrgbClr r="0" g="0" b="0"/>
+        </a:fillRef>
+        <a:effectRef idx="0">
+          <a:scrgbClr r="0" g="0" b="0"/>
+        </a:effectRef>
+        <a:fontRef idx="minor">
+          <a:schemeClr val="lt1"/>
+        </a:fontRef>
+      </dsp:style>
+      <dsp:txBody>
+        <a:bodyPr spcFirstLastPara="0" vert="horz" wrap="square" lIns="0" tIns="0" rIns="0" bIns="0" numCol="1" spcCol="1270" anchor="ctr" anchorCtr="0">
+          <a:noAutofit/>
+        </a:bodyPr>
+        <a:lstStyle/>
+        <a:p>
+          <a:pPr lvl="0" algn="ctr" defTabSz="933450">
+            <a:lnSpc>
+              <a:spcPct val="90000"/>
+            </a:lnSpc>
+            <a:spcBef>
+              <a:spcPct val="0"/>
+            </a:spcBef>
+            <a:spcAft>
+              <a:spcPct val="35000"/>
+            </a:spcAft>
+          </a:pPr>
+          <a:endParaRPr lang="zh-CN" altLang="en-US" sz="2100" kern="1200"/>
+        </a:p>
+      </dsp:txBody>
+      <dsp:txXfrm rot="10800000">
+        <a:off x="3241981" y="3746041"/>
+        <a:ext cx="256871" cy="280056"/>
+      </dsp:txXfrm>
+    </dsp:sp>
+    <dsp:sp modelId="{CCCE5FE4-A079-4A90-B5D9-DC004E46B293}">
+      <dsp:nvSpPr>
+        <dsp:cNvPr id="0" name=""/>
+        <dsp:cNvSpPr/>
+      </dsp:nvSpPr>
+      <dsp:spPr>
+        <a:xfrm>
+          <a:off x="1575805" y="3194571"/>
+          <a:ext cx="1382995" cy="1382995"/>
+        </a:xfrm>
+        <a:prstGeom prst="ellipse">
+          <a:avLst/>
+        </a:prstGeom>
+        <a:solidFill>
+          <a:schemeClr val="lt1">
+            <a:hueOff val="0"/>
+            <a:satOff val="0"/>
+            <a:lumOff val="0"/>
+            <a:alphaOff val="0"/>
+          </a:schemeClr>
+        </a:solidFill>
+        <a:ln w="25400" cap="flat" cmpd="sng" algn="ctr">
+          <a:solidFill>
+            <a:schemeClr val="dk1">
+              <a:shade val="80000"/>
+              <a:hueOff val="0"/>
+              <a:satOff val="0"/>
+              <a:lumOff val="0"/>
+              <a:alphaOff val="0"/>
+            </a:schemeClr>
+          </a:solidFill>
+          <a:prstDash val="solid"/>
+        </a:ln>
+        <a:effectLst/>
+      </dsp:spPr>
+      <dsp:style>
+        <a:lnRef idx="2">
+          <a:scrgbClr r="0" g="0" b="0"/>
+        </a:lnRef>
+        <a:fillRef idx="1">
+          <a:scrgbClr r="0" g="0" b="0"/>
+        </a:fillRef>
+        <a:effectRef idx="0">
+          <a:scrgbClr r="0" g="0" b="0"/>
+        </a:effectRef>
+        <a:fontRef idx="minor">
+          <a:schemeClr val="lt1"/>
+        </a:fontRef>
+      </dsp:style>
+      <dsp:txBody>
+        <a:bodyPr spcFirstLastPara="0" vert="horz" wrap="square" lIns="39370" tIns="39370" rIns="39370" bIns="39370" numCol="1" spcCol="1270" anchor="ctr" anchorCtr="0">
+          <a:noAutofit/>
+        </a:bodyPr>
+        <a:lstStyle/>
+        <a:p>
+          <a:pPr lvl="0" algn="ctr" defTabSz="1377950">
+            <a:lnSpc>
+              <a:spcPct val="90000"/>
+            </a:lnSpc>
+            <a:spcBef>
+              <a:spcPct val="0"/>
+            </a:spcBef>
+            <a:spcAft>
+              <a:spcPct val="35000"/>
+            </a:spcAft>
+          </a:pPr>
+          <a:endParaRPr lang="zh-CN" altLang="en-US" sz="3100" kern="1200"/>
+        </a:p>
+      </dsp:txBody>
+      <dsp:txXfrm>
+        <a:off x="1778340" y="3397106"/>
+        <a:ext cx="977925" cy="977925"/>
+      </dsp:txXfrm>
+    </dsp:sp>
+    <dsp:sp modelId="{231C9A01-8E86-4594-8128-CA1A309B1944}">
+      <dsp:nvSpPr>
+        <dsp:cNvPr id="0" name=""/>
+        <dsp:cNvSpPr/>
+      </dsp:nvSpPr>
+      <dsp:spPr>
+        <a:xfrm rot="15120000">
+          <a:off x="1766371" y="2675669"/>
+          <a:ext cx="366958" cy="466760"/>
+        </a:xfrm>
+        <a:prstGeom prst="rightArrow">
+          <a:avLst>
+            <a:gd name="adj1" fmla="val 60000"/>
+            <a:gd name="adj2" fmla="val 50000"/>
+          </a:avLst>
+        </a:prstGeom>
+        <a:solidFill>
+          <a:schemeClr val="dk1">
+            <a:tint val="60000"/>
+            <a:hueOff val="0"/>
+            <a:satOff val="0"/>
+            <a:lumOff val="0"/>
+            <a:alphaOff val="0"/>
+          </a:schemeClr>
+        </a:solidFill>
+        <a:ln>
+          <a:noFill/>
+        </a:ln>
+        <a:effectLst/>
+      </dsp:spPr>
+      <dsp:style>
+        <a:lnRef idx="0">
+          <a:scrgbClr r="0" g="0" b="0"/>
+        </a:lnRef>
+        <a:fillRef idx="1">
+          <a:scrgbClr r="0" g="0" b="0"/>
+        </a:fillRef>
+        <a:effectRef idx="0">
+          <a:scrgbClr r="0" g="0" b="0"/>
+        </a:effectRef>
+        <a:fontRef idx="minor">
+          <a:schemeClr val="lt1"/>
+        </a:fontRef>
+      </dsp:style>
+      <dsp:txBody>
+        <a:bodyPr spcFirstLastPara="0" vert="horz" wrap="square" lIns="0" tIns="0" rIns="0" bIns="0" numCol="1" spcCol="1270" anchor="ctr" anchorCtr="0">
+          <a:noAutofit/>
+        </a:bodyPr>
+        <a:lstStyle/>
+        <a:p>
+          <a:pPr lvl="0" algn="ctr" defTabSz="933450">
+            <a:lnSpc>
+              <a:spcPct val="90000"/>
+            </a:lnSpc>
+            <a:spcBef>
+              <a:spcPct val="0"/>
+            </a:spcBef>
+            <a:spcAft>
+              <a:spcPct val="35000"/>
+            </a:spcAft>
+          </a:pPr>
+          <a:endParaRPr lang="zh-CN" altLang="en-US" sz="2100" kern="1200"/>
+        </a:p>
+      </dsp:txBody>
+      <dsp:txXfrm rot="10800000">
+        <a:off x="1838424" y="2821370"/>
+        <a:ext cx="256871" cy="280056"/>
+      </dsp:txXfrm>
+    </dsp:sp>
+    <dsp:sp modelId="{5C05611F-2FD6-4B23-8855-D8C95A3F0102}">
+      <dsp:nvSpPr>
+        <dsp:cNvPr id="0" name=""/>
+        <dsp:cNvSpPr/>
+      </dsp:nvSpPr>
+      <dsp:spPr>
+        <a:xfrm>
+          <a:off x="934480" y="1220778"/>
+          <a:ext cx="1382995" cy="1382995"/>
+        </a:xfrm>
+        <a:prstGeom prst="ellipse">
+          <a:avLst/>
+        </a:prstGeom>
+        <a:solidFill>
+          <a:schemeClr val="lt1">
+            <a:hueOff val="0"/>
+            <a:satOff val="0"/>
+            <a:lumOff val="0"/>
+            <a:alphaOff val="0"/>
+          </a:schemeClr>
+        </a:solidFill>
+        <a:ln w="25400" cap="flat" cmpd="sng" algn="ctr">
+          <a:solidFill>
+            <a:schemeClr val="dk1">
+              <a:shade val="80000"/>
+              <a:hueOff val="0"/>
+              <a:satOff val="0"/>
+              <a:lumOff val="0"/>
+              <a:alphaOff val="0"/>
+            </a:schemeClr>
+          </a:solidFill>
+          <a:prstDash val="solid"/>
+        </a:ln>
+        <a:effectLst/>
+      </dsp:spPr>
+      <dsp:style>
+        <a:lnRef idx="2">
+          <a:scrgbClr r="0" g="0" b="0"/>
+        </a:lnRef>
+        <a:fillRef idx="1">
+          <a:scrgbClr r="0" g="0" b="0"/>
+        </a:fillRef>
+        <a:effectRef idx="0">
+          <a:scrgbClr r="0" g="0" b="0"/>
+        </a:effectRef>
+        <a:fontRef idx="minor">
+          <a:schemeClr val="lt1"/>
+        </a:fontRef>
+      </dsp:style>
+      <dsp:txBody>
+        <a:bodyPr spcFirstLastPara="0" vert="horz" wrap="square" lIns="39370" tIns="39370" rIns="39370" bIns="39370" numCol="1" spcCol="1270" anchor="ctr" anchorCtr="0">
+          <a:noAutofit/>
+        </a:bodyPr>
+        <a:lstStyle/>
+        <a:p>
+          <a:pPr lvl="0" algn="ctr" defTabSz="1377950">
+            <a:lnSpc>
+              <a:spcPct val="90000"/>
+            </a:lnSpc>
+            <a:spcBef>
+              <a:spcPct val="0"/>
+            </a:spcBef>
+            <a:spcAft>
+              <a:spcPct val="35000"/>
+            </a:spcAft>
+          </a:pPr>
+          <a:endParaRPr lang="zh-CN" altLang="en-US" sz="3100" kern="1200"/>
+        </a:p>
+      </dsp:txBody>
+      <dsp:txXfrm>
+        <a:off x="1137015" y="1423313"/>
+        <a:ext cx="977925" cy="977925"/>
+      </dsp:txXfrm>
+    </dsp:sp>
+    <dsp:sp modelId="{B14F98F5-9C5B-4F53-A26B-4D903D14BB70}">
+      <dsp:nvSpPr>
+        <dsp:cNvPr id="0" name=""/>
+        <dsp:cNvSpPr/>
+      </dsp:nvSpPr>
+      <dsp:spPr>
+        <a:xfrm rot="19440000">
+          <a:off x="2273602" y="1075064"/>
+          <a:ext cx="366958" cy="466760"/>
+        </a:xfrm>
+        <a:prstGeom prst="rightArrow">
+          <a:avLst>
+            <a:gd name="adj1" fmla="val 60000"/>
+            <a:gd name="adj2" fmla="val 50000"/>
+          </a:avLst>
+        </a:prstGeom>
+        <a:solidFill>
+          <a:schemeClr val="dk1">
+            <a:tint val="60000"/>
+            <a:hueOff val="0"/>
+            <a:satOff val="0"/>
+            <a:lumOff val="0"/>
+            <a:alphaOff val="0"/>
+          </a:schemeClr>
+        </a:solidFill>
+        <a:ln>
+          <a:noFill/>
+        </a:ln>
+        <a:effectLst/>
+      </dsp:spPr>
+      <dsp:style>
+        <a:lnRef idx="0">
+          <a:scrgbClr r="0" g="0" b="0"/>
+        </a:lnRef>
+        <a:fillRef idx="1">
+          <a:scrgbClr r="0" g="0" b="0"/>
+        </a:fillRef>
+        <a:effectRef idx="0">
+          <a:scrgbClr r="0" g="0" b="0"/>
+        </a:effectRef>
+        <a:fontRef idx="minor">
+          <a:schemeClr val="lt1"/>
+        </a:fontRef>
+      </dsp:style>
+      <dsp:txBody>
+        <a:bodyPr spcFirstLastPara="0" vert="horz" wrap="square" lIns="0" tIns="0" rIns="0" bIns="0" numCol="1" spcCol="1270" anchor="ctr" anchorCtr="0">
+          <a:noAutofit/>
+        </a:bodyPr>
+        <a:lstStyle/>
+        <a:p>
+          <a:pPr lvl="0" algn="ctr" defTabSz="933450">
+            <a:lnSpc>
+              <a:spcPct val="90000"/>
+            </a:lnSpc>
+            <a:spcBef>
+              <a:spcPct val="0"/>
+            </a:spcBef>
+            <a:spcAft>
+              <a:spcPct val="35000"/>
+            </a:spcAft>
+          </a:pPr>
+          <a:endParaRPr lang="zh-CN" altLang="en-US" sz="2100" kern="1200"/>
+        </a:p>
+      </dsp:txBody>
+      <dsp:txXfrm>
+        <a:off x="2284114" y="1200770"/>
+        <a:ext cx="256871" cy="280056"/>
+      </dsp:txXfrm>
+    </dsp:sp>
+  </dsp:spTree>
+</dsp:drawing>
+</file>
+
+<file path=ppt/diagrams/layout1.xml><?xml version="1.0" encoding="utf-8"?>
+<dgm:layoutDef xmlns:dgm="http://schemas.openxmlformats.org/drawingml/2006/diagram" xmlns:a="http://schemas.openxmlformats.org/drawingml/2006/main" uniqueId="urn:microsoft.com/office/officeart/2005/8/layout/cycle2">
+  <dgm:title val=""/>
+  <dgm:desc val=""/>
+  <dgm:catLst>
+    <dgm:cat type="cycle" pri="1000"/>
+    <dgm:cat type="convert" pri="10000"/>
+  </dgm:catLst>
+  <dgm:sampData>
+    <dgm:dataModel>
+      <dgm:ptLst>
+        <dgm:pt modelId="0" type="doc"/>
+        <dgm:pt modelId="1">
+          <dgm:prSet phldr="1"/>
+        </dgm:pt>
+        <dgm:pt modelId="2">
+          <dgm:prSet phldr="1"/>
+        </dgm:pt>
+        <dgm:pt modelId="3">
+          <dgm:prSet phldr="1"/>
+        </dgm:pt>
+        <dgm:pt modelId="4">
+          <dgm:prSet phldr="1"/>
+        </dgm:pt>
+        <dgm:pt modelId="5">
+          <dgm:prSet phldr="1"/>
+        </dgm:pt>
+      </dgm:ptLst>
+      <dgm:cxnLst>
+        <dgm:cxn modelId="6" srcId="0" destId="1" srcOrd="0" destOrd="0"/>
+        <dgm:cxn modelId="7" srcId="0" destId="2" srcOrd="1" destOrd="0"/>
+        <dgm:cxn modelId="8" srcId="0" destId="3" srcOrd="2" destOrd="0"/>
+        <dgm:cxn modelId="9" srcId="0" destId="4" srcOrd="3" destOrd="0"/>
+        <dgm:cxn modelId="10" srcId="0" destId="5" srcOrd="4" destOrd="0"/>
+      </dgm:cxnLst>
+      <dgm:bg/>
+      <dgm:whole/>
+    </dgm:dataModel>
+  </dgm:sampData>
+  <dgm:styleData>
+    <dgm:dataModel>
+      <dgm:ptLst>
+        <dgm:pt modelId="0" type="doc"/>
+        <dgm:pt modelId="1"/>
+        <dgm:pt modelId="2"/>
+        <dgm:pt modelId="3"/>
+      </dgm:ptLst>
+      <dgm:cxnLst>
+        <dgm:cxn modelId="4" srcId="0" destId="1" srcOrd="0" destOrd="0"/>
+        <dgm:cxn modelId="5" srcId="0" destId="2" srcOrd="1" destOrd="0"/>
+        <dgm:cxn modelId="6" srcId="0" destId="3" srcOrd="2" destOrd="0"/>
+      </dgm:cxnLst>
+      <dgm:bg/>
+      <dgm:whole/>
+    </dgm:dataModel>
+  </dgm:styleData>
+  <dgm:clrData>
+    <dgm:dataModel>
+      <dgm:ptLst>
+        <dgm:pt modelId="0" type="doc"/>
+        <dgm:pt modelId="1"/>
+        <dgm:pt modelId="2"/>
+        <dgm:pt modelId="3"/>
+        <dgm:pt modelId="4"/>
+        <dgm:pt modelId="5"/>
+        <dgm:pt modelId="6"/>
+      </dgm:ptLst>
+      <dgm:cxnLst>
+        <dgm:cxn modelId="7" srcId="0" destId="1" srcOrd="0" destOrd="0"/>
+        <dgm:cxn modelId="8" srcId="0" destId="2" srcOrd="1" destOrd="0"/>
+        <dgm:cxn modelId="9" srcId="0" destId="3" srcOrd="2" destOrd="0"/>
+        <dgm:cxn modelId="10" srcId="0" destId="4" srcOrd="3" destOrd="0"/>
+        <dgm:cxn modelId="11" srcId="0" destId="5" srcOrd="4" destOrd="0"/>
+        <dgm:cxn modelId="12" srcId="0" destId="6" srcOrd="5" destOrd="0"/>
+      </dgm:cxnLst>
+      <dgm:bg/>
+      <dgm:whole/>
+    </dgm:dataModel>
+  </dgm:clrData>
+  <dgm:layoutNode name="cycle">
+    <dgm:varLst>
+      <dgm:dir/>
+      <dgm:resizeHandles val="exact"/>
+    </dgm:varLst>
+    <dgm:choose name="Name0">
+      <dgm:if name="Name1" func="var" arg="dir" op="equ" val="norm">
+        <dgm:choose name="Name2">
+          <dgm:if name="Name3" axis="ch" ptType="node" func="cnt" op="gt" val="2">
+            <dgm:alg type="cycle">
+              <dgm:param type="stAng" val="0"/>
+              <dgm:param type="spanAng" val="360"/>
+            </dgm:alg>
+          </dgm:if>
+          <dgm:else name="Name4">
+            <dgm:alg type="cycle">
+              <dgm:param type="stAng" val="-90"/>
+              <dgm:param type="spanAng" val="360"/>
+            </dgm:alg>
+          </dgm:else>
+        </dgm:choose>
+      </dgm:if>
+      <dgm:else name="Name5">
+        <dgm:choose name="Name6">
+          <dgm:if name="Name7" axis="ch" ptType="node" func="cnt" op="gt" val="2">
+            <dgm:alg type="cycle">
+              <dgm:param type="stAng" val="0"/>
+              <dgm:param type="spanAng" val="-360"/>
+            </dgm:alg>
+          </dgm:if>
+          <dgm:else name="Name8">
+            <dgm:alg type="cycle">
+              <dgm:param type="stAng" val="90"/>
+              <dgm:param type="spanAng" val="-360"/>
+            </dgm:alg>
+          </dgm:else>
+        </dgm:choose>
+      </dgm:else>
+    </dgm:choose>
+    <dgm:shape xmlns:r="http://schemas.openxmlformats.org/officeDocument/2006/relationships" r:blip="">
+      <dgm:adjLst/>
+    </dgm:shape>
+    <dgm:presOf/>
+    <dgm:constrLst>
+      <dgm:constr type="w" for="ch" ptType="node" refType="w"/>
+      <dgm:constr type="w" for="ch" ptType="sibTrans" refType="w" refFor="ch" refPtType="node" op="equ" fact="0.25"/>
+      <dgm:constr type="sibSp" refType="w" refFor="ch" refPtType="node" fact="0.5"/>
+      <dgm:constr type="primFontSz" for="ch" ptType="node" op="equ" val="65"/>
+      <dgm:constr type="primFontSz" for="des" forName="connectorText" op="equ" val="55"/>
+      <dgm:constr type="primFontSz" for="des" forName="connectorText" refType="primFontSz" refFor="ch" refPtType="node" op="lte" fact="0.8"/>
+    </dgm:constrLst>
+    <dgm:ruleLst/>
+    <dgm:forEach name="nodesForEach" axis="ch" ptType="node">
+      <dgm:layoutNode name="node">
+        <dgm:varLst>
+          <dgm:bulletEnabled val="1"/>
+        </dgm:varLst>
+        <dgm:alg type="tx">
+          <dgm:param type="txAnchorVertCh" val="mid"/>
+        </dgm:alg>
+        <dgm:shape xmlns:r="http://schemas.openxmlformats.org/officeDocument/2006/relationships" type="ellipse" r:blip="">
+          <dgm:adjLst/>
+        </dgm:shape>
+        <dgm:presOf axis="desOrSelf" ptType="node"/>
+        <dgm:constrLst>
+          <dgm:constr type="h" refType="w"/>
+          <dgm:constr type="lMarg" refType="primFontSz" fact="0.1"/>
+          <dgm:constr type="rMarg" refType="primFontSz" fact="0.1"/>
+          <dgm:constr type="tMarg" refType="primFontSz" fact="0.1"/>
+          <dgm:constr type="bMarg" refType="primFontSz" fact="0.1"/>
+        </dgm:constrLst>
+        <dgm:ruleLst>
+          <dgm:rule type="primFontSz" val="5" fact="NaN" max="NaN"/>
+        </dgm:ruleLst>
+      </dgm:layoutNode>
+      <dgm:choose name="Name9">
+        <dgm:if name="Name10" axis="par ch" ptType="doc node" func="cnt" op="gt" val="1">
+          <dgm:forEach name="sibTransForEach" axis="followSib" ptType="sibTrans" hideLastTrans="0" cnt="1">
+            <dgm:layoutNode name="sibTrans">
+              <dgm:choose name="Name11">
+                <dgm:if name="Name12" axis="par ch" ptType="doc node" func="cnt" op="lt" val="3">
+                  <dgm:alg type="conn">
+                    <dgm:param type="begPts" val="radial"/>
+                    <dgm:param type="endPts" val="radial"/>
+                  </dgm:alg>
+                </dgm:if>
+                <dgm:else name="Name13">
+                  <dgm:alg type="conn">
+                    <dgm:param type="begPts" val="auto"/>
+                    <dgm:param type="endPts" val="auto"/>
+                  </dgm:alg>
+                </dgm:else>
+              </dgm:choose>
+              <dgm:shape xmlns:r="http://schemas.openxmlformats.org/officeDocument/2006/relationships" type="conn" r:blip="">
+                <dgm:adjLst/>
+              </dgm:shape>
+              <dgm:presOf axis="self"/>
+              <dgm:constrLst>
+                <dgm:constr type="h" refType="w" fact="1.35"/>
+                <dgm:constr type="connDist"/>
+                <dgm:constr type="w" for="ch" refType="connDist" fact="0.45"/>
+                <dgm:constr type="h" for="ch" refType="h"/>
+              </dgm:constrLst>
+              <dgm:ruleLst/>
+              <dgm:layoutNode name="connectorText">
+                <dgm:alg type="tx">
+                  <dgm:param type="autoTxRot" val="grav"/>
+                </dgm:alg>
+                <dgm:shape xmlns:r="http://schemas.openxmlformats.org/officeDocument/2006/relationships" type="conn" r:blip="" hideGeom="1">
+                  <dgm:adjLst/>
+                </dgm:shape>
+                <dgm:presOf axis="self"/>
+                <dgm:constrLst>
+                  <dgm:constr type="lMarg"/>
+                  <dgm:constr type="rMarg"/>
+                  <dgm:constr type="tMarg"/>
+                  <dgm:constr type="bMarg"/>
+                </dgm:constrLst>
+                <dgm:ruleLst>
+                  <dgm:rule type="primFontSz" val="5" fact="NaN" max="NaN"/>
+                </dgm:ruleLst>
+              </dgm:layoutNode>
+            </dgm:layoutNode>
+          </dgm:forEach>
+        </dgm:if>
+        <dgm:else name="Name14"/>
+      </dgm:choose>
+    </dgm:forEach>
+  </dgm:layoutNode>
+</dgm:layoutDef>
+</file>
+
+<file path=ppt/diagrams/quickStyle1.xml><?xml version="1.0" encoding="utf-8"?>
+<dgm:styleDef xmlns:dgm="http://schemas.openxmlformats.org/drawingml/2006/diagram" xmlns:a="http://schemas.openxmlformats.org/drawingml/2006/main" uniqueId="urn:microsoft.com/office/officeart/2005/8/quickstyle/simple1">
+  <dgm:title val=""/>
+  <dgm:desc val=""/>
+  <dgm:catLst>
+    <dgm:cat type="simple" pri="10100"/>
+  </dgm:catLst>
+  <dgm:scene3d>
+    <a:camera prst="orthographicFront"/>
+    <a:lightRig rig="threePt" dir="t"/>
+  </dgm:scene3d>
+  <dgm:styleLbl name="node0">
+    <dgm:scene3d>
+      <a:camera prst="orthographicFront"/>
+      <a:lightRig rig="threePt" dir="t"/>
+    </dgm:scene3d>
+    <dgm:sp3d/>
+    <dgm:txPr/>
+    <dgm:style>
+      <a:lnRef idx="2">
+        <a:scrgbClr r="0" g="0" b="0"/>
+      </a:lnRef>
+      <a:fillRef idx="1">
+        <a:scrgbClr r="0" g="0" b="0"/>
+      </a:fillRef>
+      <a:effectRef idx="0">
+        <a:scrgbClr r="0" g="0" b="0"/>
+      </a:effectRef>
+      <a:fontRef idx="minor">
+        <a:schemeClr val="lt1"/>
+      </a:fontRef>
+    </dgm:style>
+  </dgm:styleLbl>
+  <dgm:styleLbl name="lnNode1">
+    <dgm:scene3d>
+      <a:camera prst="orthographicFront"/>
+      <a:lightRig rig="threePt" dir="t"/>
+    </dgm:scene3d>
+    <dgm:sp3d/>
+    <dgm:txPr/>
+    <dgm:style>
+      <a:lnRef idx="2">
+        <a:scrgbClr r="0" g="0" b="0"/>
+      </a:lnRef>
+      <a:fillRef idx="1">
+        <a:scrgbClr r="0" g="0" b="0"/>
+      </a:fillRef>
+      <a:effectRef idx="0">
+        <a:scrgbClr r="0" g="0" b="0"/>
+      </a:effectRef>
+      <a:fontRef idx="minor">
+        <a:schemeClr val="lt1"/>
+      </a:fontRef>
+    </dgm:style>
+  </dgm:styleLbl>
+  <dgm:styleLbl name="vennNode1">
+    <dgm:scene3d>
+      <a:camera prst="orthographicFront"/>
+      <a:lightRig rig="threePt" dir="t"/>
+    </dgm:scene3d>
+    <dgm:sp3d/>
+    <dgm:txPr/>
+    <dgm:style>
+      <a:lnRef idx="2">
+        <a:scrgbClr r="0" g="0" b="0"/>
+      </a:lnRef>
+      <a:fillRef idx="1">
+        <a:scrgbClr r="0" g="0" b="0"/>
+      </a:fillRef>
+      <a:effectRef idx="0">
+        <a:scrgbClr r="0" g="0" b="0"/>
+      </a:effectRef>
+      <a:fontRef idx="minor">
+        <a:schemeClr val="tx1"/>
+      </a:fontRef>
+    </dgm:style>
+  </dgm:styleLbl>
+  <dgm:styleLbl name="alignNode1">
+    <dgm:scene3d>
+      <a:camera prst="orthographicFront"/>
+      <a:lightRig rig="threePt" dir="t"/>
+    </dgm:scene3d>
+    <dgm:sp3d/>
+    <dgm:txPr/>
+    <dgm:style>
+      <a:lnRef idx="2">
+        <a:scrgbClr r="0" g="0" b="0"/>
+      </a:lnRef>
+      <a:fillRef idx="1">
+        <a:scrgbClr r="0" g="0" b="0"/>
+      </a:fillRef>
+      <a:effectRef idx="0">
+        <a:scrgbClr r="0" g="0" b="0"/>
+      </a:effectRef>
+      <a:fontRef idx="minor">
+        <a:schemeClr val="lt1"/>
+      </a:fontRef>
+    </dgm:style>
+  </dgm:styleLbl>
+  <dgm:styleLbl name="node1">
+    <dgm:scene3d>
+      <a:camera prst="orthographicFront"/>
+      <a:lightRig rig="threePt" dir="t"/>
+    </dgm:scene3d>
+    <dgm:sp3d/>
+    <dgm:txPr/>
+    <dgm:style>
+      <a:lnRef idx="2">
+        <a:scrgbClr r="0" g="0" b="0"/>
+      </a:lnRef>
+      <a:fillRef idx="1">
+        <a:scrgbClr r="0" g="0" b="0"/>
+      </a:fillRef>
+      <a:effectRef idx="0">
+        <a:scrgbClr r="0" g="0" b="0"/>
+      </a:effectRef>
+      <a:fontRef idx="minor">
+        <a:schemeClr val="lt1"/>
+      </a:fontRef>
+    </dgm:style>
+  </dgm:styleLbl>
+  <dgm:styleLbl name="node2">
+    <dgm:scene3d>
+      <a:camera prst="orthographicFront"/>
+      <a:lightRig rig="threePt" dir="t"/>
+    </dgm:scene3d>
+    <dgm:sp3d/>
+    <dgm:txPr/>
+    <dgm:style>
+      <a:lnRef idx="2">
+        <a:scrgbClr r="0" g="0" b="0"/>
+      </a:lnRef>
+      <a:fillRef idx="1">
+        <a:scrgbClr r="0" g="0" b="0"/>
+      </a:fillRef>
+      <a:effectRef idx="0">
+        <a:scrgbClr r="0" g="0" b="0"/>
+      </a:effectRef>
+      <a:fontRef idx="minor">
+        <a:schemeClr val="lt1"/>
+      </a:fontRef>
+    </dgm:style>
+  </dgm:styleLbl>
+  <dgm:styleLbl name="node3">
+    <dgm:scene3d>
+      <a:camera prst="orthographicFront"/>
+      <a:lightRig rig="threePt" dir="t"/>
+    </dgm:scene3d>
+    <dgm:sp3d/>
+    <dgm:txPr/>
+    <dgm:style>
+      <a:lnRef idx="2">
+        <a:scrgbClr r="0" g="0" b="0"/>
+      </a:lnRef>
+      <a:fillRef idx="1">
+        <a:scrgbClr r="0" g="0" b="0"/>
+      </a:fillRef>
+      <a:effectRef idx="0">
+        <a:scrgbClr r="0" g="0" b="0"/>
+      </a:effectRef>
+      <a:fontRef idx="minor">
+        <a:schemeClr val="lt1"/>
+      </a:fontRef>
+    </dgm:style>
+  </dgm:styleLbl>
+  <dgm:styleLbl name="node4">
+    <dgm:scene3d>
+      <a:camera prst="orthographicFront"/>
+      <a:lightRig rig="threePt" dir="t"/>
+    </dgm:scene3d>
+    <dgm:sp3d/>
+    <dgm:txPr/>
+    <dgm:style>
+      <a:lnRef idx="2">
+        <a:scrgbClr r="0" g="0" b="0"/>
+      </a:lnRef>
+      <a:fillRef idx="1">
+        <a:scrgbClr r="0" g="0" b="0"/>
+      </a:fillRef>
+      <a:effectRef idx="0">
+        <a:scrgbClr r="0" g="0" b="0"/>
+      </a:effectRef>
+      <a:fontRef idx="minor">
+        <a:schemeClr val="lt1"/>
+      </a:fontRef>
+    </dgm:style>
+  </dgm:styleLbl>
+  <dgm:styleLbl name="fgImgPlace1">
+    <dgm:scene3d>
+      <a:camera prst="orthographicFront"/>
+      <a:lightRig rig="threePt" dir="t"/>
+    </dgm:scene3d>
+    <dgm:sp3d/>
+    <dgm:txPr/>
+    <dgm:style>
+      <a:lnRef idx="2">
+        <a:scrgbClr r="0" g="0" b="0"/>
+      </a:lnRef>
+      <a:fillRef idx="1">
+        <a:scrgbClr r="0" g="0" b="0"/>
+      </a:fillRef>
+      <a:effectRef idx="0">
+        <a:scrgbClr r="0" g="0" b="0"/>
+      </a:effectRef>
+      <a:fontRef idx="minor"/>
+    </dgm:style>
+  </dgm:styleLbl>
+  <dgm:styleLbl name="alignImgPlace1">
+    <dgm:scene3d>
+      <a:camera prst="orthographicFront"/>
+      <a:lightRig rig="threePt" dir="t"/>
+    </dgm:scene3d>
+    <dgm:sp3d/>
+    <dgm:txPr/>
+    <dgm:style>
+      <a:lnRef idx="2">
+        <a:scrgbClr r="0" g="0" b="0"/>
+      </a:lnRef>
+      <a:fillRef idx="1">
+        <a:scrgbClr r="0" g="0" b="0"/>
+      </a:fillRef>
+      <a:effectRef idx="0">
+        <a:scrgbClr r="0" g="0" b="0"/>
+      </a:effectRef>
+      <a:fontRef idx="minor"/>
+    </dgm:style>
+  </dgm:styleLbl>
+  <dgm:styleLbl name="bgImgPlace1">
+    <dgm:scene3d>
+      <a:camera prst="orthographicFront"/>
+      <a:lightRig rig="threePt" dir="t"/>
+    </dgm:scene3d>
+    <dgm:sp3d/>
+    <dgm:txPr/>
+    <dgm:style>
+      <a:lnRef idx="2">
+        <a:scrgbClr r="0" g="0" b="0"/>
+      </a:lnRef>
+      <a:fillRef idx="1">
+        <a:scrgbClr r="0" g="0" b="0"/>
+      </a:fillRef>
+      <a:effectRef idx="0">
+        <a:scrgbClr r="0" g="0" b="0"/>
+      </a:effectRef>
+      <a:fontRef idx="minor"/>
+    </dgm:style>
+  </dgm:styleLbl>
+  <dgm:styleLbl name="sibTrans2D1">
+    <dgm:scene3d>
+      <a:camera prst="orthographicFront"/>
+      <a:lightRig rig="threePt" dir="t"/>
+    </dgm:scene3d>
+    <dgm:sp3d/>
+    <dgm:txPr/>
+    <dgm:style>
+      <a:lnRef idx="0">
+        <a:scrgbClr r="0" g="0" b="0"/>
+      </a:lnRef>
+      <a:fillRef idx="1">
+        <a:scrgbClr r="0" g="0" b="0"/>
+      </a:fillRef>
+      <a:effectRef idx="0">
+        <a:scrgbClr r="0" g="0" b="0"/>
+      </a:effectRef>
+      <a:fontRef idx="minor">
+        <a:schemeClr val="lt1"/>
+      </a:fontRef>
+    </dgm:style>
+  </dgm:styleLbl>
+  <dgm:styleLbl name="fgSibTrans2D1">
+    <dgm:scene3d>
+      <a:camera prst="orthographicFront"/>
+      <a:lightRig rig="threePt" dir="t"/>
+    </dgm:scene3d>
+    <dgm:sp3d/>
+    <dgm:txPr/>
+    <dgm:style>
+      <a:lnRef idx="0">
+        <a:scrgbClr r="0" g="0" b="0"/>
+      </a:lnRef>
+      <a:fillRef idx="1">
+        <a:scrgbClr r="0" g="0" b="0"/>
+      </a:fillRef>
+      <a:effectRef idx="0">
+        <a:scrgbClr r="0" g="0" b="0"/>
+      </a:effectRef>
+      <a:fontRef idx="minor">
+        <a:schemeClr val="lt1"/>
+      </a:fontRef>
+    </dgm:style>
+  </dgm:styleLbl>
+  <dgm:styleLbl name="bgSibTrans2D1">
+    <dgm:scene3d>
+      <a:camera prst="orthographicFront"/>
+      <a:lightRig rig="threePt" dir="t"/>
+    </dgm:scene3d>
+    <dgm:sp3d/>
+    <dgm:txPr/>
+    <dgm:style>
+      <a:lnRef idx="0">
+        <a:scrgbClr r="0" g="0" b="0"/>
+      </a:lnRef>
+      <a:fillRef idx="1">
+        <a:scrgbClr r="0" g="0" b="0"/>
+      </a:fillRef>
+      <a:effectRef idx="0">
+        <a:scrgbClr r="0" g="0" b="0"/>
+      </a:effectRef>
+      <a:fontRef idx="minor">
+        <a:schemeClr val="lt1"/>
+      </a:fontRef>
+    </dgm:style>
+  </dgm:styleLbl>
+  <dgm:styleLbl name="sibTrans1D1">
+    <dgm:scene3d>
+      <a:camera prst="orthographicFront"/>
+      <a:lightRig rig="threePt" dir="t"/>
+    </dgm:scene3d>
+    <dgm:sp3d/>
+    <dgm:txPr/>
+    <dgm:style>
+      <a:lnRef idx="1">
+        <a:scrgbClr r="0" g="0" b="0"/>
+      </a:lnRef>
+      <a:fillRef idx="0">
+        <a:scrgbClr r="0" g="0" b="0"/>
+      </a:fillRef>
+      <a:effectRef idx="0">
+        <a:scrgbClr r="0" g="0" b="0"/>
+      </a:effectRef>
+      <a:fontRef idx="minor"/>
+    </dgm:style>
+  </dgm:styleLbl>
+  <dgm:styleLbl name="callout">
+    <dgm:scene3d>
+      <a:camera prst="orthographicFront"/>
+      <a:lightRig rig="threePt" dir="t"/>
+    </dgm:scene3d>
+    <dgm:sp3d/>
+    <dgm:txPr/>
+    <dgm:style>
+      <a:lnRef idx="2">
+        <a:scrgbClr r="0" g="0" b="0"/>
+      </a:lnRef>
+      <a:fillRef idx="1">
+        <a:scrgbClr r="0" g="0" b="0"/>
+      </a:fillRef>
+      <a:effectRef idx="0">
+        <a:scrgbClr r="0" g="0" b="0"/>
+      </a:effectRef>
+      <a:fontRef idx="minor"/>
+    </dgm:style>
+  </dgm:styleLbl>
+  <dgm:styleLbl name="asst0">
+    <dgm:scene3d>
+      <a:camera prst="orthographicFront"/>
+      <a:lightRig rig="threePt" dir="t"/>
+    </dgm:scene3d>
+    <dgm:sp3d/>
+    <dgm:txPr/>
+    <dgm:style>
+      <a:lnRef idx="2">
+        <a:scrgbClr r="0" g="0" b="0"/>
+      </a:lnRef>
+      <a:fillRef idx="1">
+        <a:scrgbClr r="0" g="0" b="0"/>
+      </a:fillRef>
+      <a:effectRef idx="0">
+        <a:scrgbClr r="0" g="0" b="0"/>
+      </a:effectRef>
+      <a:fontRef idx="minor">
+        <a:schemeClr val="lt1"/>
+      </a:fontRef>
+    </dgm:style>
+  </dgm:styleLbl>
+  <dgm:styleLbl name="asst1">
+    <dgm:scene3d>
+      <a:camera prst="orthographicFront"/>
+      <a:lightRig rig="threePt" dir="t"/>
+    </dgm:scene3d>
+    <dgm:sp3d/>
+    <dgm:txPr/>
+    <dgm:style>
+      <a:lnRef idx="2">
+        <a:scrgbClr r="0" g="0" b="0"/>
+      </a:lnRef>
+      <a:fillRef idx="1">
+        <a:scrgbClr r="0" g="0" b="0"/>
+      </a:fillRef>
+      <a:effectRef idx="0">
+        <a:scrgbClr r="0" g="0" b="0"/>
+      </a:effectRef>
+      <a:fontRef idx="minor">
+        <a:schemeClr val="lt1"/>
+      </a:fontRef>
+    </dgm:style>
+  </dgm:styleLbl>
+  <dgm:styleLbl name="asst2">
+    <dgm:scene3d>
+      <a:camera prst="orthographicFront"/>
+      <a:lightRig rig="threePt" dir="t"/>
+    </dgm:scene3d>
+    <dgm:sp3d/>
+    <dgm:txPr/>
+    <dgm:style>
+      <a:lnRef idx="2">
+        <a:scrgbClr r="0" g="0" b="0"/>
+      </a:lnRef>
+      <a:fillRef idx="1">
+        <a:scrgbClr r="0" g="0" b="0"/>
+      </a:fillRef>
+      <a:effectRef idx="0">
+        <a:scrgbClr r="0" g="0" b="0"/>
+      </a:effectRef>
+      <a:fontRef idx="minor">
+        <a:schemeClr val="lt1"/>
+      </a:fontRef>
+    </dgm:style>
+  </dgm:styleLbl>
+  <dgm:styleLbl name="asst3">
+    <dgm:scene3d>
+      <a:camera prst="orthographicFront"/>
+      <a:lightRig rig="threePt" dir="t"/>
+    </dgm:scene3d>
+    <dgm:sp3d/>
+    <dgm:txPr/>
+    <dgm:style>
+      <a:lnRef idx="2">
+        <a:scrgbClr r="0" g="0" b="0"/>
+      </a:lnRef>
+      <a:fillRef idx="1">
+        <a:scrgbClr r="0" g="0" b="0"/>
+      </a:fillRef>
+      <a:effectRef idx="0">
+        <a:scrgbClr r="0" g="0" b="0"/>
+      </a:effectRef>
+      <a:fontRef idx="minor">
+        <a:schemeClr val="lt1"/>
+      </a:fontRef>
+    </dgm:style>
+  </dgm:styleLbl>
+  <dgm:styleLbl name="asst4">
+    <dgm:scene3d>
+      <a:camera prst="orthographicFront"/>
+      <a:lightRig rig="threePt" dir="t"/>
+    </dgm:scene3d>
+    <dgm:sp3d/>
+    <dgm:txPr/>
+    <dgm:style>
+      <a:lnRef idx="2">
+        <a:scrgbClr r="0" g="0" b="0"/>
+      </a:lnRef>
+      <a:fillRef idx="1">
+        <a:scrgbClr r="0" g="0" b="0"/>
+      </a:fillRef>
+      <a:effectRef idx="0">
+        <a:scrgbClr r="0" g="0" b="0"/>
+      </a:effectRef>
+      <a:fontRef idx="minor">
+        <a:schemeClr val="lt1"/>
+      </a:fontRef>
+    </dgm:style>
+  </dgm:styleLbl>
+  <dgm:styleLbl name="parChTrans2D1">
+    <dgm:scene3d>
+      <a:camera prst="orthographicFront"/>
+      <a:lightRig rig="threePt" dir="t"/>
+    </dgm:scene3d>
+    <dgm:sp3d/>
+    <dgm:txPr/>
+    <dgm:style>
+      <a:lnRef idx="2">
+        <a:scrgbClr r="0" g="0" b="0"/>
+      </a:lnRef>
+      <a:fillRef idx="1">
+        <a:scrgbClr r="0" g="0" b="0"/>
+      </a:fillRef>
+      <a:effectRef idx="0">
+        <a:scrgbClr r="0" g="0" b="0"/>
+      </a:effectRef>
+      <a:fontRef idx="minor">
+        <a:schemeClr val="lt1"/>
+      </a:fontRef>
+    </dgm:style>
+  </dgm:styleLbl>
+  <dgm:styleLbl name="parChTrans2D2">
+    <dgm:scene3d>
+      <a:camera prst="orthographicFront"/>
+      <a:lightRig rig="threePt" dir="t"/>
+    </dgm:scene3d>
+    <dgm:sp3d/>
+    <dgm:txPr/>
+    <dgm:style>
+      <a:lnRef idx="2">
+        <a:scrgbClr r="0" g="0" b="0"/>
+      </a:lnRef>
+      <a:fillRef idx="1">
+        <a:scrgbClr r="0" g="0" b="0"/>
+      </a:fillRef>
+      <a:effectRef idx="0">
+        <a:scrgbClr r="0" g="0" b="0"/>
+      </a:effectRef>
+      <a:fontRef idx="minor">
+        <a:schemeClr val="lt1"/>
+      </a:fontRef>
+    </dgm:style>
+  </dgm:styleLbl>
+  <dgm:styleLbl name="parChTrans2D3">
+    <dgm:scene3d>
+      <a:camera prst="orthographicFront"/>
+      <a:lightRig rig="threePt" dir="t"/>
+    </dgm:scene3d>
+    <dgm:sp3d/>
+    <dgm:txPr/>
+    <dgm:style>
+      <a:lnRef idx="2">
+        <a:scrgbClr r="0" g="0" b="0"/>
+      </a:lnRef>
+      <a:fillRef idx="1">
+        <a:scrgbClr r="0" g="0" b="0"/>
+      </a:fillRef>
+      <a:effectRef idx="0">
+        <a:scrgbClr r="0" g="0" b="0"/>
+      </a:effectRef>
+      <a:fontRef idx="minor">
+        <a:schemeClr val="lt1"/>
+      </a:fontRef>
+    </dgm:style>
+  </dgm:styleLbl>
+  <dgm:styleLbl name="parChTrans2D4">
+    <dgm:scene3d>
+      <a:camera prst="orthographicFront"/>
+      <a:lightRig rig="threePt" dir="t"/>
+    </dgm:scene3d>
+    <dgm:sp3d/>
+    <dgm:txPr/>
+    <dgm:style>
+      <a:lnRef idx="2">
+        <a:scrgbClr r="0" g="0" b="0"/>
+      </a:lnRef>
+      <a:fillRef idx="1">
+        <a:scrgbClr r="0" g="0" b="0"/>
+      </a:fillRef>
+      <a:effectRef idx="0">
+        <a:scrgbClr r="0" g="0" b="0"/>
+      </a:effectRef>
+      <a:fontRef idx="minor">
+        <a:schemeClr val="lt1"/>
+      </a:fontRef>
+    </dgm:style>
+  </dgm:styleLbl>
+  <dgm:styleLbl name="parChTrans1D1">
+    <dgm:scene3d>
+      <a:camera prst="orthographicFront"/>
+      <a:lightRig rig="threePt" dir="t"/>
+    </dgm:scene3d>
+    <dgm:sp3d/>
+    <dgm:txPr/>
+    <dgm:style>
+      <a:lnRef idx="2">
+        <a:scrgbClr r="0" g="0" b="0"/>
+      </a:lnRef>
+      <a:fillRef idx="0">
+        <a:scrgbClr r="0" g="0" b="0"/>
+      </a:fillRef>
+      <a:effectRef idx="0">
+        <a:scrgbClr r="0" g="0" b="0"/>
+      </a:effectRef>
+      <a:fontRef idx="minor"/>
+    </dgm:style>
+  </dgm:styleLbl>
+  <dgm:styleLbl name="parChTrans1D2">
+    <dgm:scene3d>
+      <a:camera prst="orthographicFront"/>
+      <a:lightRig rig="threePt" dir="t"/>
+    </dgm:scene3d>
+    <dgm:sp3d/>
+    <dgm:txPr/>
+    <dgm:style>
+      <a:lnRef idx="2">
+        <a:scrgbClr r="0" g="0" b="0"/>
+      </a:lnRef>
+      <a:fillRef idx="0">
+        <a:scrgbClr r="0" g="0" b="0"/>
+      </a:fillRef>
+      <a:effectRef idx="0">
+        <a:scrgbClr r="0" g="0" b="0"/>
+      </a:effectRef>
+      <a:fontRef idx="minor"/>
+    </dgm:style>
+  </dgm:styleLbl>
+  <dgm:styleLbl name="parChTrans1D3">
+    <dgm:scene3d>
+      <a:camera prst="orthographicFront"/>
+      <a:lightRig rig="threePt" dir="t"/>
+    </dgm:scene3d>
+    <dgm:sp3d/>
+    <dgm:txPr/>
+    <dgm:style>
+      <a:lnRef idx="2">
+        <a:scrgbClr r="0" g="0" b="0"/>
+      </a:lnRef>
+      <a:fillRef idx="0">
+        <a:scrgbClr r="0" g="0" b="0"/>
+      </a:fillRef>
+      <a:effectRef idx="0">
+        <a:scrgbClr r="0" g="0" b="0"/>
+      </a:effectRef>
+      <a:fontRef idx="minor"/>
+    </dgm:style>
+  </dgm:styleLbl>
+  <dgm:styleLbl name="parChTrans1D4">
+    <dgm:scene3d>
+      <a:camera prst="orthographicFront"/>
+      <a:lightRig rig="threePt" dir="t"/>
+    </dgm:scene3d>
+    <dgm:sp3d/>
+    <dgm:txPr/>
+    <dgm:style>
+      <a:lnRef idx="2">
+        <a:scrgbClr r="0" g="0" b="0"/>
+      </a:lnRef>
+      <a:fillRef idx="0">
+        <a:scrgbClr r="0" g="0" b="0"/>
+      </a:fillRef>
+      <a:effectRef idx="0">
+        <a:scrgbClr r="0" g="0" b="0"/>
+      </a:effectRef>
+      <a:fontRef idx="minor"/>
+    </dgm:style>
+  </dgm:styleLbl>
+  <dgm:styleLbl name="fgAcc1">
+    <dgm:scene3d>
+      <a:camera prst="orthographicFront"/>
+      <a:lightRig rig="threePt" dir="t"/>
+    </dgm:scene3d>
+    <dgm:sp3d/>
+    <dgm:txPr/>
+    <dgm:style>
+      <a:lnRef idx="2">
+        <a:scrgbClr r="0" g="0" b="0"/>
+      </a:lnRef>
+      <a:fillRef idx="1">
+        <a:scrgbClr r="0" g="0" b="0"/>
+      </a:fillRef>
+      <a:effectRef idx="0">
+        <a:scrgbClr r="0" g="0" b="0"/>
+      </a:effectRef>
+      <a:fontRef idx="minor"/>
+    </dgm:style>
+  </dgm:styleLbl>
+  <dgm:styleLbl name="conFgAcc1">
+    <dgm:scene3d>
+      <a:camera prst="orthographicFront"/>
+      <a:lightRig rig="threePt" dir="t"/>
+    </dgm:scene3d>
+    <dgm:sp3d/>
+    <dgm:txPr/>
+    <dgm:style>
+      <a:lnRef idx="2">
+        <a:scrgbClr r="0" g="0" b="0"/>
+      </a:lnRef>
+      <a:fillRef idx="1">
+        <a:scrgbClr r="0" g="0" b="0"/>
+      </a:fillRef>
+      <a:effectRef idx="0">
+        <a:scrgbClr r="0" g="0" b="0"/>
+      </a:effectRef>
+      <a:fontRef idx="minor"/>
+    </dgm:style>
+  </dgm:styleLbl>
+  <dgm:styleLbl name="alignAcc1">
+    <dgm:scene3d>
+      <a:camera prst="orthographicFront"/>
+      <a:lightRig rig="threePt" dir="t"/>
+    </dgm:scene3d>
+    <dgm:sp3d/>
+    <dgm:txPr/>
+    <dgm:style>
+      <a:lnRef idx="2">
+        <a:scrgbClr r="0" g="0" b="0"/>
+      </a:lnRef>
+      <a:fillRef idx="1">
+        <a:scrgbClr r="0" g="0" b="0"/>
+      </a:fillRef>
+      <a:effectRef idx="0">
+        <a:scrgbClr r="0" g="0" b="0"/>
+      </a:effectRef>
+      <a:fontRef idx="minor"/>
+    </dgm:style>
+  </dgm:styleLbl>
+  <dgm:styleLbl name="trAlignAcc1">
+    <dgm:scene3d>
+      <a:camera prst="orthographicFront"/>
+      <a:lightRig rig="threePt" dir="t"/>
+    </dgm:scene3d>
+    <dgm:sp3d/>
+    <dgm:txPr/>
+    <dgm:style>
+      <a:lnRef idx="1">
+        <a:scrgbClr r="0" g="0" b="0"/>
+      </a:lnRef>
+      <a:fillRef idx="1">
+        <a:scrgbClr r="0" g="0" b="0"/>
+      </a:fillRef>
+      <a:effectRef idx="0">
+        <a:scrgbClr r="0" g="0" b="0"/>
+      </a:effectRef>
+      <a:fontRef idx="minor"/>
+    </dgm:style>
+  </dgm:styleLbl>
+  <dgm:styleLbl name="bgAcc1">
+    <dgm:scene3d>
+      <a:camera prst="orthographicFront"/>
+      <a:lightRig rig="threePt" dir="t"/>
+    </dgm:scene3d>
+    <dgm:sp3d/>
+    <dgm:txPr/>
+    <dgm:style>
+      <a:lnRef idx="2">
+        <a:scrgbClr r="0" g="0" b="0"/>
+      </a:lnRef>
+      <a:fillRef idx="1">
+        <a:scrgbClr r="0" g="0" b="0"/>
+      </a:fillRef>
+      <a:effectRef idx="0">
+        <a:scrgbClr r="0" g="0" b="0"/>
+      </a:effectRef>
+      <a:fontRef idx="minor"/>
+    </dgm:style>
+  </dgm:styleLbl>
+  <dgm:styleLbl name="solidFgAcc1">
+    <dgm:scene3d>
+      <a:camera prst="orthographicFront"/>
+      <a:lightRig rig="threePt" dir="t"/>
+    </dgm:scene3d>
+    <dgm:sp3d/>
+    <dgm:txPr/>
+    <dgm:style>
+      <a:lnRef idx="2">
+        <a:scrgbClr r="0" g="0" b="0"/>
+      </a:lnRef>
+      <a:fillRef idx="1">
+        <a:scrgbClr r="0" g="0" b="0"/>
+      </a:fillRef>
+      <a:effectRef idx="0">
+        <a:scrgbClr r="0" g="0" b="0"/>
+      </a:effectRef>
+      <a:fontRef idx="minor"/>
+    </dgm:style>
+  </dgm:styleLbl>
+  <dgm:styleLbl name="solidAlignAcc1">
+    <dgm:scene3d>
+      <a:camera prst="orthographicFront"/>
+      <a:lightRig rig="threePt" dir="t"/>
+    </dgm:scene3d>
+    <dgm:sp3d/>
+    <dgm:txPr/>
+    <dgm:style>
+      <a:lnRef idx="2">
+        <a:scrgbClr r="0" g="0" b="0"/>
+      </a:lnRef>
+      <a:fillRef idx="1">
+        <a:scrgbClr r="0" g="0" b="0"/>
+      </a:fillRef>
+      <a:effectRef idx="0">
+        <a:scrgbClr r="0" g="0" b="0"/>
+      </a:effectRef>
+      <a:fontRef idx="minor"/>
+    </dgm:style>
+  </dgm:styleLbl>
+  <dgm:styleLbl name="solidBgAcc1">
+    <dgm:scene3d>
+      <a:camera prst="orthographicFront"/>
+      <a:lightRig rig="threePt" dir="t"/>
+    </dgm:scene3d>
+    <dgm:sp3d/>
+    <dgm:txPr/>
+    <dgm:style>
+      <a:lnRef idx="2">
+        <a:scrgbClr r="0" g="0" b="0"/>
+      </a:lnRef>
+      <a:fillRef idx="1">
+        <a:scrgbClr r="0" g="0" b="0"/>
+      </a:fillRef>
+      <a:effectRef idx="0">
+        <a:scrgbClr r="0" g="0" b="0"/>
+      </a:effectRef>
+      <a:fontRef idx="minor"/>
+    </dgm:style>
+  </dgm:styleLbl>
+  <dgm:styleLbl name="fgAccFollowNode1">
+    <dgm:scene3d>
+      <a:camera prst="orthographicFront"/>
+      <a:lightRig rig="threePt" dir="t"/>
+    </dgm:scene3d>
+    <dgm:sp3d/>
+    <dgm:txPr/>
+    <dgm:style>
+      <a:lnRef idx="2">
+        <a:scrgbClr r="0" g="0" b="0"/>
+      </a:lnRef>
+      <a:fillRef idx="1">
+        <a:scrgbClr r="0" g="0" b="0"/>
+      </a:fillRef>
+      <a:effectRef idx="0">
+        <a:scrgbClr r="0" g="0" b="0"/>
+      </a:effectRef>
+      <a:fontRef idx="minor"/>
+    </dgm:style>
+  </dgm:styleLbl>
+  <dgm:styleLbl name="alignAccFollowNode1">
+    <dgm:scene3d>
+      <a:camera prst="orthographicFront"/>
+      <a:lightRig rig="threePt" dir="t"/>
+    </dgm:scene3d>
+    <dgm:sp3d/>
+    <dgm:txPr/>
+    <dgm:style>
+      <a:lnRef idx="2">
+        <a:scrgbClr r="0" g="0" b="0"/>
+      </a:lnRef>
+      <a:fillRef idx="1">
+        <a:scrgbClr r="0" g="0" b="0"/>
+      </a:fillRef>
+      <a:effectRef idx="0">
+        <a:scrgbClr r="0" g="0" b="0"/>
+      </a:effectRef>
+      <a:fontRef idx="minor"/>
+    </dgm:style>
+  </dgm:styleLbl>
+  <dgm:styleLbl name="bgAccFollowNode1">
+    <dgm:scene3d>
+      <a:camera prst="orthographicFront"/>
+      <a:lightRig rig="threePt" dir="t"/>
+    </dgm:scene3d>
+    <dgm:sp3d/>
+    <dgm:txPr/>
+    <dgm:style>
+      <a:lnRef idx="2">
+        <a:scrgbClr r="0" g="0" b="0"/>
+      </a:lnRef>
+      <a:fillRef idx="1">
+        <a:scrgbClr r="0" g="0" b="0"/>
+      </a:fillRef>
+      <a:effectRef idx="0">
+        <a:scrgbClr r="0" g="0" b="0"/>
+      </a:effectRef>
+      <a:fontRef idx="minor"/>
+    </dgm:style>
+  </dgm:styleLbl>
+  <dgm:styleLbl name="fgAcc0">
+    <dgm:scene3d>
+      <a:camera prst="orthographicFront"/>
+      <a:lightRig rig="threePt" dir="t"/>
+    </dgm:scene3d>
+    <dgm:sp3d/>
+    <dgm:txPr/>
+    <dgm:style>
+      <a:lnRef idx="2">
+        <a:scrgbClr r="0" g="0" b="0"/>
+      </a:lnRef>
+      <a:fillRef idx="1">
+        <a:scrgbClr r="0" g="0" b="0"/>
+      </a:fillRef>
+      <a:effectRef idx="0">
+        <a:scrgbClr r="0" g="0" b="0"/>
+      </a:effectRef>
+      <a:fontRef idx="minor"/>
+    </dgm:style>
+  </dgm:styleLbl>
+  <dgm:styleLbl name="fgAcc2">
+    <dgm:scene3d>
+      <a:camera prst="orthographicFront"/>
+      <a:lightRig rig="threePt" dir="t"/>
+    </dgm:scene3d>
+    <dgm:sp3d/>
+    <dgm:txPr/>
+    <dgm:style>
+      <a:lnRef idx="2">
+        <a:scrgbClr r="0" g="0" b="0"/>
+      </a:lnRef>
+      <a:fillRef idx="1">
+        <a:scrgbClr r="0" g="0" b="0"/>
+      </a:fillRef>
+      <a:effectRef idx="0">
+        <a:scrgbClr r="0" g="0" b="0"/>
+      </a:effectRef>
+      <a:fontRef idx="minor"/>
+    </dgm:style>
+  </dgm:styleLbl>
+  <dgm:styleLbl name="fgAcc3">
+    <dgm:scene3d>
+      <a:camera prst="orthographicFront"/>
+      <a:lightRig rig="threePt" dir="t"/>
+    </dgm:scene3d>
+    <dgm:sp3d/>
+    <dgm:txPr/>
+    <dgm:style>
+      <a:lnRef idx="2">
+        <a:scrgbClr r="0" g="0" b="0"/>
+      </a:lnRef>
+      <a:fillRef idx="1">
+        <a:scrgbClr r="0" g="0" b="0"/>
+      </a:fillRef>
+      <a:effectRef idx="0">
+        <a:scrgbClr r="0" g="0" b="0"/>
+      </a:effectRef>
+      <a:fontRef idx="minor"/>
+    </dgm:style>
+  </dgm:styleLbl>
+  <dgm:styleLbl name="fgAcc4">
+    <dgm:scene3d>
+      <a:camera prst="orthographicFront"/>
+      <a:lightRig rig="threePt" dir="t"/>
+    </dgm:scene3d>
+    <dgm:sp3d/>
+    <dgm:txPr/>
+    <dgm:style>
+      <a:lnRef idx="2">
+        <a:scrgbClr r="0" g="0" b="0"/>
+      </a:lnRef>
+      <a:fillRef idx="1">
+        <a:scrgbClr r="0" g="0" b="0"/>
+      </a:fillRef>
+      <a:effectRef idx="0">
+        <a:scrgbClr r="0" g="0" b="0"/>
+      </a:effectRef>
+      <a:fontRef idx="minor"/>
+    </dgm:style>
+  </dgm:styleLbl>
+  <dgm:styleLbl name="bgShp">
+    <dgm:scene3d>
+      <a:camera prst="orthographicFront"/>
+      <a:lightRig rig="threePt" dir="t"/>
+    </dgm:scene3d>
+    <dgm:sp3d/>
+    <dgm:txPr/>
+    <dgm:style>
+      <a:lnRef idx="0">
+        <a:scrgbClr r="0" g="0" b="0"/>
+      </a:lnRef>
+      <a:fillRef idx="1">
+        <a:scrgbClr r="0" g="0" b="0"/>
+      </a:fillRef>
+      <a:effectRef idx="0">
+        <a:scrgbClr r="0" g="0" b="0"/>
+      </a:effectRef>
+      <a:fontRef idx="minor"/>
+    </dgm:style>
+  </dgm:styleLbl>
+  <dgm:styleLbl name="dkBgShp">
+    <dgm:scene3d>
+      <a:camera prst="orthographicFront"/>
+      <a:lightRig rig="threePt" dir="t"/>
+    </dgm:scene3d>
+    <dgm:sp3d/>
+    <dgm:txPr/>
+    <dgm:style>
+      <a:lnRef idx="0">
+        <a:scrgbClr r="0" g="0" b="0"/>
+      </a:lnRef>
+      <a:fillRef idx="1">
+        <a:scrgbClr r="0" g="0" b="0"/>
+      </a:fillRef>
+      <a:effectRef idx="0">
+        <a:scrgbClr r="0" g="0" b="0"/>
+      </a:effectRef>
+      <a:fontRef idx="minor"/>
+    </dgm:style>
+  </dgm:styleLbl>
+  <dgm:styleLbl name="trBgShp">
+    <dgm:scene3d>
+      <a:camera prst="orthographicFront"/>
+      <a:lightRig rig="threePt" dir="t"/>
+    </dgm:scene3d>
+    <dgm:sp3d/>
+    <dgm:txPr/>
+    <dgm:style>
+      <a:lnRef idx="0">
+        <a:scrgbClr r="0" g="0" b="0"/>
+      </a:lnRef>
+      <a:fillRef idx="1">
+        <a:scrgbClr r="0" g="0" b="0"/>
+      </a:fillRef>
+      <a:effectRef idx="0">
+        <a:scrgbClr r="0" g="0" b="0"/>
+      </a:effectRef>
+      <a:fontRef idx="minor"/>
+    </dgm:style>
+  </dgm:styleLbl>
+  <dgm:styleLbl name="fgShp">
+    <dgm:scene3d>
+      <a:camera prst="orthographicFront"/>
+      <a:lightRig rig="threePt" dir="t"/>
+    </dgm:scene3d>
+    <dgm:sp3d/>
+    <dgm:txPr/>
+    <dgm:style>
+      <a:lnRef idx="2">
+        <a:scrgbClr r="0" g="0" b="0"/>
+      </a:lnRef>
+      <a:fillRef idx="1">
+        <a:scrgbClr r="0" g="0" b="0"/>
+      </a:fillRef>
+      <a:effectRef idx="0">
+        <a:scrgbClr r="0" g="0" b="0"/>
+      </a:effectRef>
+      <a:fontRef idx="minor"/>
+    </dgm:style>
+  </dgm:styleLbl>
+  <dgm:styleLbl name="revTx">
+    <dgm:scene3d>
+      <a:camera prst="orthographicFront"/>
+      <a:lightRig rig="threePt" dir="t"/>
+    </dgm:scene3d>
+    <dgm:sp3d/>
+    <dgm:txPr/>
+    <dgm:style>
+      <a:lnRef idx="0">
+        <a:scrgbClr r="0" g="0" b="0"/>
+      </a:lnRef>
+      <a:fillRef idx="0">
+        <a:scrgbClr r="0" g="0" b="0"/>
+      </a:fillRef>
+      <a:effectRef idx="0">
+        <a:scrgbClr r="0" g="0" b="0"/>
+      </a:effectRef>
+      <a:fontRef idx="minor"/>
+    </dgm:style>
+  </dgm:styleLbl>
+</dgm:styleDef>
 </file>
 
 <file path=ppt/notesMasters/notesMaster1.xml><?xml version="1.0" encoding="utf-8"?>
@@ -885,13 +3988,8 @@
           <a:p>
             <a:r>
               <a:rPr lang="en-GB" dirty="0"/>
-              <a:t>Return and way </a:t>
+              <a:t>Return and way to home</a:t>
             </a:r>
-            <a:r>
-              <a:rPr lang="en-GB"/>
-              <a:t>to home</a:t>
-            </a:r>
-            <a:endParaRPr lang="en-GB" dirty="0"/>
           </a:p>
         </p:txBody>
       </p:sp>
@@ -23687,6 +26785,25 @@
   <p:clrMapOvr>
     <a:masterClrMapping/>
   </p:clrMapOvr>
+  <mc:AlternateContent xmlns:mc="http://schemas.openxmlformats.org/markup-compatibility/2006">
+    <mc:Choice xmlns:p15="http://schemas.microsoft.com/office/powerpoint/2012/main" Requires="p15">
+      <p:transition xmlns:p14="http://schemas.microsoft.com/office/powerpoint/2010/main" spd="slow" p14:dur="2000">
+        <p15:prstTrans prst="drape"/>
+      </p:transition>
+    </mc:Choice>
+    <mc:Fallback>
+      <p:transition spd="slow">
+        <p:fade/>
+      </p:transition>
+    </mc:Fallback>
+  </mc:AlternateContent>
+  <p:timing>
+    <p:tnLst>
+      <p:par>
+        <p:cTn id="1" dur="indefinite" restart="never" nodeType="tmRoot"/>
+      </p:par>
+    </p:tnLst>
+  </p:timing>
 </p:sld>
 </file>
 
@@ -23799,6 +26916,70 @@
           </a:p>
         </p:txBody>
       </p:sp>
+      <p:graphicFrame>
+        <p:nvGraphicFramePr>
+          <p:cNvPr id="4" name="图示 3"/>
+          <p:cNvGraphicFramePr/>
+          <p:nvPr>
+            <p:extLst>
+              <p:ext uri="{D42A27DB-BD31-4B8C-83A1-F6EECF244321}">
+                <p14:modId xmlns:p14="http://schemas.microsoft.com/office/powerpoint/2010/main" val="4294388367"/>
+              </p:ext>
+            </p:extLst>
+          </p:nvPr>
+        </p:nvGraphicFramePr>
+        <p:xfrm>
+          <a:off x="5325036" y="1731106"/>
+          <a:ext cx="6609976" cy="4578474"/>
+        </p:xfrm>
+        <a:graphic>
+          <a:graphicData uri="http://schemas.openxmlformats.org/drawingml/2006/diagram">
+            <dgm:relIds xmlns:dgm="http://schemas.openxmlformats.org/drawingml/2006/diagram" xmlns:r="http://schemas.openxmlformats.org/officeDocument/2006/relationships" r:dm="rId3" r:lo="rId4" r:qs="rId5" r:cs="rId6"/>
+          </a:graphicData>
+        </a:graphic>
+      </p:graphicFrame>
+      <p:pic>
+        <p:nvPicPr>
+          <p:cNvPr id="5" name="图片 4"/>
+          <p:cNvPicPr>
+            <a:picLocks noChangeAspect="1"/>
+          </p:cNvPicPr>
+          <p:nvPr/>
+        </p:nvPicPr>
+        <p:blipFill>
+          <a:blip r:embed="rId8">
+            <a:extLst>
+              <a:ext uri="{BEBA8EAE-BF5A-486C-A8C5-ECC9F3942E4B}">
+                <a14:imgProps xmlns:a14="http://schemas.microsoft.com/office/drawing/2010/main">
+                  <a14:imgLayer r:embed="rId9">
+                    <a14:imgEffect>
+                      <a14:backgroundRemoval t="10000" b="90000" l="10000" r="90000">
+                        <a14:foregroundMark x1="43750" y1="37000" x2="43750" y2="37000"/>
+                        <a14:foregroundMark x1="59000" y1="17000" x2="59000" y2="17000"/>
+                      </a14:backgroundRemoval>
+                    </a14:imgEffect>
+                  </a14:imgLayer>
+                </a14:imgProps>
+              </a:ext>
+              <a:ext uri="{28A0092B-C50C-407E-A947-70E740481C1C}">
+                <a14:useLocalDpi xmlns:a14="http://schemas.microsoft.com/office/drawing/2010/main" val="0"/>
+              </a:ext>
+            </a:extLst>
+          </a:blip>
+          <a:stretch>
+            <a:fillRect/>
+          </a:stretch>
+        </p:blipFill>
+        <p:spPr>
+          <a:xfrm>
+            <a:off x="7868397" y="1686423"/>
+            <a:ext cx="1523253" cy="1523253"/>
+          </a:xfrm>
+          <a:prstGeom prst="rect">
+            <a:avLst/>
+          </a:prstGeom>
+        </p:spPr>
+      </p:pic>
     </p:spTree>
     <p:extLst>
       <p:ext uri="{BB962C8B-B14F-4D97-AF65-F5344CB8AC3E}">
@@ -23809,6 +26990,248 @@
   <p:clrMapOvr>
     <a:masterClrMapping/>
   </p:clrMapOvr>
+  <mc:AlternateContent xmlns:mc="http://schemas.openxmlformats.org/markup-compatibility/2006">
+    <mc:Choice xmlns:p14="http://schemas.microsoft.com/office/powerpoint/2010/main" Requires="p14">
+      <p:transition spd="slow" p14:dur="4000">
+        <p14:vortex dir="r"/>
+      </p:transition>
+    </mc:Choice>
+    <mc:Fallback>
+      <p:transition spd="slow">
+        <p:fade/>
+      </p:transition>
+    </mc:Fallback>
+  </mc:AlternateContent>
+  <p:timing>
+    <p:tnLst>
+      <p:par>
+        <p:cTn id="1" dur="indefinite" restart="never" nodeType="tmRoot">
+          <p:childTnLst>
+            <p:seq concurrent="1" nextAc="seek">
+              <p:cTn id="2" dur="indefinite" nodeType="mainSeq">
+                <p:childTnLst>
+                  <p:par>
+                    <p:cTn id="3" fill="hold">
+                      <p:stCondLst>
+                        <p:cond delay="indefinite"/>
+                      </p:stCondLst>
+                      <p:childTnLst>
+                        <p:par>
+                          <p:cTn id="4" fill="hold">
+                            <p:stCondLst>
+                              <p:cond delay="0"/>
+                            </p:stCondLst>
+                            <p:childTnLst>
+                              <p:par>
+                                <p:cTn id="5" presetID="50" presetClass="path" presetSubtype="0" accel="50000" decel="50000" fill="hold" nodeType="clickEffect">
+                                  <p:stCondLst>
+                                    <p:cond delay="0"/>
+                                  </p:stCondLst>
+                                  <p:childTnLst>
+                                    <p:animMotion origin="layout" path="M -2.5E-6 -4.44444E-6 L 0.0711 -4.44444E-6 C 0.10287 -4.44444E-6 0.14219 0.04931 0.14219 0.08936 L 0.14219 0.17894 " pathEditMode="relative" rAng="0" ptsTypes="AAAA">
+                                      <p:cBhvr>
+                                        <p:cTn id="6" dur="2000" fill="hold"/>
+                                        <p:tgtEl>
+                                          <p:spTgt spid="5"/>
+                                        </p:tgtEl>
+                                        <p:attrNameLst>
+                                          <p:attrName>ppt_x</p:attrName>
+                                          <p:attrName>ppt_y</p:attrName>
+                                        </p:attrNameLst>
+                                      </p:cBhvr>
+                                      <p:rCtr x="7109" y="8935"/>
+                                    </p:animMotion>
+                                  </p:childTnLst>
+                                </p:cTn>
+                              </p:par>
+                            </p:childTnLst>
+                          </p:cTn>
+                        </p:par>
+                      </p:childTnLst>
+                    </p:cTn>
+                  </p:par>
+                  <p:par>
+                    <p:cTn id="7" fill="hold">
+                      <p:stCondLst>
+                        <p:cond delay="indefinite"/>
+                      </p:stCondLst>
+                      <p:childTnLst>
+                        <p:par>
+                          <p:cTn id="8" fill="hold">
+                            <p:stCondLst>
+                              <p:cond delay="0"/>
+                            </p:stCondLst>
+                            <p:childTnLst>
+                              <p:par>
+                                <p:cTn id="9" presetID="36" presetClass="path" presetSubtype="0" accel="50000" decel="50000" fill="hold" nodeType="clickEffect">
+                                  <p:stCondLst>
+                                    <p:cond delay="0"/>
+                                  </p:stCondLst>
+                                  <p:childTnLst>
+                                    <p:animMotion origin="layout" path="M 0.14219 0.17894 L 0.14219 0.32014 C 0.14219 0.38334 0.12552 0.46135 0.11198 0.46135 L 0.0819 0.46135 " pathEditMode="relative" rAng="0" ptsTypes="AAAA">
+                                      <p:cBhvr>
+                                        <p:cTn id="10" dur="2000" fill="hold"/>
+                                        <p:tgtEl>
+                                          <p:spTgt spid="5"/>
+                                        </p:tgtEl>
+                                        <p:attrNameLst>
+                                          <p:attrName>ppt_x</p:attrName>
+                                          <p:attrName>ppt_y</p:attrName>
+                                        </p:attrNameLst>
+                                      </p:cBhvr>
+                                      <p:rCtr x="-3021" y="14120"/>
+                                    </p:animMotion>
+                                  </p:childTnLst>
+                                </p:cTn>
+                              </p:par>
+                            </p:childTnLst>
+                          </p:cTn>
+                        </p:par>
+                      </p:childTnLst>
+                    </p:cTn>
+                  </p:par>
+                  <p:par>
+                    <p:cTn id="11" fill="hold">
+                      <p:stCondLst>
+                        <p:cond delay="indefinite"/>
+                      </p:stCondLst>
+                      <p:childTnLst>
+                        <p:par>
+                          <p:cTn id="12" fill="hold">
+                            <p:stCondLst>
+                              <p:cond delay="0"/>
+                            </p:stCondLst>
+                            <p:childTnLst>
+                              <p:par>
+                                <p:cTn id="13" presetID="37" presetClass="path" presetSubtype="0" accel="50000" decel="50000" fill="hold" nodeType="clickEffect">
+                                  <p:stCondLst>
+                                    <p:cond delay="0"/>
+                                  </p:stCondLst>
+                                  <p:childTnLst>
+                                    <p:animMotion origin="layout" path="M 0.0819 0.46135 L 0.03568 0.53658 C 0.02617 0.55348 0.01172 0.5632 -0.00338 0.5632 C -0.0207 0.5632 -0.0345 0.55348 -0.04401 0.53658 L -0.0901 0.46135 " pathEditMode="relative" rAng="0" ptsTypes="AAAAA">
+                                      <p:cBhvr>
+                                        <p:cTn id="14" dur="2000" fill="hold"/>
+                                        <p:tgtEl>
+                                          <p:spTgt spid="5"/>
+                                        </p:tgtEl>
+                                        <p:attrNameLst>
+                                          <p:attrName>ppt_x</p:attrName>
+                                          <p:attrName>ppt_y</p:attrName>
+                                        </p:attrNameLst>
+                                      </p:cBhvr>
+                                      <p:rCtr x="-8607" y="5093"/>
+                                    </p:animMotion>
+                                  </p:childTnLst>
+                                </p:cTn>
+                              </p:par>
+                            </p:childTnLst>
+                          </p:cTn>
+                        </p:par>
+                      </p:childTnLst>
+                    </p:cTn>
+                  </p:par>
+                  <p:par>
+                    <p:cTn id="15" fill="hold">
+                      <p:stCondLst>
+                        <p:cond delay="indefinite"/>
+                      </p:stCondLst>
+                      <p:childTnLst>
+                        <p:par>
+                          <p:cTn id="16" fill="hold">
+                            <p:stCondLst>
+                              <p:cond delay="0"/>
+                            </p:stCondLst>
+                            <p:childTnLst>
+                              <p:par>
+                                <p:cTn id="17" presetID="43" presetClass="path" presetSubtype="0" accel="50000" decel="50000" fill="hold" nodeType="clickEffect">
+                                  <p:stCondLst>
+                                    <p:cond delay="0"/>
+                                  </p:stCondLst>
+                                  <p:childTnLst>
+                                    <p:animMotion origin="layout" path="M -0.0901 0.46135 L -0.1181 0.46135 C -0.13073 0.46135 -0.14609 0.38264 -0.14609 0.31875 L -0.14609 0.17639 " pathEditMode="relative" rAng="0" ptsTypes="AAAA">
+                                      <p:cBhvr>
+                                        <p:cTn id="18" dur="2000" fill="hold"/>
+                                        <p:tgtEl>
+                                          <p:spTgt spid="5"/>
+                                        </p:tgtEl>
+                                        <p:attrNameLst>
+                                          <p:attrName>ppt_x</p:attrName>
+                                          <p:attrName>ppt_y</p:attrName>
+                                        </p:attrNameLst>
+                                      </p:cBhvr>
+                                      <p:rCtr x="-2799" y="-14259"/>
+                                    </p:animMotion>
+                                  </p:childTnLst>
+                                </p:cTn>
+                              </p:par>
+                            </p:childTnLst>
+                          </p:cTn>
+                        </p:par>
+                      </p:childTnLst>
+                    </p:cTn>
+                  </p:par>
+                  <p:par>
+                    <p:cTn id="19" fill="hold">
+                      <p:stCondLst>
+                        <p:cond delay="indefinite"/>
+                      </p:stCondLst>
+                      <p:childTnLst>
+                        <p:par>
+                          <p:cTn id="20" fill="hold">
+                            <p:stCondLst>
+                              <p:cond delay="0"/>
+                            </p:stCondLst>
+                            <p:childTnLst>
+                              <p:par>
+                                <p:cTn id="21" presetID="57" presetClass="path" presetSubtype="0" accel="50000" decel="50000" fill="hold" nodeType="clickEffect">
+                                  <p:stCondLst>
+                                    <p:cond delay="0"/>
+                                  </p:stCondLst>
+                                  <p:childTnLst>
+                                    <p:animMotion origin="layout" path="M -0.14609 0.17639 L -0.14609 0.0875 C -0.14609 0.04746 -0.10729 -0.00138 -0.07578 -0.00138 L -0.00547 -0.00138 " pathEditMode="relative" rAng="0" ptsTypes="AAAA">
+                                      <p:cBhvr>
+                                        <p:cTn id="22" dur="2000" fill="hold"/>
+                                        <p:tgtEl>
+                                          <p:spTgt spid="5"/>
+                                        </p:tgtEl>
+                                        <p:attrNameLst>
+                                          <p:attrName>ppt_x</p:attrName>
+                                          <p:attrName>ppt_y</p:attrName>
+                                        </p:attrNameLst>
+                                      </p:cBhvr>
+                                      <p:rCtr x="7031" y="-8889"/>
+                                    </p:animMotion>
+                                  </p:childTnLst>
+                                </p:cTn>
+                              </p:par>
+                            </p:childTnLst>
+                          </p:cTn>
+                        </p:par>
+                      </p:childTnLst>
+                    </p:cTn>
+                  </p:par>
+                </p:childTnLst>
+              </p:cTn>
+              <p:prevCondLst>
+                <p:cond evt="onPrev" delay="0">
+                  <p:tgtEl>
+                    <p:sldTgt/>
+                  </p:tgtEl>
+                </p:cond>
+              </p:prevCondLst>
+              <p:nextCondLst>
+                <p:cond evt="onNext" delay="0">
+                  <p:tgtEl>
+                    <p:sldTgt/>
+                  </p:tgtEl>
+                </p:cond>
+              </p:nextCondLst>
+            </p:seq>
+          </p:childTnLst>
+        </p:cTn>
+      </p:par>
+    </p:tnLst>
+  </p:timing>
 </p:sld>
 </file>
 

</xml_diff>

<commit_message>
Add graph of learning
</commit_message>
<xml_diff>
--- a/semester-2-2021-2022/week-8-theory-of-generalisation/Theory_of_Generalisation.pptx
+++ b/semester-2-2021-2022/week-8-theory-of-generalisation/Theory_of_Generalisation.pptx
@@ -5,11 +5,13 @@
     <p:sldMasterId id="2147483648" r:id="rId1"/>
   </p:sldMasterIdLst>
   <p:notesMasterIdLst>
-    <p:notesMasterId r:id="rId4"/>
+    <p:notesMasterId r:id="rId6"/>
   </p:notesMasterIdLst>
   <p:sldIdLst>
     <p:sldId id="256" r:id="rId2"/>
     <p:sldId id="258" r:id="rId3"/>
+    <p:sldId id="260" r:id="rId4"/>
+    <p:sldId id="261" r:id="rId5"/>
   </p:sldIdLst>
   <p:sldSz cx="12192000" cy="6858000"/>
   <p:notesSz cx="6858000" cy="9144000"/>
@@ -1255,13 +1257,6 @@
         </dgm:presLayoutVars>
       </dgm:prSet>
       <dgm:spPr/>
-      <dgm:t>
-        <a:bodyPr/>
-        <a:lstStyle/>
-        <a:p>
-          <a:endParaRPr lang="zh-CN" altLang="en-US"/>
-        </a:p>
-      </dgm:t>
     </dgm:pt>
     <dgm:pt modelId="{055CB64B-802B-45D3-8DF6-798EF262280D}" type="pres">
       <dgm:prSet presAssocID="{BC9D71E3-0CDB-4A3A-B7A7-0F91F98FE251}" presName="sibTrans" presStyleLbl="sibTrans2D1" presStyleIdx="0" presStyleCnt="5"/>
@@ -1337,27 +1332,27 @@
     </dgm:pt>
   </dgm:ptLst>
   <dgm:cxnLst>
+    <dgm:cxn modelId="{256DB814-F9A0-464C-820C-9BD5CA521B5E}" type="presOf" srcId="{9FA9C300-FCBA-453A-AB34-3EF865E7390C}" destId="{1E529B08-B3C9-4635-BABE-34B564A7237E}" srcOrd="1" destOrd="0" presId="urn:microsoft.com/office/officeart/2005/8/layout/cycle2"/>
+    <dgm:cxn modelId="{BD915119-0DC7-4B87-96EA-4F1A63CA0C85}" type="presOf" srcId="{4D900DEF-D16D-4B79-A224-033982676A84}" destId="{727D7562-439E-49ED-A028-4E7011E442FF}" srcOrd="1" destOrd="0" presId="urn:microsoft.com/office/officeart/2005/8/layout/cycle2"/>
+    <dgm:cxn modelId="{B4161E1D-0DEC-466D-9881-0DFFBAC97180}" srcId="{A128F0BD-DF9A-4BE9-A6A8-6C4754FCABDA}" destId="{BF35D190-A110-491B-B323-9435A8FDC80D}" srcOrd="3" destOrd="0" parTransId="{FD6D3DEB-2F0B-4721-A2AF-AE14C5A97346}" sibTransId="{38F8DD57-7454-4334-BBFA-B1B2ED12EB62}"/>
+    <dgm:cxn modelId="{73874220-CB27-419C-B883-A80C1DC54314}" srcId="{A128F0BD-DF9A-4BE9-A6A8-6C4754FCABDA}" destId="{B9D1CD18-C0CD-4CE2-B3EB-17CB254543C3}" srcOrd="2" destOrd="0" parTransId="{A5753D39-7978-4CEB-B6DE-3BA7147367AA}" sibTransId="{0173A0E4-2970-45BD-A922-296E968BEF38}"/>
+    <dgm:cxn modelId="{0AB98623-DF7D-48BE-BCB6-525066F06F6E}" srcId="{A128F0BD-DF9A-4BE9-A6A8-6C4754FCABDA}" destId="{FA71CF4A-4B11-49C3-8552-3F6B6E5B19A5}" srcOrd="1" destOrd="0" parTransId="{4024D651-5B90-4CE1-BAD7-8A545DFE3AFD}" sibTransId="{4D900DEF-D16D-4B79-A224-033982676A84}"/>
     <dgm:cxn modelId="{E5F7B85E-3C60-40DB-BF32-88D2EB02D2E6}" type="presOf" srcId="{BC9D71E3-0CDB-4A3A-B7A7-0F91F98FE251}" destId="{E9B7BEA1-3C66-47D9-9015-5CB2C3DF2CDC}" srcOrd="1" destOrd="0" presId="urn:microsoft.com/office/officeart/2005/8/layout/cycle2"/>
+    <dgm:cxn modelId="{4A51B046-94DD-4E8D-A488-0D896F537C8E}" type="presOf" srcId="{B9D1CD18-C0CD-4CE2-B3EB-17CB254543C3}" destId="{134C2103-362F-48D4-96DA-BDE499CBC320}" srcOrd="0" destOrd="0" presId="urn:microsoft.com/office/officeart/2005/8/layout/cycle2"/>
+    <dgm:cxn modelId="{FE98CA67-00DA-416B-BA6A-0AC2EC64615B}" type="presOf" srcId="{BC9D71E3-0CDB-4A3A-B7A7-0F91F98FE251}" destId="{055CB64B-802B-45D3-8DF6-798EF262280D}" srcOrd="0" destOrd="0" presId="urn:microsoft.com/office/officeart/2005/8/layout/cycle2"/>
+    <dgm:cxn modelId="{B8463A6D-145E-4069-A91F-68F086FA2AC9}" type="presOf" srcId="{0173A0E4-2970-45BD-A922-296E968BEF38}" destId="{A544EBAA-22E2-4148-9763-9BD8EDE01FA1}" srcOrd="0" destOrd="0" presId="urn:microsoft.com/office/officeart/2005/8/layout/cycle2"/>
+    <dgm:cxn modelId="{51EB1373-5A73-4B5C-8F4A-49BEDF66BDCC}" type="presOf" srcId="{0173A0E4-2970-45BD-A922-296E968BEF38}" destId="{3ED50FBC-50B3-47E6-BC24-CBD71A358D74}" srcOrd="1" destOrd="0" presId="urn:microsoft.com/office/officeart/2005/8/layout/cycle2"/>
+    <dgm:cxn modelId="{83B29E57-2FF2-4C36-9EA3-748D871ADD95}" srcId="{A128F0BD-DF9A-4BE9-A6A8-6C4754FCABDA}" destId="{EFAF03D5-A233-4C76-9B90-24B49649ACF5}" srcOrd="0" destOrd="0" parTransId="{FFFF8408-B268-4234-BC9D-07C7306BD323}" sibTransId="{BC9D71E3-0CDB-4A3A-B7A7-0F91F98FE251}"/>
+    <dgm:cxn modelId="{1B188F7A-92A0-4127-B03E-D23BA8B4EA7C}" type="presOf" srcId="{9FA9C300-FCBA-453A-AB34-3EF865E7390C}" destId="{B14F98F5-9C5B-4F53-A26B-4D903D14BB70}" srcOrd="0" destOrd="0" presId="urn:microsoft.com/office/officeart/2005/8/layout/cycle2"/>
+    <dgm:cxn modelId="{C78F8E84-1A01-48A2-A202-54A2F3160656}" type="presOf" srcId="{A128F0BD-DF9A-4BE9-A6A8-6C4754FCABDA}" destId="{1BAB9045-83AB-4518-BC90-032A2EEA33AF}" srcOrd="0" destOrd="0" presId="urn:microsoft.com/office/officeart/2005/8/layout/cycle2"/>
+    <dgm:cxn modelId="{5A4B148A-6930-49AA-B239-D45CA5722DE5}" type="presOf" srcId="{EFAF03D5-A233-4C76-9B90-24B49649ACF5}" destId="{FEF06E72-7C87-4202-890C-345EC1D9F44C}" srcOrd="0" destOrd="0" presId="urn:microsoft.com/office/officeart/2005/8/layout/cycle2"/>
+    <dgm:cxn modelId="{DEB3BB94-2958-4DC3-A53A-FF5A08B558B3}" srcId="{A128F0BD-DF9A-4BE9-A6A8-6C4754FCABDA}" destId="{D1CE2A32-EC64-4E44-BD3C-C22C54BFC1B6}" srcOrd="4" destOrd="0" parTransId="{8985A1AF-D973-4228-A8EE-56B610EAF48B}" sibTransId="{9FA9C300-FCBA-453A-AB34-3EF865E7390C}"/>
+    <dgm:cxn modelId="{DB9667AB-006E-4292-9138-F277560EEB2F}" type="presOf" srcId="{4D900DEF-D16D-4B79-A224-033982676A84}" destId="{A3B8EF27-070F-41BB-AB16-AA20761005A1}" srcOrd="0" destOrd="0" presId="urn:microsoft.com/office/officeart/2005/8/layout/cycle2"/>
+    <dgm:cxn modelId="{52460ECD-4B38-4BD6-9043-1021F62B5993}" type="presOf" srcId="{38F8DD57-7454-4334-BBFA-B1B2ED12EB62}" destId="{9E1B741C-8181-437D-9E3E-9993C461882A}" srcOrd="1" destOrd="0" presId="urn:microsoft.com/office/officeart/2005/8/layout/cycle2"/>
     <dgm:cxn modelId="{712678DC-5F77-4CC3-B04D-D6FA6056AECD}" type="presOf" srcId="{FA71CF4A-4B11-49C3-8552-3F6B6E5B19A5}" destId="{B99A717E-6875-46C4-93BD-02F76F4C7222}" srcOrd="0" destOrd="0" presId="urn:microsoft.com/office/officeart/2005/8/layout/cycle2"/>
-    <dgm:cxn modelId="{DEB3BB94-2958-4DC3-A53A-FF5A08B558B3}" srcId="{A128F0BD-DF9A-4BE9-A6A8-6C4754FCABDA}" destId="{D1CE2A32-EC64-4E44-BD3C-C22C54BFC1B6}" srcOrd="4" destOrd="0" parTransId="{8985A1AF-D973-4228-A8EE-56B610EAF48B}" sibTransId="{9FA9C300-FCBA-453A-AB34-3EF865E7390C}"/>
     <dgm:cxn modelId="{4CF074E4-3D78-466B-9918-447FBB90B486}" type="presOf" srcId="{38F8DD57-7454-4334-BBFA-B1B2ED12EB62}" destId="{231C9A01-8E86-4594-8128-CA1A309B1944}" srcOrd="0" destOrd="0" presId="urn:microsoft.com/office/officeart/2005/8/layout/cycle2"/>
-    <dgm:cxn modelId="{B8463A6D-145E-4069-A91F-68F086FA2AC9}" type="presOf" srcId="{0173A0E4-2970-45BD-A922-296E968BEF38}" destId="{A544EBAA-22E2-4148-9763-9BD8EDE01FA1}" srcOrd="0" destOrd="0" presId="urn:microsoft.com/office/officeart/2005/8/layout/cycle2"/>
-    <dgm:cxn modelId="{BD915119-0DC7-4B87-96EA-4F1A63CA0C85}" type="presOf" srcId="{4D900DEF-D16D-4B79-A224-033982676A84}" destId="{727D7562-439E-49ED-A028-4E7011E442FF}" srcOrd="1" destOrd="0" presId="urn:microsoft.com/office/officeart/2005/8/layout/cycle2"/>
+    <dgm:cxn modelId="{B3DC7FEA-5572-4A0B-A212-A3340C0576C3}" type="presOf" srcId="{D1CE2A32-EC64-4E44-BD3C-C22C54BFC1B6}" destId="{5C05611F-2FD6-4B23-8855-D8C95A3F0102}" srcOrd="0" destOrd="0" presId="urn:microsoft.com/office/officeart/2005/8/layout/cycle2"/>
     <dgm:cxn modelId="{0EBDB4EE-E5B9-4EB0-8F16-FE5756E6D133}" type="presOf" srcId="{BF35D190-A110-491B-B323-9435A8FDC80D}" destId="{CCCE5FE4-A079-4A90-B5D9-DC004E46B293}" srcOrd="0" destOrd="0" presId="urn:microsoft.com/office/officeart/2005/8/layout/cycle2"/>
-    <dgm:cxn modelId="{256DB814-F9A0-464C-820C-9BD5CA521B5E}" type="presOf" srcId="{9FA9C300-FCBA-453A-AB34-3EF865E7390C}" destId="{1E529B08-B3C9-4635-BABE-34B564A7237E}" srcOrd="1" destOrd="0" presId="urn:microsoft.com/office/officeart/2005/8/layout/cycle2"/>
-    <dgm:cxn modelId="{4A51B046-94DD-4E8D-A488-0D896F537C8E}" type="presOf" srcId="{B9D1CD18-C0CD-4CE2-B3EB-17CB254543C3}" destId="{134C2103-362F-48D4-96DA-BDE499CBC320}" srcOrd="0" destOrd="0" presId="urn:microsoft.com/office/officeart/2005/8/layout/cycle2"/>
-    <dgm:cxn modelId="{52460ECD-4B38-4BD6-9043-1021F62B5993}" type="presOf" srcId="{38F8DD57-7454-4334-BBFA-B1B2ED12EB62}" destId="{9E1B741C-8181-437D-9E3E-9993C461882A}" srcOrd="1" destOrd="0" presId="urn:microsoft.com/office/officeart/2005/8/layout/cycle2"/>
-    <dgm:cxn modelId="{DB9667AB-006E-4292-9138-F277560EEB2F}" type="presOf" srcId="{4D900DEF-D16D-4B79-A224-033982676A84}" destId="{A3B8EF27-070F-41BB-AB16-AA20761005A1}" srcOrd="0" destOrd="0" presId="urn:microsoft.com/office/officeart/2005/8/layout/cycle2"/>
-    <dgm:cxn modelId="{1B188F7A-92A0-4127-B03E-D23BA8B4EA7C}" type="presOf" srcId="{9FA9C300-FCBA-453A-AB34-3EF865E7390C}" destId="{B14F98F5-9C5B-4F53-A26B-4D903D14BB70}" srcOrd="0" destOrd="0" presId="urn:microsoft.com/office/officeart/2005/8/layout/cycle2"/>
-    <dgm:cxn modelId="{5A4B148A-6930-49AA-B239-D45CA5722DE5}" type="presOf" srcId="{EFAF03D5-A233-4C76-9B90-24B49649ACF5}" destId="{FEF06E72-7C87-4202-890C-345EC1D9F44C}" srcOrd="0" destOrd="0" presId="urn:microsoft.com/office/officeart/2005/8/layout/cycle2"/>
-    <dgm:cxn modelId="{51EB1373-5A73-4B5C-8F4A-49BEDF66BDCC}" type="presOf" srcId="{0173A0E4-2970-45BD-A922-296E968BEF38}" destId="{3ED50FBC-50B3-47E6-BC24-CBD71A358D74}" srcOrd="1" destOrd="0" presId="urn:microsoft.com/office/officeart/2005/8/layout/cycle2"/>
-    <dgm:cxn modelId="{B3DC7FEA-5572-4A0B-A212-A3340C0576C3}" type="presOf" srcId="{D1CE2A32-EC64-4E44-BD3C-C22C54BFC1B6}" destId="{5C05611F-2FD6-4B23-8855-D8C95A3F0102}" srcOrd="0" destOrd="0" presId="urn:microsoft.com/office/officeart/2005/8/layout/cycle2"/>
-    <dgm:cxn modelId="{C78F8E84-1A01-48A2-A202-54A2F3160656}" type="presOf" srcId="{A128F0BD-DF9A-4BE9-A6A8-6C4754FCABDA}" destId="{1BAB9045-83AB-4518-BC90-032A2EEA33AF}" srcOrd="0" destOrd="0" presId="urn:microsoft.com/office/officeart/2005/8/layout/cycle2"/>
-    <dgm:cxn modelId="{73874220-CB27-419C-B883-A80C1DC54314}" srcId="{A128F0BD-DF9A-4BE9-A6A8-6C4754FCABDA}" destId="{B9D1CD18-C0CD-4CE2-B3EB-17CB254543C3}" srcOrd="2" destOrd="0" parTransId="{A5753D39-7978-4CEB-B6DE-3BA7147367AA}" sibTransId="{0173A0E4-2970-45BD-A922-296E968BEF38}"/>
-    <dgm:cxn modelId="{B4161E1D-0DEC-466D-9881-0DFFBAC97180}" srcId="{A128F0BD-DF9A-4BE9-A6A8-6C4754FCABDA}" destId="{BF35D190-A110-491B-B323-9435A8FDC80D}" srcOrd="3" destOrd="0" parTransId="{FD6D3DEB-2F0B-4721-A2AF-AE14C5A97346}" sibTransId="{38F8DD57-7454-4334-BBFA-B1B2ED12EB62}"/>
-    <dgm:cxn modelId="{83B29E57-2FF2-4C36-9EA3-748D871ADD95}" srcId="{A128F0BD-DF9A-4BE9-A6A8-6C4754FCABDA}" destId="{EFAF03D5-A233-4C76-9B90-24B49649ACF5}" srcOrd="0" destOrd="0" parTransId="{FFFF8408-B268-4234-BC9D-07C7306BD323}" sibTransId="{BC9D71E3-0CDB-4A3A-B7A7-0F91F98FE251}"/>
-    <dgm:cxn modelId="{FE98CA67-00DA-416B-BA6A-0AC2EC64615B}" type="presOf" srcId="{BC9D71E3-0CDB-4A3A-B7A7-0F91F98FE251}" destId="{055CB64B-802B-45D3-8DF6-798EF262280D}" srcOrd="0" destOrd="0" presId="urn:microsoft.com/office/officeart/2005/8/layout/cycle2"/>
-    <dgm:cxn modelId="{0AB98623-DF7D-48BE-BCB6-525066F06F6E}" srcId="{A128F0BD-DF9A-4BE9-A6A8-6C4754FCABDA}" destId="{FA71CF4A-4B11-49C3-8552-3F6B6E5B19A5}" srcOrd="1" destOrd="0" parTransId="{4024D651-5B90-4CE1-BAD7-8A545DFE3AFD}" sibTransId="{4D900DEF-D16D-4B79-A224-033982676A84}"/>
     <dgm:cxn modelId="{C3441030-BEFD-4EDE-8140-D1A54E93DC95}" type="presParOf" srcId="{1BAB9045-83AB-4518-BC90-032A2EEA33AF}" destId="{FEF06E72-7C87-4202-890C-345EC1D9F44C}" srcOrd="0" destOrd="0" presId="urn:microsoft.com/office/officeart/2005/8/layout/cycle2"/>
     <dgm:cxn modelId="{97DFACDD-DE04-43CB-BAB7-F09C82292413}" type="presParOf" srcId="{1BAB9045-83AB-4518-BC90-032A2EEA33AF}" destId="{055CB64B-802B-45D3-8DF6-798EF262280D}" srcOrd="1" destOrd="0" presId="urn:microsoft.com/office/officeart/2005/8/layout/cycle2"/>
     <dgm:cxn modelId="{A3F93355-A74F-45A6-B76A-7BB63DC393BF}" type="presParOf" srcId="{055CB64B-802B-45D3-8DF6-798EF262280D}" destId="{E9B7BEA1-3C66-47D9-9015-5CB2C3DF2CDC}" srcOrd="0" destOrd="0" presId="urn:microsoft.com/office/officeart/2005/8/layout/cycle2"/>
@@ -1447,7 +1442,7 @@
         </a:bodyPr>
         <a:lstStyle/>
         <a:p>
-          <a:pPr lvl="0" algn="ctr" defTabSz="1377950">
+          <a:pPr marL="0" lvl="0" indent="0" algn="ctr" defTabSz="1377950">
             <a:lnSpc>
               <a:spcPct val="90000"/>
             </a:lnSpc>
@@ -1457,6 +1452,7 @@
             <a:spcAft>
               <a:spcPct val="35000"/>
             </a:spcAft>
+            <a:buNone/>
           </a:pPr>
           <a:endParaRPr lang="zh-CN" altLang="en-US" sz="3100" kern="1200" dirty="0"/>
         </a:p>
@@ -1516,7 +1512,7 @@
         </a:bodyPr>
         <a:lstStyle/>
         <a:p>
-          <a:pPr lvl="0" algn="ctr" defTabSz="933450">
+          <a:pPr marL="0" lvl="0" indent="0" algn="ctr" defTabSz="933450">
             <a:lnSpc>
               <a:spcPct val="90000"/>
             </a:lnSpc>
@@ -1526,6 +1522,7 @@
             <a:spcAft>
               <a:spcPct val="35000"/>
             </a:spcAft>
+            <a:buNone/>
           </a:pPr>
           <a:endParaRPr lang="zh-CN" altLang="en-US" sz="2100" kern="1200"/>
         </a:p>
@@ -1590,7 +1587,7 @@
         </a:bodyPr>
         <a:lstStyle/>
         <a:p>
-          <a:pPr lvl="0" algn="ctr" defTabSz="1377950">
+          <a:pPr marL="0" lvl="0" indent="0" algn="ctr" defTabSz="1377950">
             <a:lnSpc>
               <a:spcPct val="90000"/>
             </a:lnSpc>
@@ -1600,6 +1597,7 @@
             <a:spcAft>
               <a:spcPct val="35000"/>
             </a:spcAft>
+            <a:buNone/>
           </a:pPr>
           <a:endParaRPr lang="zh-CN" altLang="en-US" sz="3100" kern="1200"/>
         </a:p>
@@ -1659,7 +1657,7 @@
         </a:bodyPr>
         <a:lstStyle/>
         <a:p>
-          <a:pPr lvl="0" algn="ctr" defTabSz="933450">
+          <a:pPr marL="0" lvl="0" indent="0" algn="ctr" defTabSz="933450">
             <a:lnSpc>
               <a:spcPct val="90000"/>
             </a:lnSpc>
@@ -1669,6 +1667,7 @@
             <a:spcAft>
               <a:spcPct val="35000"/>
             </a:spcAft>
+            <a:buNone/>
           </a:pPr>
           <a:endParaRPr lang="zh-CN" altLang="en-US" sz="2100" kern="1200"/>
         </a:p>
@@ -1733,7 +1732,7 @@
         </a:bodyPr>
         <a:lstStyle/>
         <a:p>
-          <a:pPr lvl="0" algn="ctr" defTabSz="1377950">
+          <a:pPr marL="0" lvl="0" indent="0" algn="ctr" defTabSz="1377950">
             <a:lnSpc>
               <a:spcPct val="90000"/>
             </a:lnSpc>
@@ -1743,6 +1742,7 @@
             <a:spcAft>
               <a:spcPct val="35000"/>
             </a:spcAft>
+            <a:buNone/>
           </a:pPr>
           <a:endParaRPr lang="zh-CN" altLang="en-US" sz="3100" kern="1200"/>
         </a:p>
@@ -1802,7 +1802,7 @@
         </a:bodyPr>
         <a:lstStyle/>
         <a:p>
-          <a:pPr lvl="0" algn="ctr" defTabSz="933450">
+          <a:pPr marL="0" lvl="0" indent="0" algn="ctr" defTabSz="933450">
             <a:lnSpc>
               <a:spcPct val="90000"/>
             </a:lnSpc>
@@ -1812,6 +1812,7 @@
             <a:spcAft>
               <a:spcPct val="35000"/>
             </a:spcAft>
+            <a:buNone/>
           </a:pPr>
           <a:endParaRPr lang="zh-CN" altLang="en-US" sz="2100" kern="1200"/>
         </a:p>
@@ -1876,7 +1877,7 @@
         </a:bodyPr>
         <a:lstStyle/>
         <a:p>
-          <a:pPr lvl="0" algn="ctr" defTabSz="1377950">
+          <a:pPr marL="0" lvl="0" indent="0" algn="ctr" defTabSz="1377950">
             <a:lnSpc>
               <a:spcPct val="90000"/>
             </a:lnSpc>
@@ -1886,6 +1887,7 @@
             <a:spcAft>
               <a:spcPct val="35000"/>
             </a:spcAft>
+            <a:buNone/>
           </a:pPr>
           <a:endParaRPr lang="zh-CN" altLang="en-US" sz="3100" kern="1200"/>
         </a:p>
@@ -1945,7 +1947,7 @@
         </a:bodyPr>
         <a:lstStyle/>
         <a:p>
-          <a:pPr lvl="0" algn="ctr" defTabSz="933450">
+          <a:pPr marL="0" lvl="0" indent="0" algn="ctr" defTabSz="933450">
             <a:lnSpc>
               <a:spcPct val="90000"/>
             </a:lnSpc>
@@ -1955,6 +1957,7 @@
             <a:spcAft>
               <a:spcPct val="35000"/>
             </a:spcAft>
+            <a:buNone/>
           </a:pPr>
           <a:endParaRPr lang="zh-CN" altLang="en-US" sz="2100" kern="1200"/>
         </a:p>
@@ -2019,7 +2022,7 @@
         </a:bodyPr>
         <a:lstStyle/>
         <a:p>
-          <a:pPr lvl="0" algn="ctr" defTabSz="1377950">
+          <a:pPr marL="0" lvl="0" indent="0" algn="ctr" defTabSz="1377950">
             <a:lnSpc>
               <a:spcPct val="90000"/>
             </a:lnSpc>
@@ -2029,6 +2032,7 @@
             <a:spcAft>
               <a:spcPct val="35000"/>
             </a:spcAft>
+            <a:buNone/>
           </a:pPr>
           <a:endParaRPr lang="zh-CN" altLang="en-US" sz="3100" kern="1200"/>
         </a:p>
@@ -2088,7 +2092,7 @@
         </a:bodyPr>
         <a:lstStyle/>
         <a:p>
-          <a:pPr lvl="0" algn="ctr" defTabSz="933450">
+          <a:pPr marL="0" lvl="0" indent="0" algn="ctr" defTabSz="933450">
             <a:lnSpc>
               <a:spcPct val="90000"/>
             </a:lnSpc>
@@ -2098,6 +2102,7 @@
             <a:spcAft>
               <a:spcPct val="35000"/>
             </a:spcAft>
+            <a:buNone/>
           </a:pPr>
           <a:endParaRPr lang="zh-CN" altLang="en-US" sz="2100" kern="1200"/>
         </a:p>
@@ -3958,37 +3963,43 @@
           <a:p>
             <a:r>
               <a:rPr lang="en-GB" dirty="0"/>
+              <a:t>To me, after doing some research and study in this topic, I truly feel like this whole process of the problem assimilates to a hero’s journey</a:t>
+            </a:r>
+          </a:p>
+          <a:p>
+            <a:r>
+              <a:rPr lang="en-GB" dirty="0"/>
               <a:t>The hero’s journey according Vogler</a:t>
             </a:r>
           </a:p>
           <a:p>
             <a:r>
               <a:rPr lang="en-GB" dirty="0"/>
-              <a:t>Ordinary world, call for adventure</a:t>
+              <a:t>Ordinary world, call for adventure - Generalisation</a:t>
             </a:r>
           </a:p>
           <a:p>
             <a:r>
               <a:rPr lang="en-GB" dirty="0"/>
-              <a:t>Approach to the inmost cave, the trial</a:t>
+              <a:t>Approach to the inmost cave, the trial – The learning problem</a:t>
             </a:r>
           </a:p>
           <a:p>
             <a:r>
               <a:rPr lang="en-GB" dirty="0"/>
-              <a:t>Reward, the road back</a:t>
+              <a:t>Reward, the road back – Probabilistic assumption</a:t>
             </a:r>
           </a:p>
           <a:p>
             <a:r>
               <a:rPr lang="en-GB" dirty="0"/>
-              <a:t>The final ordeal, resurrection</a:t>
+              <a:t>The final ordeal, resurrection - Proofs</a:t>
             </a:r>
           </a:p>
           <a:p>
             <a:r>
               <a:rPr lang="en-GB" dirty="0"/>
-              <a:t>Return and way to home</a:t>
+              <a:t>Return and way to home – Learning is possible</a:t>
             </a:r>
           </a:p>
         </p:txBody>
@@ -3997,6 +4008,200 @@
     <p:extLst>
       <p:ext uri="{BB962C8B-B14F-4D97-AF65-F5344CB8AC3E}">
         <p14:creationId xmlns:p14="http://schemas.microsoft.com/office/powerpoint/2010/main" val="1285949584"/>
+      </p:ext>
+    </p:extLst>
+  </p:cSld>
+  <p:clrMapOvr>
+    <a:masterClrMapping/>
+  </p:clrMapOvr>
+</p:notes>
+</file>
+
+<file path=ppt/notesSlides/notesSlide3.xml><?xml version="1.0" encoding="utf-8"?>
+<p:notes xmlns:a="http://schemas.openxmlformats.org/drawingml/2006/main" xmlns:r="http://schemas.openxmlformats.org/officeDocument/2006/relationships" xmlns:p="http://schemas.openxmlformats.org/presentationml/2006/main">
+  <p:cSld>
+    <p:spTree>
+      <p:nvGrpSpPr>
+        <p:cNvPr id="1" name=""/>
+        <p:cNvGrpSpPr/>
+        <p:nvPr/>
+      </p:nvGrpSpPr>
+      <p:grpSpPr>
+        <a:xfrm>
+          <a:off x="0" y="0"/>
+          <a:ext cx="0" cy="0"/>
+          <a:chOff x="0" y="0"/>
+          <a:chExt cx="0" cy="0"/>
+        </a:xfrm>
+      </p:grpSpPr>
+      <p:sp>
+        <p:nvSpPr>
+          <p:cNvPr id="2" name="Slide Image Placeholder 1"/>
+          <p:cNvSpPr>
+            <a:spLocks noGrp="1" noRot="1" noChangeAspect="1"/>
+          </p:cNvSpPr>
+          <p:nvPr>
+            <p:ph type="sldImg"/>
+          </p:nvPr>
+        </p:nvSpPr>
+        <p:spPr>
+          <a:xfrm>
+            <a:off x="381000" y="685800"/>
+            <a:ext cx="6096000" cy="3429000"/>
+          </a:xfrm>
+        </p:spPr>
+      </p:sp>
+      <p:sp>
+        <p:nvSpPr>
+          <p:cNvPr id="3" name="Notes Placeholder 2"/>
+          <p:cNvSpPr>
+            <a:spLocks noGrp="1"/>
+          </p:cNvSpPr>
+          <p:nvPr>
+            <p:ph type="body" idx="1"/>
+          </p:nvPr>
+        </p:nvSpPr>
+        <p:spPr/>
+        <p:txBody>
+          <a:bodyPr/>
+          <a:lstStyle/>
+          <a:p>
+            <a:r>
+              <a:rPr lang="en-GB" dirty="0"/>
+              <a:t>First of all, some acknowledgement. The content of this workshop heavily relies on a course from this professor, </a:t>
+            </a:r>
+            <a:r>
+              <a:rPr lang="en-GB" dirty="0" err="1"/>
+              <a:t>Yaser</a:t>
+            </a:r>
+            <a:r>
+              <a:rPr lang="en-GB" dirty="0"/>
+              <a:t> Abu-Mostafa, from Caltech university</a:t>
+            </a:r>
+          </a:p>
+          <a:p>
+            <a:r>
+              <a:rPr lang="en-GB" dirty="0"/>
+              <a:t>If anyone wants to dig a bit deeper, please follow his book called learning from data</a:t>
+            </a:r>
+          </a:p>
+          <a:p>
+            <a:r>
+              <a:rPr lang="en-GB" dirty="0"/>
+              <a:t>I also highly recommend his course on YouTube, which is a series of video that will surely empower your machine learning understanding and skills</a:t>
+            </a:r>
+          </a:p>
+        </p:txBody>
+      </p:sp>
+    </p:spTree>
+    <p:extLst>
+      <p:ext uri="{BB962C8B-B14F-4D97-AF65-F5344CB8AC3E}">
+        <p14:creationId xmlns:p14="http://schemas.microsoft.com/office/powerpoint/2010/main" val="2559382500"/>
+      </p:ext>
+    </p:extLst>
+  </p:cSld>
+  <p:clrMapOvr>
+    <a:masterClrMapping/>
+  </p:clrMapOvr>
+</p:notes>
+</file>
+
+<file path=ppt/notesSlides/notesSlide4.xml><?xml version="1.0" encoding="utf-8"?>
+<p:notes xmlns:a="http://schemas.openxmlformats.org/drawingml/2006/main" xmlns:r="http://schemas.openxmlformats.org/officeDocument/2006/relationships" xmlns:p="http://schemas.openxmlformats.org/presentationml/2006/main">
+  <p:cSld>
+    <p:spTree>
+      <p:nvGrpSpPr>
+        <p:cNvPr id="1" name=""/>
+        <p:cNvGrpSpPr/>
+        <p:nvPr/>
+      </p:nvGrpSpPr>
+      <p:grpSpPr>
+        <a:xfrm>
+          <a:off x="0" y="0"/>
+          <a:ext cx="0" cy="0"/>
+          <a:chOff x="0" y="0"/>
+          <a:chExt cx="0" cy="0"/>
+        </a:xfrm>
+      </p:grpSpPr>
+      <p:sp>
+        <p:nvSpPr>
+          <p:cNvPr id="2" name="Slide Image Placeholder 1"/>
+          <p:cNvSpPr>
+            <a:spLocks noGrp="1" noRot="1" noChangeAspect="1"/>
+          </p:cNvSpPr>
+          <p:nvPr>
+            <p:ph type="sldImg"/>
+          </p:nvPr>
+        </p:nvSpPr>
+        <p:spPr>
+          <a:xfrm>
+            <a:off x="381000" y="685800"/>
+            <a:ext cx="6096000" cy="3429000"/>
+          </a:xfrm>
+        </p:spPr>
+      </p:sp>
+      <p:sp>
+        <p:nvSpPr>
+          <p:cNvPr id="3" name="Notes Placeholder 2"/>
+          <p:cNvSpPr>
+            <a:spLocks noGrp="1"/>
+          </p:cNvSpPr>
+          <p:nvPr>
+            <p:ph type="body" idx="1"/>
+          </p:nvPr>
+        </p:nvSpPr>
+        <p:spPr/>
+        <p:txBody>
+          <a:bodyPr/>
+          <a:lstStyle/>
+          <a:p>
+            <a:r>
+              <a:rPr lang="en-GB" dirty="0"/>
+              <a:t>Generalisation is really a very wide concept. It is simply an action of concluding some knowledge after certain experience or information.</a:t>
+            </a:r>
+          </a:p>
+          <a:p>
+            <a:r>
+              <a:rPr lang="en-GB" dirty="0"/>
+              <a:t>Put into machine learning, it is basically what machine learning is about, to predict some unknown result from a given known data. It is a easy and simple purpose, and once we know this, we can elaborate the specific parts of process. We can visualise this with a graph and a simple example. Lets imagine a bank needs a model to decide whether or not give loan to different people. I know, the typical example </a:t>
+            </a:r>
+            <a:r>
+              <a:rPr lang="en-GB" dirty="0">
+                <a:sym typeface="Wingdings" panose="05000000000000000000" pitchFamily="2" charset="2"/>
+              </a:rPr>
+              <a:t></a:t>
+            </a:r>
+          </a:p>
+          <a:p>
+            <a:r>
+              <a:rPr lang="en-GB" dirty="0"/>
+              <a:t>Our ultimate goal, what we want to know, but we will never know, the target function. We can think it is the most correct model, omnisciently, that gives the perfect suggestion to the bank. Again, we can never know this function as there is no way we can verify it with all possible combination</a:t>
+            </a:r>
+          </a:p>
+          <a:p>
+            <a:r>
+              <a:rPr lang="en-GB" dirty="0"/>
+              <a:t>But what we can know about this target function, that it produces the training data. So we can say somehow the historical data of the bank reflects the result of this target function, because the data, in this case supervised, is considered correct no matter the loan was given or not. So we say that our training data comes from the target function</a:t>
+            </a:r>
+          </a:p>
+          <a:p>
+            <a:r>
+              <a:rPr lang="en-GB" dirty="0"/>
+              <a:t>Once we have the data, we elaborate a learning model, which consists of learning algorithm and hypothesis set. This model can be a logistic regression, perceptron, etc. In each case, the form or the equation of the model is the hypothesis set. It is a set because you can change the coefficients of the equation to form a new equation. The learning algorithm is the sharpener of the hypothesis, it corrects and shifts the hypothesis extracted from the hypothesis set to a better prediction</a:t>
+            </a:r>
+          </a:p>
+          <a:p>
+            <a:r>
+              <a:rPr lang="en-GB" dirty="0"/>
+              <a:t>After enough sharpening and optimization, we give our final hypothesis, the final hypothesis which we think make the best prediction.</a:t>
+            </a:r>
+          </a:p>
+        </p:txBody>
+      </p:sp>
+    </p:spTree>
+    <p:extLst>
+      <p:ext uri="{BB962C8B-B14F-4D97-AF65-F5344CB8AC3E}">
+        <p14:creationId xmlns:p14="http://schemas.microsoft.com/office/powerpoint/2010/main" val="2984119496"/>
       </p:ext>
     </p:extLst>
   </p:cSld>
@@ -26785,25 +26990,18 @@
   <p:clrMapOvr>
     <a:masterClrMapping/>
   </p:clrMapOvr>
-  <mc:AlternateContent xmlns:mc="http://schemas.openxmlformats.org/markup-compatibility/2006">
-    <mc:Choice xmlns:p15="http://schemas.microsoft.com/office/powerpoint/2012/main" Requires="p15">
+  <mc:AlternateContent xmlns:mc="http://schemas.openxmlformats.org/markup-compatibility/2006" xmlns:p15="http://schemas.microsoft.com/office/powerpoint/2012/main">
+    <mc:Choice Requires="p15">
       <p:transition xmlns:p14="http://schemas.microsoft.com/office/powerpoint/2010/main" spd="slow" p14:dur="2000">
         <p15:prstTrans prst="drape"/>
       </p:transition>
     </mc:Choice>
-    <mc:Fallback>
+    <mc:Fallback xmlns="">
       <p:transition spd="slow">
         <p:fade/>
       </p:transition>
     </mc:Fallback>
   </mc:AlternateContent>
-  <p:timing>
-    <p:tnLst>
-      <p:par>
-        <p:cTn id="1" dur="indefinite" restart="never" nodeType="tmRoot"/>
-      </p:par>
-    </p:tnLst>
-  </p:timing>
 </p:sld>
 </file>
 
@@ -26990,13 +27188,13 @@
   <p:clrMapOvr>
     <a:masterClrMapping/>
   </p:clrMapOvr>
-  <mc:AlternateContent xmlns:mc="http://schemas.openxmlformats.org/markup-compatibility/2006">
-    <mc:Choice xmlns:p14="http://schemas.microsoft.com/office/powerpoint/2010/main" Requires="p14">
+  <mc:AlternateContent xmlns:mc="http://schemas.openxmlformats.org/markup-compatibility/2006" xmlns:p14="http://schemas.microsoft.com/office/powerpoint/2010/main">
+    <mc:Choice Requires="p14">
       <p:transition spd="slow" p14:dur="4000">
         <p14:vortex dir="r"/>
       </p:transition>
     </mc:Choice>
-    <mc:Fallback>
+    <mc:Fallback xmlns="">
       <p:transition spd="slow">
         <p:fade/>
       </p:transition>
@@ -27023,14 +27221,148 @@
                             </p:stCondLst>
                             <p:childTnLst>
                               <p:par>
-                                <p:cTn id="5" presetID="50" presetClass="path" presetSubtype="0" accel="50000" decel="50000" fill="hold" nodeType="clickEffect">
+                                <p:cTn id="5" presetID="21" presetClass="entr" presetSubtype="1" fill="hold" grpId="0" nodeType="clickEffect">
+                                  <p:stCondLst>
+                                    <p:cond delay="0"/>
+                                  </p:stCondLst>
+                                  <p:childTnLst>
+                                    <p:set>
+                                      <p:cBhvr>
+                                        <p:cTn id="6" dur="1" fill="hold">
+                                          <p:stCondLst>
+                                            <p:cond delay="0"/>
+                                          </p:stCondLst>
+                                        </p:cTn>
+                                        <p:tgtEl>
+                                          <p:spTgt spid="4"/>
+                                        </p:tgtEl>
+                                        <p:attrNameLst>
+                                          <p:attrName>style.visibility</p:attrName>
+                                        </p:attrNameLst>
+                                      </p:cBhvr>
+                                      <p:to>
+                                        <p:strVal val="visible"/>
+                                      </p:to>
+                                    </p:set>
+                                    <p:animEffect transition="in" filter="wheel(1)">
+                                      <p:cBhvr>
+                                        <p:cTn id="7" dur="2000"/>
+                                        <p:tgtEl>
+                                          <p:spTgt spid="4"/>
+                                        </p:tgtEl>
+                                      </p:cBhvr>
+                                    </p:animEffect>
+                                  </p:childTnLst>
+                                </p:cTn>
+                              </p:par>
+                              <p:par>
+                                <p:cTn id="8" presetID="42" presetClass="entr" presetSubtype="0" fill="hold" nodeType="withEffect">
+                                  <p:stCondLst>
+                                    <p:cond delay="0"/>
+                                  </p:stCondLst>
+                                  <p:childTnLst>
+                                    <p:set>
+                                      <p:cBhvr>
+                                        <p:cTn id="9" dur="1" fill="hold">
+                                          <p:stCondLst>
+                                            <p:cond delay="0"/>
+                                          </p:stCondLst>
+                                        </p:cTn>
+                                        <p:tgtEl>
+                                          <p:spTgt spid="5"/>
+                                        </p:tgtEl>
+                                        <p:attrNameLst>
+                                          <p:attrName>style.visibility</p:attrName>
+                                        </p:attrNameLst>
+                                      </p:cBhvr>
+                                      <p:to>
+                                        <p:strVal val="visible"/>
+                                      </p:to>
+                                    </p:set>
+                                    <p:animEffect transition="in" filter="fade">
+                                      <p:cBhvr>
+                                        <p:cTn id="10" dur="1000"/>
+                                        <p:tgtEl>
+                                          <p:spTgt spid="5"/>
+                                        </p:tgtEl>
+                                      </p:cBhvr>
+                                    </p:animEffect>
+                                    <p:anim calcmode="lin" valueType="num">
+                                      <p:cBhvr>
+                                        <p:cTn id="11" dur="1000" fill="hold"/>
+                                        <p:tgtEl>
+                                          <p:spTgt spid="5"/>
+                                        </p:tgtEl>
+                                        <p:attrNameLst>
+                                          <p:attrName>ppt_x</p:attrName>
+                                        </p:attrNameLst>
+                                      </p:cBhvr>
+                                      <p:tavLst>
+                                        <p:tav tm="0">
+                                          <p:val>
+                                            <p:strVal val="#ppt_x"/>
+                                          </p:val>
+                                        </p:tav>
+                                        <p:tav tm="100000">
+                                          <p:val>
+                                            <p:strVal val="#ppt_x"/>
+                                          </p:val>
+                                        </p:tav>
+                                      </p:tavLst>
+                                    </p:anim>
+                                    <p:anim calcmode="lin" valueType="num">
+                                      <p:cBhvr>
+                                        <p:cTn id="12" dur="1000" fill="hold"/>
+                                        <p:tgtEl>
+                                          <p:spTgt spid="5"/>
+                                        </p:tgtEl>
+                                        <p:attrNameLst>
+                                          <p:attrName>ppt_y</p:attrName>
+                                        </p:attrNameLst>
+                                      </p:cBhvr>
+                                      <p:tavLst>
+                                        <p:tav tm="0">
+                                          <p:val>
+                                            <p:strVal val="#ppt_y+.1"/>
+                                          </p:val>
+                                        </p:tav>
+                                        <p:tav tm="100000">
+                                          <p:val>
+                                            <p:strVal val="#ppt_y"/>
+                                          </p:val>
+                                        </p:tav>
+                                      </p:tavLst>
+                                    </p:anim>
+                                  </p:childTnLst>
+                                </p:cTn>
+                              </p:par>
+                            </p:childTnLst>
+                          </p:cTn>
+                        </p:par>
+                      </p:childTnLst>
+                    </p:cTn>
+                  </p:par>
+                  <p:par>
+                    <p:cTn id="13" fill="hold">
+                      <p:stCondLst>
+                        <p:cond delay="indefinite"/>
+                      </p:stCondLst>
+                      <p:childTnLst>
+                        <p:par>
+                          <p:cTn id="14" fill="hold">
+                            <p:stCondLst>
+                              <p:cond delay="0"/>
+                            </p:stCondLst>
+                            <p:childTnLst>
+                              <p:par>
+                                <p:cTn id="15" presetID="50" presetClass="path" presetSubtype="0" accel="50000" decel="50000" fill="hold" nodeType="clickEffect">
                                   <p:stCondLst>
                                     <p:cond delay="0"/>
                                   </p:stCondLst>
                                   <p:childTnLst>
                                     <p:animMotion origin="layout" path="M -2.5E-6 -4.44444E-6 L 0.0711 -4.44444E-6 C 0.10287 -4.44444E-6 0.14219 0.04931 0.14219 0.08936 L 0.14219 0.17894 " pathEditMode="relative" rAng="0" ptsTypes="AAAA">
                                       <p:cBhvr>
-                                        <p:cTn id="6" dur="2000" fill="hold"/>
+                                        <p:cTn id="16" dur="2000" fill="hold"/>
                                         <p:tgtEl>
                                           <p:spTgt spid="5"/>
                                         </p:tgtEl>
@@ -27051,26 +27383,26 @@
                     </p:cTn>
                   </p:par>
                   <p:par>
-                    <p:cTn id="7" fill="hold">
+                    <p:cTn id="17" fill="hold">
                       <p:stCondLst>
                         <p:cond delay="indefinite"/>
                       </p:stCondLst>
                       <p:childTnLst>
                         <p:par>
-                          <p:cTn id="8" fill="hold">
+                          <p:cTn id="18" fill="hold">
                             <p:stCondLst>
                               <p:cond delay="0"/>
                             </p:stCondLst>
                             <p:childTnLst>
                               <p:par>
-                                <p:cTn id="9" presetID="36" presetClass="path" presetSubtype="0" accel="50000" decel="50000" fill="hold" nodeType="clickEffect">
+                                <p:cTn id="19" presetID="36" presetClass="path" presetSubtype="0" accel="50000" decel="50000" fill="hold" nodeType="clickEffect">
                                   <p:stCondLst>
                                     <p:cond delay="0"/>
                                   </p:stCondLst>
                                   <p:childTnLst>
                                     <p:animMotion origin="layout" path="M 0.14219 0.17894 L 0.14219 0.32014 C 0.14219 0.38334 0.12552 0.46135 0.11198 0.46135 L 0.0819 0.46135 " pathEditMode="relative" rAng="0" ptsTypes="AAAA">
                                       <p:cBhvr>
-                                        <p:cTn id="10" dur="2000" fill="hold"/>
+                                        <p:cTn id="20" dur="2000" fill="hold"/>
                                         <p:tgtEl>
                                           <p:spTgt spid="5"/>
                                         </p:tgtEl>
@@ -27091,26 +27423,26 @@
                     </p:cTn>
                   </p:par>
                   <p:par>
-                    <p:cTn id="11" fill="hold">
+                    <p:cTn id="21" fill="hold">
                       <p:stCondLst>
                         <p:cond delay="indefinite"/>
                       </p:stCondLst>
                       <p:childTnLst>
                         <p:par>
-                          <p:cTn id="12" fill="hold">
+                          <p:cTn id="22" fill="hold">
                             <p:stCondLst>
                               <p:cond delay="0"/>
                             </p:stCondLst>
                             <p:childTnLst>
                               <p:par>
-                                <p:cTn id="13" presetID="37" presetClass="path" presetSubtype="0" accel="50000" decel="50000" fill="hold" nodeType="clickEffect">
+                                <p:cTn id="23" presetID="37" presetClass="path" presetSubtype="0" accel="50000" decel="50000" fill="hold" nodeType="clickEffect">
                                   <p:stCondLst>
                                     <p:cond delay="0"/>
                                   </p:stCondLst>
                                   <p:childTnLst>
                                     <p:animMotion origin="layout" path="M 0.0819 0.46135 L 0.03568 0.53658 C 0.02617 0.55348 0.01172 0.5632 -0.00338 0.5632 C -0.0207 0.5632 -0.0345 0.55348 -0.04401 0.53658 L -0.0901 0.46135 " pathEditMode="relative" rAng="0" ptsTypes="AAAAA">
                                       <p:cBhvr>
-                                        <p:cTn id="14" dur="2000" fill="hold"/>
+                                        <p:cTn id="24" dur="2000" fill="hold"/>
                                         <p:tgtEl>
                                           <p:spTgt spid="5"/>
                                         </p:tgtEl>
@@ -27131,26 +27463,26 @@
                     </p:cTn>
                   </p:par>
                   <p:par>
-                    <p:cTn id="15" fill="hold">
+                    <p:cTn id="25" fill="hold">
                       <p:stCondLst>
                         <p:cond delay="indefinite"/>
                       </p:stCondLst>
                       <p:childTnLst>
                         <p:par>
-                          <p:cTn id="16" fill="hold">
+                          <p:cTn id="26" fill="hold">
                             <p:stCondLst>
                               <p:cond delay="0"/>
                             </p:stCondLst>
                             <p:childTnLst>
                               <p:par>
-                                <p:cTn id="17" presetID="43" presetClass="path" presetSubtype="0" accel="50000" decel="50000" fill="hold" nodeType="clickEffect">
+                                <p:cTn id="27" presetID="43" presetClass="path" presetSubtype="0" accel="50000" decel="50000" fill="hold" nodeType="clickEffect">
                                   <p:stCondLst>
                                     <p:cond delay="0"/>
                                   </p:stCondLst>
                                   <p:childTnLst>
                                     <p:animMotion origin="layout" path="M -0.0901 0.46135 L -0.1181 0.46135 C -0.13073 0.46135 -0.14609 0.38264 -0.14609 0.31875 L -0.14609 0.17639 " pathEditMode="relative" rAng="0" ptsTypes="AAAA">
                                       <p:cBhvr>
-                                        <p:cTn id="18" dur="2000" fill="hold"/>
+                                        <p:cTn id="28" dur="2000" fill="hold"/>
                                         <p:tgtEl>
                                           <p:spTgt spid="5"/>
                                         </p:tgtEl>
@@ -27171,26 +27503,26 @@
                     </p:cTn>
                   </p:par>
                   <p:par>
-                    <p:cTn id="19" fill="hold">
+                    <p:cTn id="29" fill="hold">
                       <p:stCondLst>
                         <p:cond delay="indefinite"/>
                       </p:stCondLst>
                       <p:childTnLst>
                         <p:par>
-                          <p:cTn id="20" fill="hold">
+                          <p:cTn id="30" fill="hold">
                             <p:stCondLst>
                               <p:cond delay="0"/>
                             </p:stCondLst>
                             <p:childTnLst>
                               <p:par>
-                                <p:cTn id="21" presetID="57" presetClass="path" presetSubtype="0" accel="50000" decel="50000" fill="hold" nodeType="clickEffect">
+                                <p:cTn id="31" presetID="57" presetClass="path" presetSubtype="0" accel="50000" decel="50000" fill="hold" nodeType="clickEffect">
                                   <p:stCondLst>
                                     <p:cond delay="0"/>
                                   </p:stCondLst>
                                   <p:childTnLst>
                                     <p:animMotion origin="layout" path="M -0.14609 0.17639 L -0.14609 0.0875 C -0.14609 0.04746 -0.10729 -0.00138 -0.07578 -0.00138 L -0.00547 -0.00138 " pathEditMode="relative" rAng="0" ptsTypes="AAAA">
                                       <p:cBhvr>
-                                        <p:cTn id="22" dur="2000" fill="hold"/>
+                                        <p:cTn id="32" dur="2000" fill="hold"/>
                                         <p:tgtEl>
                                           <p:spTgt spid="5"/>
                                         </p:tgtEl>
@@ -27201,6 +27533,1090 @@
                                       </p:cBhvr>
                                       <p:rCtr x="7031" y="-8889"/>
                                     </p:animMotion>
+                                  </p:childTnLst>
+                                </p:cTn>
+                              </p:par>
+                            </p:childTnLst>
+                          </p:cTn>
+                        </p:par>
+                      </p:childTnLst>
+                    </p:cTn>
+                  </p:par>
+                </p:childTnLst>
+              </p:cTn>
+              <p:prevCondLst>
+                <p:cond evt="onPrev" delay="0">
+                  <p:tgtEl>
+                    <p:sldTgt/>
+                  </p:tgtEl>
+                </p:cond>
+              </p:prevCondLst>
+              <p:nextCondLst>
+                <p:cond evt="onNext" delay="0">
+                  <p:tgtEl>
+                    <p:sldTgt/>
+                  </p:tgtEl>
+                </p:cond>
+              </p:nextCondLst>
+            </p:seq>
+          </p:childTnLst>
+        </p:cTn>
+      </p:par>
+    </p:tnLst>
+    <p:bldLst>
+      <p:bldGraphic spid="4" grpId="0">
+        <p:bldAsOne/>
+      </p:bldGraphic>
+    </p:bldLst>
+  </p:timing>
+</p:sld>
+</file>
+
+<file path=ppt/slides/slide3.xml><?xml version="1.0" encoding="utf-8"?>
+<p:sld xmlns:a="http://schemas.openxmlformats.org/drawingml/2006/main" xmlns:r="http://schemas.openxmlformats.org/officeDocument/2006/relationships" xmlns:p="http://schemas.openxmlformats.org/presentationml/2006/main">
+  <p:cSld>
+    <p:spTree>
+      <p:nvGrpSpPr>
+        <p:cNvPr id="1" name=""/>
+        <p:cNvGrpSpPr/>
+        <p:nvPr/>
+      </p:nvGrpSpPr>
+      <p:grpSpPr>
+        <a:xfrm>
+          <a:off x="0" y="0"/>
+          <a:ext cx="0" cy="0"/>
+          <a:chOff x="0" y="0"/>
+          <a:chExt cx="0" cy="0"/>
+        </a:xfrm>
+      </p:grpSpPr>
+      <p:sp>
+        <p:nvSpPr>
+          <p:cNvPr id="2" name="Title 1">
+            <a:extLst>
+              <a:ext uri="{FF2B5EF4-FFF2-40B4-BE49-F238E27FC236}">
+                <a16:creationId xmlns:a16="http://schemas.microsoft.com/office/drawing/2014/main" id="{B88CCA98-2EB4-4326-8C08-A3B93B7501F4}"/>
+              </a:ext>
+            </a:extLst>
+          </p:cNvPr>
+          <p:cNvSpPr>
+            <a:spLocks noGrp="1"/>
+          </p:cNvSpPr>
+          <p:nvPr>
+            <p:ph type="title"/>
+          </p:nvPr>
+        </p:nvSpPr>
+        <p:spPr/>
+        <p:txBody>
+          <a:bodyPr/>
+          <a:lstStyle/>
+          <a:p>
+            <a:pPr algn="ctr"/>
+            <a:r>
+              <a:rPr lang="en-GB" dirty="0"/>
+              <a:t>Acknowledgement</a:t>
+            </a:r>
+          </a:p>
+        </p:txBody>
+      </p:sp>
+      <p:sp>
+        <p:nvSpPr>
+          <p:cNvPr id="3" name="Text Placeholder 2">
+            <a:extLst>
+              <a:ext uri="{FF2B5EF4-FFF2-40B4-BE49-F238E27FC236}">
+                <a16:creationId xmlns:a16="http://schemas.microsoft.com/office/drawing/2014/main" id="{A63EFC4B-353A-427E-83D7-222FFC49E7B7}"/>
+              </a:ext>
+            </a:extLst>
+          </p:cNvPr>
+          <p:cNvSpPr>
+            <a:spLocks noGrp="1"/>
+          </p:cNvSpPr>
+          <p:nvPr>
+            <p:ph type="body" idx="1"/>
+          </p:nvPr>
+        </p:nvSpPr>
+        <p:spPr>
+          <a:xfrm>
+            <a:off x="1141410" y="2249486"/>
+            <a:ext cx="9905998" cy="3541714"/>
+          </a:xfrm>
+        </p:spPr>
+        <p:txBody>
+          <a:bodyPr/>
+          <a:lstStyle/>
+          <a:p>
+            <a:r>
+              <a:rPr lang="en-GB" dirty="0"/>
+              <a:t>Content from </a:t>
+            </a:r>
+            <a:r>
+              <a:rPr lang="en-GB" dirty="0" err="1"/>
+              <a:t>Dr.</a:t>
+            </a:r>
+            <a:r>
+              <a:rPr lang="en-GB" dirty="0"/>
+              <a:t> </a:t>
+            </a:r>
+            <a:r>
+              <a:rPr lang="en-GB" dirty="0" err="1"/>
+              <a:t>Yaser</a:t>
+            </a:r>
+            <a:r>
+              <a:rPr lang="en-GB" dirty="0"/>
+              <a:t> Abu-Mostafa, Caltech, 2012</a:t>
+            </a:r>
+          </a:p>
+          <a:p>
+            <a:r>
+              <a:rPr lang="en-GB" dirty="0"/>
+              <a:t>“Learning From Data” </a:t>
+            </a:r>
+          </a:p>
+          <a:p>
+            <a:r>
+              <a:rPr lang="en-GB" dirty="0"/>
+              <a:t>https://www.youtube.com/watch?v=mbyG85GZ0PI </a:t>
+            </a:r>
+          </a:p>
+        </p:txBody>
+      </p:sp>
+    </p:spTree>
+    <p:extLst>
+      <p:ext uri="{BB962C8B-B14F-4D97-AF65-F5344CB8AC3E}">
+        <p14:creationId xmlns:p14="http://schemas.microsoft.com/office/powerpoint/2010/main" val="3484875697"/>
+      </p:ext>
+    </p:extLst>
+  </p:cSld>
+  <p:clrMapOvr>
+    <a:masterClrMapping/>
+  </p:clrMapOvr>
+  <mc:AlternateContent xmlns:mc="http://schemas.openxmlformats.org/markup-compatibility/2006" xmlns:p14="http://schemas.microsoft.com/office/powerpoint/2010/main">
+    <mc:Choice Requires="p14">
+      <p:transition spd="slow" p14:dur="1250">
+        <p14:flip dir="r"/>
+      </p:transition>
+    </mc:Choice>
+    <mc:Fallback xmlns="">
+      <p:transition spd="slow">
+        <p:fade/>
+      </p:transition>
+    </mc:Fallback>
+  </mc:AlternateContent>
+</p:sld>
+</file>
+
+<file path=ppt/slides/slide4.xml><?xml version="1.0" encoding="utf-8"?>
+<p:sld xmlns:a="http://schemas.openxmlformats.org/drawingml/2006/main" xmlns:r="http://schemas.openxmlformats.org/officeDocument/2006/relationships" xmlns:p="http://schemas.openxmlformats.org/presentationml/2006/main">
+  <p:cSld>
+    <p:spTree>
+      <p:nvGrpSpPr>
+        <p:cNvPr id="1" name=""/>
+        <p:cNvGrpSpPr/>
+        <p:nvPr/>
+      </p:nvGrpSpPr>
+      <p:grpSpPr>
+        <a:xfrm>
+          <a:off x="0" y="0"/>
+          <a:ext cx="0" cy="0"/>
+          <a:chOff x="0" y="0"/>
+          <a:chExt cx="0" cy="0"/>
+        </a:xfrm>
+      </p:grpSpPr>
+      <p:sp>
+        <p:nvSpPr>
+          <p:cNvPr id="2" name="Title 1">
+            <a:extLst>
+              <a:ext uri="{FF2B5EF4-FFF2-40B4-BE49-F238E27FC236}">
+                <a16:creationId xmlns:a16="http://schemas.microsoft.com/office/drawing/2014/main" id="{B88CCA98-2EB4-4326-8C08-A3B93B7501F4}"/>
+              </a:ext>
+            </a:extLst>
+          </p:cNvPr>
+          <p:cNvSpPr>
+            <a:spLocks noGrp="1"/>
+          </p:cNvSpPr>
+          <p:nvPr>
+            <p:ph type="title"/>
+          </p:nvPr>
+        </p:nvSpPr>
+        <p:spPr/>
+        <p:txBody>
+          <a:bodyPr/>
+          <a:lstStyle/>
+          <a:p>
+            <a:pPr algn="ctr"/>
+            <a:r>
+              <a:rPr lang="en-GB" dirty="0"/>
+              <a:t>Generalisation</a:t>
+            </a:r>
+          </a:p>
+        </p:txBody>
+      </p:sp>
+      <p:sp>
+        <p:nvSpPr>
+          <p:cNvPr id="3" name="Text Placeholder 2">
+            <a:extLst>
+              <a:ext uri="{FF2B5EF4-FFF2-40B4-BE49-F238E27FC236}">
+                <a16:creationId xmlns:a16="http://schemas.microsoft.com/office/drawing/2014/main" id="{A63EFC4B-353A-427E-83D7-222FFC49E7B7}"/>
+              </a:ext>
+            </a:extLst>
+          </p:cNvPr>
+          <p:cNvSpPr>
+            <a:spLocks noGrp="1"/>
+          </p:cNvSpPr>
+          <p:nvPr>
+            <p:ph type="body" idx="1"/>
+          </p:nvPr>
+        </p:nvSpPr>
+        <p:spPr>
+          <a:xfrm>
+            <a:off x="1141410" y="2249486"/>
+            <a:ext cx="9905998" cy="3541714"/>
+          </a:xfrm>
+        </p:spPr>
+        <p:txBody>
+          <a:bodyPr/>
+          <a:lstStyle/>
+          <a:p>
+            <a:r>
+              <a:rPr lang="en-GB" dirty="0"/>
+              <a:t>Predict unknown result from known data</a:t>
+            </a:r>
+          </a:p>
+          <a:p>
+            <a:endParaRPr lang="en-GB" dirty="0"/>
+          </a:p>
+        </p:txBody>
+      </p:sp>
+      <p:grpSp>
+        <p:nvGrpSpPr>
+          <p:cNvPr id="28" name="Group 27">
+            <a:extLst>
+              <a:ext uri="{FF2B5EF4-FFF2-40B4-BE49-F238E27FC236}">
+                <a16:creationId xmlns:a16="http://schemas.microsoft.com/office/drawing/2014/main" id="{AD6160D4-64F2-48BD-BF5C-1B7770CE2B62}"/>
+              </a:ext>
+            </a:extLst>
+          </p:cNvPr>
+          <p:cNvGrpSpPr/>
+          <p:nvPr/>
+        </p:nvGrpSpPr>
+        <p:grpSpPr>
+          <a:xfrm>
+            <a:off x="1515834" y="3320929"/>
+            <a:ext cx="9413425" cy="2332615"/>
+            <a:chOff x="1515834" y="3320929"/>
+            <a:chExt cx="9413425" cy="2332615"/>
+          </a:xfrm>
+        </p:grpSpPr>
+        <p:grpSp>
+          <p:nvGrpSpPr>
+            <p:cNvPr id="6" name="Group 5">
+              <a:extLst>
+                <a:ext uri="{FF2B5EF4-FFF2-40B4-BE49-F238E27FC236}">
+                  <a16:creationId xmlns:a16="http://schemas.microsoft.com/office/drawing/2014/main" id="{7272E1AC-6D27-4001-A662-38CB8125DE85}"/>
+                </a:ext>
+              </a:extLst>
+            </p:cNvPr>
+            <p:cNvGrpSpPr/>
+            <p:nvPr/>
+          </p:nvGrpSpPr>
+          <p:grpSpPr>
+            <a:xfrm>
+              <a:off x="1515834" y="3320929"/>
+              <a:ext cx="3107871" cy="1045030"/>
+              <a:chOff x="1458685" y="3429000"/>
+              <a:chExt cx="3107871" cy="1045030"/>
+            </a:xfrm>
+          </p:grpSpPr>
+          <p:sp>
+            <p:nvSpPr>
+              <p:cNvPr id="5" name="TextBox 4">
+                <a:extLst>
+                  <a:ext uri="{FF2B5EF4-FFF2-40B4-BE49-F238E27FC236}">
+                    <a16:creationId xmlns:a16="http://schemas.microsoft.com/office/drawing/2014/main" id="{28B9AEC3-A990-413E-9520-2920752CA16F}"/>
+                  </a:ext>
+                </a:extLst>
+              </p:cNvPr>
+              <p:cNvSpPr txBox="1"/>
+              <p:nvPr/>
+            </p:nvSpPr>
+            <p:spPr>
+              <a:xfrm>
+                <a:off x="1572984" y="3720682"/>
+                <a:ext cx="2993572" cy="461665"/>
+              </a:xfrm>
+              <a:prstGeom prst="rect">
+                <a:avLst/>
+              </a:prstGeom>
+              <a:noFill/>
+            </p:spPr>
+            <p:txBody>
+              <a:bodyPr wrap="square" rtlCol="0">
+                <a:spAutoFit/>
+              </a:bodyPr>
+              <a:lstStyle/>
+              <a:p>
+                <a:r>
+                  <a:rPr lang="en-GB" sz="2400" dirty="0">
+                    <a:latin typeface="Cambria" panose="02040503050406030204" pitchFamily="18" charset="0"/>
+                    <a:ea typeface="Cambria" panose="02040503050406030204" pitchFamily="18" charset="0"/>
+                  </a:rPr>
+                  <a:t>TARGET FUNCTION</a:t>
+                </a:r>
+              </a:p>
+            </p:txBody>
+          </p:sp>
+          <p:sp>
+            <p:nvSpPr>
+              <p:cNvPr id="4" name="Cloud 3">
+                <a:extLst>
+                  <a:ext uri="{FF2B5EF4-FFF2-40B4-BE49-F238E27FC236}">
+                    <a16:creationId xmlns:a16="http://schemas.microsoft.com/office/drawing/2014/main" id="{3A5A52FB-EE9C-4B2F-8E17-2ABB4F63065B}"/>
+                  </a:ext>
+                </a:extLst>
+              </p:cNvPr>
+              <p:cNvSpPr/>
+              <p:nvPr/>
+            </p:nvSpPr>
+            <p:spPr>
+              <a:xfrm>
+                <a:off x="1458685" y="3429000"/>
+                <a:ext cx="2993572" cy="1045030"/>
+              </a:xfrm>
+              <a:prstGeom prst="cloud">
+                <a:avLst/>
+              </a:prstGeom>
+              <a:noFill/>
+              <a:ln w="9525" cap="flat" cmpd="sng" algn="ctr">
+                <a:solidFill>
+                  <a:schemeClr val="accent4"/>
+                </a:solidFill>
+                <a:prstDash val="solid"/>
+                <a:round/>
+                <a:headEnd type="none" w="med" len="med"/>
+                <a:tailEnd type="none" w="med" len="med"/>
+              </a:ln>
+            </p:spPr>
+            <p:style>
+              <a:lnRef idx="0">
+                <a:scrgbClr r="0" g="0" b="0"/>
+              </a:lnRef>
+              <a:fillRef idx="0">
+                <a:scrgbClr r="0" g="0" b="0"/>
+              </a:fillRef>
+              <a:effectRef idx="0">
+                <a:scrgbClr r="0" g="0" b="0"/>
+              </a:effectRef>
+              <a:fontRef idx="minor">
+                <a:schemeClr val="accent4"/>
+              </a:fontRef>
+            </p:style>
+            <p:txBody>
+              <a:bodyPr rtlCol="0" anchor="ctr"/>
+              <a:lstStyle/>
+              <a:p>
+                <a:pPr algn="ctr"/>
+                <a:endParaRPr lang="en-GB"/>
+              </a:p>
+            </p:txBody>
+          </p:sp>
+        </p:grpSp>
+        <p:grpSp>
+          <p:nvGrpSpPr>
+            <p:cNvPr id="9" name="Group 8">
+              <a:extLst>
+                <a:ext uri="{FF2B5EF4-FFF2-40B4-BE49-F238E27FC236}">
+                  <a16:creationId xmlns:a16="http://schemas.microsoft.com/office/drawing/2014/main" id="{3C92EE20-7405-498B-A172-27ED9F69AF66}"/>
+                </a:ext>
+              </a:extLst>
+            </p:cNvPr>
+            <p:cNvGrpSpPr/>
+            <p:nvPr/>
+          </p:nvGrpSpPr>
+          <p:grpSpPr>
+            <a:xfrm>
+              <a:off x="1687284" y="4811486"/>
+              <a:ext cx="2764973" cy="842058"/>
+              <a:chOff x="1687284" y="4811486"/>
+              <a:chExt cx="2764973" cy="842058"/>
+            </a:xfrm>
+          </p:grpSpPr>
+          <p:sp>
+            <p:nvSpPr>
+              <p:cNvPr id="7" name="Rectangle 6">
+                <a:extLst>
+                  <a:ext uri="{FF2B5EF4-FFF2-40B4-BE49-F238E27FC236}">
+                    <a16:creationId xmlns:a16="http://schemas.microsoft.com/office/drawing/2014/main" id="{39E13B37-F64A-4237-A204-D2A089A8382F}"/>
+                  </a:ext>
+                </a:extLst>
+              </p:cNvPr>
+              <p:cNvSpPr/>
+              <p:nvPr/>
+            </p:nvSpPr>
+            <p:spPr>
+              <a:xfrm>
+                <a:off x="1687284" y="4811486"/>
+                <a:ext cx="2764973" cy="842058"/>
+              </a:xfrm>
+              <a:prstGeom prst="rect">
+                <a:avLst/>
+              </a:prstGeom>
+              <a:noFill/>
+              <a:ln w="9525" cap="flat" cmpd="sng" algn="ctr">
+                <a:solidFill>
+                  <a:schemeClr val="accent4"/>
+                </a:solidFill>
+                <a:prstDash val="solid"/>
+                <a:round/>
+                <a:headEnd type="none" w="med" len="med"/>
+                <a:tailEnd type="none" w="med" len="med"/>
+              </a:ln>
+            </p:spPr>
+            <p:style>
+              <a:lnRef idx="0">
+                <a:scrgbClr r="0" g="0" b="0"/>
+              </a:lnRef>
+              <a:fillRef idx="0">
+                <a:scrgbClr r="0" g="0" b="0"/>
+              </a:fillRef>
+              <a:effectRef idx="0">
+                <a:scrgbClr r="0" g="0" b="0"/>
+              </a:effectRef>
+              <a:fontRef idx="minor">
+                <a:schemeClr val="accent4"/>
+              </a:fontRef>
+            </p:style>
+            <p:txBody>
+              <a:bodyPr rtlCol="0" anchor="ctr"/>
+              <a:lstStyle/>
+              <a:p>
+                <a:pPr algn="ctr"/>
+                <a:endParaRPr lang="en-GB"/>
+              </a:p>
+            </p:txBody>
+          </p:sp>
+          <p:sp>
+            <p:nvSpPr>
+              <p:cNvPr id="8" name="TextBox 7">
+                <a:extLst>
+                  <a:ext uri="{FF2B5EF4-FFF2-40B4-BE49-F238E27FC236}">
+                    <a16:creationId xmlns:a16="http://schemas.microsoft.com/office/drawing/2014/main" id="{86FE25F6-19B9-43C8-BF1B-FB4E0DD8BD56}"/>
+                  </a:ext>
+                </a:extLst>
+              </p:cNvPr>
+              <p:cNvSpPr txBox="1"/>
+              <p:nvPr/>
+            </p:nvSpPr>
+            <p:spPr>
+              <a:xfrm>
+                <a:off x="1687284" y="4965462"/>
+                <a:ext cx="2764973" cy="461665"/>
+              </a:xfrm>
+              <a:prstGeom prst="rect">
+                <a:avLst/>
+              </a:prstGeom>
+              <a:noFill/>
+            </p:spPr>
+            <p:txBody>
+              <a:bodyPr wrap="square" rtlCol="0">
+                <a:spAutoFit/>
+              </a:bodyPr>
+              <a:lstStyle/>
+              <a:p>
+                <a:pPr algn="ctr"/>
+                <a:r>
+                  <a:rPr lang="en-GB" sz="2400" dirty="0">
+                    <a:latin typeface="Cambria" panose="02040503050406030204" pitchFamily="18" charset="0"/>
+                    <a:ea typeface="Cambria" panose="02040503050406030204" pitchFamily="18" charset="0"/>
+                  </a:rPr>
+                  <a:t>TRAINING DATA</a:t>
+                </a:r>
+              </a:p>
+            </p:txBody>
+          </p:sp>
+        </p:grpSp>
+        <p:grpSp>
+          <p:nvGrpSpPr>
+            <p:cNvPr id="10" name="Group 9">
+              <a:extLst>
+                <a:ext uri="{FF2B5EF4-FFF2-40B4-BE49-F238E27FC236}">
+                  <a16:creationId xmlns:a16="http://schemas.microsoft.com/office/drawing/2014/main" id="{1D745CB9-7B6C-4C4C-8DA6-490CD798C2F4}"/>
+                </a:ext>
+              </a:extLst>
+            </p:cNvPr>
+            <p:cNvGrpSpPr/>
+            <p:nvPr/>
+          </p:nvGrpSpPr>
+          <p:grpSpPr>
+            <a:xfrm>
+              <a:off x="5399313" y="4811486"/>
+              <a:ext cx="2764973" cy="842058"/>
+              <a:chOff x="1687284" y="4811486"/>
+              <a:chExt cx="2764973" cy="842058"/>
+            </a:xfrm>
+          </p:grpSpPr>
+          <p:sp>
+            <p:nvSpPr>
+              <p:cNvPr id="11" name="Rectangle 10">
+                <a:extLst>
+                  <a:ext uri="{FF2B5EF4-FFF2-40B4-BE49-F238E27FC236}">
+                    <a16:creationId xmlns:a16="http://schemas.microsoft.com/office/drawing/2014/main" id="{1638441A-FEE9-4BF7-819C-30C6742A7230}"/>
+                  </a:ext>
+                </a:extLst>
+              </p:cNvPr>
+              <p:cNvSpPr/>
+              <p:nvPr/>
+            </p:nvSpPr>
+            <p:spPr>
+              <a:xfrm>
+                <a:off x="1687284" y="4811486"/>
+                <a:ext cx="2764973" cy="842058"/>
+              </a:xfrm>
+              <a:prstGeom prst="rect">
+                <a:avLst/>
+              </a:prstGeom>
+              <a:noFill/>
+              <a:ln w="9525" cap="flat" cmpd="sng" algn="ctr">
+                <a:solidFill>
+                  <a:schemeClr val="accent4"/>
+                </a:solidFill>
+                <a:prstDash val="solid"/>
+                <a:round/>
+                <a:headEnd type="none" w="med" len="med"/>
+                <a:tailEnd type="none" w="med" len="med"/>
+              </a:ln>
+            </p:spPr>
+            <p:style>
+              <a:lnRef idx="0">
+                <a:scrgbClr r="0" g="0" b="0"/>
+              </a:lnRef>
+              <a:fillRef idx="0">
+                <a:scrgbClr r="0" g="0" b="0"/>
+              </a:fillRef>
+              <a:effectRef idx="0">
+                <a:scrgbClr r="0" g="0" b="0"/>
+              </a:effectRef>
+              <a:fontRef idx="minor">
+                <a:schemeClr val="accent4"/>
+              </a:fontRef>
+            </p:style>
+            <p:txBody>
+              <a:bodyPr rtlCol="0" anchor="ctr"/>
+              <a:lstStyle/>
+              <a:p>
+                <a:pPr algn="ctr"/>
+                <a:endParaRPr lang="en-GB"/>
+              </a:p>
+            </p:txBody>
+          </p:sp>
+          <p:sp>
+            <p:nvSpPr>
+              <p:cNvPr id="12" name="TextBox 11">
+                <a:extLst>
+                  <a:ext uri="{FF2B5EF4-FFF2-40B4-BE49-F238E27FC236}">
+                    <a16:creationId xmlns:a16="http://schemas.microsoft.com/office/drawing/2014/main" id="{9F5E1897-852E-4D83-9157-9E7511DDB863}"/>
+                  </a:ext>
+                </a:extLst>
+              </p:cNvPr>
+              <p:cNvSpPr txBox="1"/>
+              <p:nvPr/>
+            </p:nvSpPr>
+            <p:spPr>
+              <a:xfrm>
+                <a:off x="1687284" y="4965462"/>
+                <a:ext cx="2764973" cy="461665"/>
+              </a:xfrm>
+              <a:prstGeom prst="rect">
+                <a:avLst/>
+              </a:prstGeom>
+              <a:noFill/>
+            </p:spPr>
+            <p:txBody>
+              <a:bodyPr wrap="square" rtlCol="0">
+                <a:spAutoFit/>
+              </a:bodyPr>
+              <a:lstStyle/>
+              <a:p>
+                <a:pPr algn="ctr"/>
+                <a:r>
+                  <a:rPr lang="en-GB" sz="2400" dirty="0">
+                    <a:latin typeface="Cambria" panose="02040503050406030204" pitchFamily="18" charset="0"/>
+                    <a:ea typeface="Cambria" panose="02040503050406030204" pitchFamily="18" charset="0"/>
+                  </a:rPr>
+                  <a:t>LEARNING ALGO</a:t>
+                </a:r>
+              </a:p>
+            </p:txBody>
+          </p:sp>
+        </p:grpSp>
+        <p:grpSp>
+          <p:nvGrpSpPr>
+            <p:cNvPr id="13" name="Group 12">
+              <a:extLst>
+                <a:ext uri="{FF2B5EF4-FFF2-40B4-BE49-F238E27FC236}">
+                  <a16:creationId xmlns:a16="http://schemas.microsoft.com/office/drawing/2014/main" id="{FDC59FC8-A005-4A42-89BB-7F18A8F6B063}"/>
+                </a:ext>
+              </a:extLst>
+            </p:cNvPr>
+            <p:cNvGrpSpPr/>
+            <p:nvPr/>
+          </p:nvGrpSpPr>
+          <p:grpSpPr>
+            <a:xfrm>
+              <a:off x="8164286" y="4811486"/>
+              <a:ext cx="2764973" cy="842058"/>
+              <a:chOff x="1687284" y="4811486"/>
+              <a:chExt cx="2764973" cy="842058"/>
+            </a:xfrm>
+          </p:grpSpPr>
+          <p:sp>
+            <p:nvSpPr>
+              <p:cNvPr id="14" name="Rectangle 13">
+                <a:extLst>
+                  <a:ext uri="{FF2B5EF4-FFF2-40B4-BE49-F238E27FC236}">
+                    <a16:creationId xmlns:a16="http://schemas.microsoft.com/office/drawing/2014/main" id="{FA9205E8-DDE8-434A-BD4D-8AB4D1B17F00}"/>
+                  </a:ext>
+                </a:extLst>
+              </p:cNvPr>
+              <p:cNvSpPr/>
+              <p:nvPr/>
+            </p:nvSpPr>
+            <p:spPr>
+              <a:xfrm>
+                <a:off x="1687284" y="4811486"/>
+                <a:ext cx="2764973" cy="842058"/>
+              </a:xfrm>
+              <a:prstGeom prst="rect">
+                <a:avLst/>
+              </a:prstGeom>
+              <a:noFill/>
+              <a:ln w="9525" cap="flat" cmpd="sng" algn="ctr">
+                <a:solidFill>
+                  <a:schemeClr val="accent4"/>
+                </a:solidFill>
+                <a:prstDash val="solid"/>
+                <a:round/>
+                <a:headEnd type="none" w="med" len="med"/>
+                <a:tailEnd type="none" w="med" len="med"/>
+              </a:ln>
+            </p:spPr>
+            <p:style>
+              <a:lnRef idx="0">
+                <a:scrgbClr r="0" g="0" b="0"/>
+              </a:lnRef>
+              <a:fillRef idx="0">
+                <a:scrgbClr r="0" g="0" b="0"/>
+              </a:fillRef>
+              <a:effectRef idx="0">
+                <a:scrgbClr r="0" g="0" b="0"/>
+              </a:effectRef>
+              <a:fontRef idx="minor">
+                <a:schemeClr val="accent4"/>
+              </a:fontRef>
+            </p:style>
+            <p:txBody>
+              <a:bodyPr rtlCol="0" anchor="ctr"/>
+              <a:lstStyle/>
+              <a:p>
+                <a:pPr algn="ctr"/>
+                <a:endParaRPr lang="en-GB"/>
+              </a:p>
+            </p:txBody>
+          </p:sp>
+          <p:sp>
+            <p:nvSpPr>
+              <p:cNvPr id="15" name="TextBox 14">
+                <a:extLst>
+                  <a:ext uri="{FF2B5EF4-FFF2-40B4-BE49-F238E27FC236}">
+                    <a16:creationId xmlns:a16="http://schemas.microsoft.com/office/drawing/2014/main" id="{F738136C-065D-4DBC-98BC-372240EFC92C}"/>
+                  </a:ext>
+                </a:extLst>
+              </p:cNvPr>
+              <p:cNvSpPr txBox="1"/>
+              <p:nvPr/>
+            </p:nvSpPr>
+            <p:spPr>
+              <a:xfrm>
+                <a:off x="1687284" y="4965462"/>
+                <a:ext cx="2764973" cy="461665"/>
+              </a:xfrm>
+              <a:prstGeom prst="rect">
+                <a:avLst/>
+              </a:prstGeom>
+              <a:noFill/>
+            </p:spPr>
+            <p:txBody>
+              <a:bodyPr wrap="square" rtlCol="0">
+                <a:spAutoFit/>
+              </a:bodyPr>
+              <a:lstStyle/>
+              <a:p>
+                <a:pPr algn="ctr"/>
+                <a:r>
+                  <a:rPr lang="en-GB" sz="2400" dirty="0">
+                    <a:latin typeface="Cambria" panose="02040503050406030204" pitchFamily="18" charset="0"/>
+                    <a:ea typeface="Cambria" panose="02040503050406030204" pitchFamily="18" charset="0"/>
+                  </a:rPr>
+                  <a:t>HYPOTHESIS SET</a:t>
+                </a:r>
+              </a:p>
+            </p:txBody>
+          </p:sp>
+        </p:grpSp>
+        <p:grpSp>
+          <p:nvGrpSpPr>
+            <p:cNvPr id="17" name="Group 16">
+              <a:extLst>
+                <a:ext uri="{FF2B5EF4-FFF2-40B4-BE49-F238E27FC236}">
+                  <a16:creationId xmlns:a16="http://schemas.microsoft.com/office/drawing/2014/main" id="{09BEB9BD-C675-4BA9-B171-EDF589B0E2C2}"/>
+                </a:ext>
+              </a:extLst>
+            </p:cNvPr>
+            <p:cNvGrpSpPr/>
+            <p:nvPr/>
+          </p:nvGrpSpPr>
+          <p:grpSpPr>
+            <a:xfrm flipH="1">
+              <a:off x="6724649" y="3342700"/>
+              <a:ext cx="3050722" cy="1045030"/>
+              <a:chOff x="1401535" y="3429000"/>
+              <a:chExt cx="3050722" cy="1045030"/>
+            </a:xfrm>
+          </p:grpSpPr>
+          <p:sp>
+            <p:nvSpPr>
+              <p:cNvPr id="18" name="TextBox 17">
+                <a:extLst>
+                  <a:ext uri="{FF2B5EF4-FFF2-40B4-BE49-F238E27FC236}">
+                    <a16:creationId xmlns:a16="http://schemas.microsoft.com/office/drawing/2014/main" id="{8D86D749-53E2-4138-8175-5445A03B27BE}"/>
+                  </a:ext>
+                </a:extLst>
+              </p:cNvPr>
+              <p:cNvSpPr txBox="1"/>
+              <p:nvPr/>
+            </p:nvSpPr>
+            <p:spPr>
+              <a:xfrm>
+                <a:off x="1401535" y="3720682"/>
+                <a:ext cx="2993572" cy="461665"/>
+              </a:xfrm>
+              <a:prstGeom prst="rect">
+                <a:avLst/>
+              </a:prstGeom>
+              <a:noFill/>
+            </p:spPr>
+            <p:txBody>
+              <a:bodyPr wrap="square" rtlCol="0">
+                <a:spAutoFit/>
+              </a:bodyPr>
+              <a:lstStyle/>
+              <a:p>
+                <a:r>
+                  <a:rPr lang="en-GB" sz="2400" dirty="0">
+                    <a:latin typeface="Cambria" panose="02040503050406030204" pitchFamily="18" charset="0"/>
+                    <a:ea typeface="Cambria" panose="02040503050406030204" pitchFamily="18" charset="0"/>
+                  </a:rPr>
+                  <a:t>FINAL HYPOTHESIS</a:t>
+                </a:r>
+              </a:p>
+            </p:txBody>
+          </p:sp>
+          <p:sp>
+            <p:nvSpPr>
+              <p:cNvPr id="19" name="Cloud 18">
+                <a:extLst>
+                  <a:ext uri="{FF2B5EF4-FFF2-40B4-BE49-F238E27FC236}">
+                    <a16:creationId xmlns:a16="http://schemas.microsoft.com/office/drawing/2014/main" id="{63E39BEE-011F-4F82-BB84-41F081FE1794}"/>
+                  </a:ext>
+                </a:extLst>
+              </p:cNvPr>
+              <p:cNvSpPr/>
+              <p:nvPr/>
+            </p:nvSpPr>
+            <p:spPr>
+              <a:xfrm>
+                <a:off x="1458685" y="3429000"/>
+                <a:ext cx="2993572" cy="1045030"/>
+              </a:xfrm>
+              <a:prstGeom prst="cloud">
+                <a:avLst/>
+              </a:prstGeom>
+              <a:noFill/>
+              <a:ln w="9525" cap="flat" cmpd="sng" algn="ctr">
+                <a:solidFill>
+                  <a:schemeClr val="accent4"/>
+                </a:solidFill>
+                <a:prstDash val="solid"/>
+                <a:round/>
+                <a:headEnd type="none" w="med" len="med"/>
+                <a:tailEnd type="none" w="med" len="med"/>
+              </a:ln>
+            </p:spPr>
+            <p:style>
+              <a:lnRef idx="0">
+                <a:scrgbClr r="0" g="0" b="0"/>
+              </a:lnRef>
+              <a:fillRef idx="0">
+                <a:scrgbClr r="0" g="0" b="0"/>
+              </a:fillRef>
+              <a:effectRef idx="0">
+                <a:scrgbClr r="0" g="0" b="0"/>
+              </a:effectRef>
+              <a:fontRef idx="minor">
+                <a:schemeClr val="accent4"/>
+              </a:fontRef>
+            </p:style>
+            <p:txBody>
+              <a:bodyPr rtlCol="0" anchor="ctr"/>
+              <a:lstStyle/>
+              <a:p>
+                <a:pPr algn="ctr"/>
+                <a:endParaRPr lang="en-GB"/>
+              </a:p>
+            </p:txBody>
+          </p:sp>
+        </p:grpSp>
+        <p:cxnSp>
+          <p:nvCxnSpPr>
+            <p:cNvPr id="21" name="Straight Arrow Connector 20">
+              <a:extLst>
+                <a:ext uri="{FF2B5EF4-FFF2-40B4-BE49-F238E27FC236}">
+                  <a16:creationId xmlns:a16="http://schemas.microsoft.com/office/drawing/2014/main" id="{0A6FAA31-D0F9-4F93-8E69-B73CF4DD553C}"/>
+                </a:ext>
+              </a:extLst>
+            </p:cNvPr>
+            <p:cNvCxnSpPr>
+              <a:stCxn id="4" idx="1"/>
+              <a:endCxn id="7" idx="0"/>
+            </p:cNvCxnSpPr>
+            <p:nvPr/>
+          </p:nvCxnSpPr>
+          <p:spPr>
+            <a:xfrm>
+              <a:off x="3012620" y="4364846"/>
+              <a:ext cx="57151" cy="446640"/>
+            </a:xfrm>
+            <a:prstGeom prst="straightConnector1">
+              <a:avLst/>
+            </a:prstGeom>
+            <a:ln>
+              <a:tailEnd type="triangle"/>
+            </a:ln>
+          </p:spPr>
+          <p:style>
+            <a:lnRef idx="1">
+              <a:schemeClr val="dk1"/>
+            </a:lnRef>
+            <a:fillRef idx="0">
+              <a:schemeClr val="dk1"/>
+            </a:fillRef>
+            <a:effectRef idx="0">
+              <a:schemeClr val="dk1"/>
+            </a:effectRef>
+            <a:fontRef idx="minor">
+              <a:schemeClr val="tx1"/>
+            </a:fontRef>
+          </p:style>
+        </p:cxnSp>
+        <p:cxnSp>
+          <p:nvCxnSpPr>
+            <p:cNvPr id="23" name="Straight Arrow Connector 22">
+              <a:extLst>
+                <a:ext uri="{FF2B5EF4-FFF2-40B4-BE49-F238E27FC236}">
+                  <a16:creationId xmlns:a16="http://schemas.microsoft.com/office/drawing/2014/main" id="{C8BA5EA1-D9B7-48D0-BAC8-925E0B62ACC2}"/>
+                </a:ext>
+              </a:extLst>
+            </p:cNvPr>
+            <p:cNvCxnSpPr>
+              <a:stCxn id="8" idx="3"/>
+              <a:endCxn id="12" idx="1"/>
+            </p:cNvCxnSpPr>
+            <p:nvPr/>
+          </p:nvCxnSpPr>
+          <p:spPr>
+            <a:xfrm>
+              <a:off x="4452257" y="5196295"/>
+              <a:ext cx="947056" cy="0"/>
+            </a:xfrm>
+            <a:prstGeom prst="straightConnector1">
+              <a:avLst/>
+            </a:prstGeom>
+            <a:ln>
+              <a:tailEnd type="triangle"/>
+            </a:ln>
+          </p:spPr>
+          <p:style>
+            <a:lnRef idx="1">
+              <a:schemeClr val="dk1"/>
+            </a:lnRef>
+            <a:fillRef idx="0">
+              <a:schemeClr val="dk1"/>
+            </a:fillRef>
+            <a:effectRef idx="0">
+              <a:schemeClr val="dk1"/>
+            </a:effectRef>
+            <a:fontRef idx="minor">
+              <a:schemeClr val="tx1"/>
+            </a:fontRef>
+          </p:style>
+        </p:cxnSp>
+        <p:cxnSp>
+          <p:nvCxnSpPr>
+            <p:cNvPr id="25" name="Straight Arrow Connector 24">
+              <a:extLst>
+                <a:ext uri="{FF2B5EF4-FFF2-40B4-BE49-F238E27FC236}">
+                  <a16:creationId xmlns:a16="http://schemas.microsoft.com/office/drawing/2014/main" id="{C0599BEF-79BD-4DB2-B0C1-70F4EA8B341D}"/>
+                </a:ext>
+              </a:extLst>
+            </p:cNvPr>
+            <p:cNvCxnSpPr>
+              <a:stCxn id="11" idx="0"/>
+              <a:endCxn id="19" idx="1"/>
+            </p:cNvCxnSpPr>
+            <p:nvPr/>
+          </p:nvCxnSpPr>
+          <p:spPr>
+            <a:xfrm flipV="1">
+              <a:off x="6781800" y="4386617"/>
+              <a:ext cx="1439635" cy="424869"/>
+            </a:xfrm>
+            <a:prstGeom prst="straightConnector1">
+              <a:avLst/>
+            </a:prstGeom>
+            <a:ln>
+              <a:tailEnd type="triangle"/>
+            </a:ln>
+          </p:spPr>
+          <p:style>
+            <a:lnRef idx="1">
+              <a:schemeClr val="dk1"/>
+            </a:lnRef>
+            <a:fillRef idx="0">
+              <a:schemeClr val="dk1"/>
+            </a:fillRef>
+            <a:effectRef idx="0">
+              <a:schemeClr val="dk1"/>
+            </a:effectRef>
+            <a:fontRef idx="minor">
+              <a:schemeClr val="tx1"/>
+            </a:fontRef>
+          </p:style>
+        </p:cxnSp>
+        <p:cxnSp>
+          <p:nvCxnSpPr>
+            <p:cNvPr id="27" name="Straight Arrow Connector 26">
+              <a:extLst>
+                <a:ext uri="{FF2B5EF4-FFF2-40B4-BE49-F238E27FC236}">
+                  <a16:creationId xmlns:a16="http://schemas.microsoft.com/office/drawing/2014/main" id="{3B5C4698-0FF4-4D3D-86A0-3030A26252AE}"/>
+                </a:ext>
+              </a:extLst>
+            </p:cNvPr>
+            <p:cNvCxnSpPr>
+              <a:stCxn id="14" idx="0"/>
+              <a:endCxn id="19" idx="1"/>
+            </p:cNvCxnSpPr>
+            <p:nvPr/>
+          </p:nvCxnSpPr>
+          <p:spPr>
+            <a:xfrm flipH="1" flipV="1">
+              <a:off x="8221435" y="4386617"/>
+              <a:ext cx="1325338" cy="424869"/>
+            </a:xfrm>
+            <a:prstGeom prst="straightConnector1">
+              <a:avLst/>
+            </a:prstGeom>
+            <a:ln>
+              <a:tailEnd type="triangle"/>
+            </a:ln>
+          </p:spPr>
+          <p:style>
+            <a:lnRef idx="1">
+              <a:schemeClr val="dk1"/>
+            </a:lnRef>
+            <a:fillRef idx="0">
+              <a:schemeClr val="dk1"/>
+            </a:fillRef>
+            <a:effectRef idx="0">
+              <a:schemeClr val="dk1"/>
+            </a:effectRef>
+            <a:fontRef idx="minor">
+              <a:schemeClr val="tx1"/>
+            </a:fontRef>
+          </p:style>
+        </p:cxnSp>
+      </p:grpSp>
+    </p:spTree>
+    <p:extLst>
+      <p:ext uri="{BB962C8B-B14F-4D97-AF65-F5344CB8AC3E}">
+        <p14:creationId xmlns:p14="http://schemas.microsoft.com/office/powerpoint/2010/main" val="1684405703"/>
+      </p:ext>
+    </p:extLst>
+  </p:cSld>
+  <p:clrMapOvr>
+    <a:masterClrMapping/>
+  </p:clrMapOvr>
+  <mc:AlternateContent xmlns:mc="http://schemas.openxmlformats.org/markup-compatibility/2006" xmlns:p14="http://schemas.microsoft.com/office/powerpoint/2010/main">
+    <mc:Choice Requires="p14">
+      <p:transition spd="slow" p14:dur="1250">
+        <p14:flip dir="r"/>
+      </p:transition>
+    </mc:Choice>
+    <mc:Fallback xmlns="">
+      <p:transition spd="slow">
+        <p:fade/>
+      </p:transition>
+    </mc:Fallback>
+  </mc:AlternateContent>
+  <p:timing>
+    <p:tnLst>
+      <p:par>
+        <p:cTn id="1" dur="indefinite" restart="never" nodeType="tmRoot">
+          <p:childTnLst>
+            <p:seq concurrent="1" nextAc="seek">
+              <p:cTn id="2" dur="indefinite" nodeType="mainSeq">
+                <p:childTnLst>
+                  <p:par>
+                    <p:cTn id="3" fill="hold">
+                      <p:stCondLst>
+                        <p:cond delay="indefinite"/>
+                      </p:stCondLst>
+                      <p:childTnLst>
+                        <p:par>
+                          <p:cTn id="4" fill="hold">
+                            <p:stCondLst>
+                              <p:cond delay="0"/>
+                            </p:stCondLst>
+                            <p:childTnLst>
+                              <p:par>
+                                <p:cTn id="5" presetID="22" presetClass="entr" presetSubtype="4" fill="hold" nodeType="clickEffect">
+                                  <p:stCondLst>
+                                    <p:cond delay="0"/>
+                                  </p:stCondLst>
+                                  <p:childTnLst>
+                                    <p:set>
+                                      <p:cBhvr>
+                                        <p:cTn id="6" dur="1" fill="hold">
+                                          <p:stCondLst>
+                                            <p:cond delay="0"/>
+                                          </p:stCondLst>
+                                        </p:cTn>
+                                        <p:tgtEl>
+                                          <p:spTgt spid="28"/>
+                                        </p:tgtEl>
+                                        <p:attrNameLst>
+                                          <p:attrName>style.visibility</p:attrName>
+                                        </p:attrNameLst>
+                                      </p:cBhvr>
+                                      <p:to>
+                                        <p:strVal val="visible"/>
+                                      </p:to>
+                                    </p:set>
+                                    <p:animEffect transition="in" filter="wipe(down)">
+                                      <p:cBhvr>
+                                        <p:cTn id="7" dur="1400"/>
+                                        <p:tgtEl>
+                                          <p:spTgt spid="28"/>
+                                        </p:tgtEl>
+                                      </p:cBhvr>
+                                    </p:animEffect>
                                   </p:childTnLst>
                                 </p:cTn>
                               </p:par>

</xml_diff>